<commit_message>
#2 Design ERD done
</commit_message>
<xml_diff>
--- a/docs/ER-DIAGRAM.pptx
+++ b/docs/ER-DIAGRAM.pptx
@@ -155,10 +155,9 @@
           </a:lstStyle>
           <a:p>
             <a:r>
-              <a:rPr lang="en-US" smtClean="0"/>
+              <a:rPr lang="en-US"/>
               <a:t>Click to edit Master title style</a:t>
             </a:r>
-            <a:endParaRPr lang="en-US"/>
           </a:p>
         </p:txBody>
       </p:sp>
@@ -220,10 +219,9 @@
           </a:lstStyle>
           <a:p>
             <a:r>
-              <a:rPr lang="en-US" smtClean="0"/>
+              <a:rPr lang="en-US"/>
               <a:t>Click to edit Master subtitle style</a:t>
             </a:r>
-            <a:endParaRPr lang="en-US"/>
           </a:p>
         </p:txBody>
       </p:sp>
@@ -244,7 +242,7 @@
           <a:p>
             <a:fld id="{28BE630F-C39C-4DB9-8258-0B48CA067079}" type="datetimeFigureOut">
               <a:rPr lang="en-US" smtClean="0"/>
-              <a:t>11/25/2021</a:t>
+              <a:t>11/26/2021</a:t>
             </a:fld>
             <a:endParaRPr lang="en-US"/>
           </a:p>
@@ -338,10 +336,9 @@
           <a:lstStyle/>
           <a:p>
             <a:r>
-              <a:rPr lang="en-US" smtClean="0"/>
+              <a:rPr lang="en-US"/>
               <a:t>Click to edit Master title style</a:t>
             </a:r>
-            <a:endParaRPr lang="en-US"/>
           </a:p>
         </p:txBody>
       </p:sp>
@@ -362,38 +359,37 @@
           <a:p>
             <a:pPr lvl="0"/>
             <a:r>
-              <a:rPr lang="en-US" smtClean="0"/>
+              <a:rPr lang="en-US"/>
               <a:t>Click to edit Master text styles</a:t>
             </a:r>
           </a:p>
           <a:p>
             <a:pPr lvl="1"/>
             <a:r>
-              <a:rPr lang="en-US" smtClean="0"/>
+              <a:rPr lang="en-US"/>
               <a:t>Second level</a:t>
             </a:r>
           </a:p>
           <a:p>
             <a:pPr lvl="2"/>
             <a:r>
-              <a:rPr lang="en-US" smtClean="0"/>
+              <a:rPr lang="en-US"/>
               <a:t>Third level</a:t>
             </a:r>
           </a:p>
           <a:p>
             <a:pPr lvl="3"/>
             <a:r>
-              <a:rPr lang="en-US" smtClean="0"/>
+              <a:rPr lang="en-US"/>
               <a:t>Fourth level</a:t>
             </a:r>
           </a:p>
           <a:p>
             <a:pPr lvl="4"/>
             <a:r>
-              <a:rPr lang="en-US" smtClean="0"/>
+              <a:rPr lang="en-US"/>
               <a:t>Fifth level</a:t>
             </a:r>
-            <a:endParaRPr lang="en-US"/>
           </a:p>
         </p:txBody>
       </p:sp>
@@ -414,7 +410,7 @@
           <a:p>
             <a:fld id="{28BE630F-C39C-4DB9-8258-0B48CA067079}" type="datetimeFigureOut">
               <a:rPr lang="en-US" smtClean="0"/>
-              <a:t>11/25/2021</a:t>
+              <a:t>11/26/2021</a:t>
             </a:fld>
             <a:endParaRPr lang="en-US"/>
           </a:p>
@@ -513,10 +509,9 @@
           <a:lstStyle/>
           <a:p>
             <a:r>
-              <a:rPr lang="en-US" smtClean="0"/>
+              <a:rPr lang="en-US"/>
               <a:t>Click to edit Master title style</a:t>
             </a:r>
-            <a:endParaRPr lang="en-US"/>
           </a:p>
         </p:txBody>
       </p:sp>
@@ -542,38 +537,37 @@
           <a:p>
             <a:pPr lvl="0"/>
             <a:r>
-              <a:rPr lang="en-US" smtClean="0"/>
+              <a:rPr lang="en-US"/>
               <a:t>Click to edit Master text styles</a:t>
             </a:r>
           </a:p>
           <a:p>
             <a:pPr lvl="1"/>
             <a:r>
-              <a:rPr lang="en-US" smtClean="0"/>
+              <a:rPr lang="en-US"/>
               <a:t>Second level</a:t>
             </a:r>
           </a:p>
           <a:p>
             <a:pPr lvl="2"/>
             <a:r>
-              <a:rPr lang="en-US" smtClean="0"/>
+              <a:rPr lang="en-US"/>
               <a:t>Third level</a:t>
             </a:r>
           </a:p>
           <a:p>
             <a:pPr lvl="3"/>
             <a:r>
-              <a:rPr lang="en-US" smtClean="0"/>
+              <a:rPr lang="en-US"/>
               <a:t>Fourth level</a:t>
             </a:r>
           </a:p>
           <a:p>
             <a:pPr lvl="4"/>
             <a:r>
-              <a:rPr lang="en-US" smtClean="0"/>
+              <a:rPr lang="en-US"/>
               <a:t>Fifth level</a:t>
             </a:r>
-            <a:endParaRPr lang="en-US"/>
           </a:p>
         </p:txBody>
       </p:sp>
@@ -594,7 +588,7 @@
           <a:p>
             <a:fld id="{28BE630F-C39C-4DB9-8258-0B48CA067079}" type="datetimeFigureOut">
               <a:rPr lang="en-US" smtClean="0"/>
-              <a:t>11/25/2021</a:t>
+              <a:t>11/26/2021</a:t>
             </a:fld>
             <a:endParaRPr lang="en-US"/>
           </a:p>
@@ -688,10 +682,9 @@
           <a:lstStyle/>
           <a:p>
             <a:r>
-              <a:rPr lang="en-US" smtClean="0"/>
+              <a:rPr lang="en-US"/>
               <a:t>Click to edit Master title style</a:t>
             </a:r>
-            <a:endParaRPr lang="en-US"/>
           </a:p>
         </p:txBody>
       </p:sp>
@@ -712,38 +705,37 @@
           <a:p>
             <a:pPr lvl="0"/>
             <a:r>
-              <a:rPr lang="en-US" smtClean="0"/>
+              <a:rPr lang="en-US"/>
               <a:t>Click to edit Master text styles</a:t>
             </a:r>
           </a:p>
           <a:p>
             <a:pPr lvl="1"/>
             <a:r>
-              <a:rPr lang="en-US" smtClean="0"/>
+              <a:rPr lang="en-US"/>
               <a:t>Second level</a:t>
             </a:r>
           </a:p>
           <a:p>
             <a:pPr lvl="2"/>
             <a:r>
-              <a:rPr lang="en-US" smtClean="0"/>
+              <a:rPr lang="en-US"/>
               <a:t>Third level</a:t>
             </a:r>
           </a:p>
           <a:p>
             <a:pPr lvl="3"/>
             <a:r>
-              <a:rPr lang="en-US" smtClean="0"/>
+              <a:rPr lang="en-US"/>
               <a:t>Fourth level</a:t>
             </a:r>
           </a:p>
           <a:p>
             <a:pPr lvl="4"/>
             <a:r>
-              <a:rPr lang="en-US" smtClean="0"/>
+              <a:rPr lang="en-US"/>
               <a:t>Fifth level</a:t>
             </a:r>
-            <a:endParaRPr lang="en-US"/>
           </a:p>
         </p:txBody>
       </p:sp>
@@ -764,7 +756,7 @@
           <a:p>
             <a:fld id="{28BE630F-C39C-4DB9-8258-0B48CA067079}" type="datetimeFigureOut">
               <a:rPr lang="en-US" smtClean="0"/>
-              <a:t>11/25/2021</a:t>
+              <a:t>11/26/2021</a:t>
             </a:fld>
             <a:endParaRPr lang="en-US"/>
           </a:p>
@@ -867,10 +859,9 @@
           </a:lstStyle>
           <a:p>
             <a:r>
-              <a:rPr lang="en-US" smtClean="0"/>
+              <a:rPr lang="en-US"/>
               <a:t>Click to edit Master title style</a:t>
             </a:r>
-            <a:endParaRPr lang="en-US"/>
           </a:p>
         </p:txBody>
       </p:sp>
@@ -987,7 +978,7 @@
           <a:p>
             <a:pPr lvl="0"/>
             <a:r>
-              <a:rPr lang="en-US" smtClean="0"/>
+              <a:rPr lang="en-US"/>
               <a:t>Click to edit Master text styles</a:t>
             </a:r>
           </a:p>
@@ -1010,7 +1001,7 @@
           <a:p>
             <a:fld id="{28BE630F-C39C-4DB9-8258-0B48CA067079}" type="datetimeFigureOut">
               <a:rPr lang="en-US" smtClean="0"/>
-              <a:t>11/25/2021</a:t>
+              <a:t>11/26/2021</a:t>
             </a:fld>
             <a:endParaRPr lang="en-US"/>
           </a:p>
@@ -1104,10 +1095,9 @@
           <a:lstStyle/>
           <a:p>
             <a:r>
-              <a:rPr lang="en-US" smtClean="0"/>
+              <a:rPr lang="en-US"/>
               <a:t>Click to edit Master title style</a:t>
             </a:r>
-            <a:endParaRPr lang="en-US"/>
           </a:p>
         </p:txBody>
       </p:sp>
@@ -1133,38 +1123,37 @@
           <a:p>
             <a:pPr lvl="0"/>
             <a:r>
-              <a:rPr lang="en-US" smtClean="0"/>
+              <a:rPr lang="en-US"/>
               <a:t>Click to edit Master text styles</a:t>
             </a:r>
           </a:p>
           <a:p>
             <a:pPr lvl="1"/>
             <a:r>
-              <a:rPr lang="en-US" smtClean="0"/>
+              <a:rPr lang="en-US"/>
               <a:t>Second level</a:t>
             </a:r>
           </a:p>
           <a:p>
             <a:pPr lvl="2"/>
             <a:r>
-              <a:rPr lang="en-US" smtClean="0"/>
+              <a:rPr lang="en-US"/>
               <a:t>Third level</a:t>
             </a:r>
           </a:p>
           <a:p>
             <a:pPr lvl="3"/>
             <a:r>
-              <a:rPr lang="en-US" smtClean="0"/>
+              <a:rPr lang="en-US"/>
               <a:t>Fourth level</a:t>
             </a:r>
           </a:p>
           <a:p>
             <a:pPr lvl="4"/>
             <a:r>
-              <a:rPr lang="en-US" smtClean="0"/>
+              <a:rPr lang="en-US"/>
               <a:t>Fifth level</a:t>
             </a:r>
-            <a:endParaRPr lang="en-US"/>
           </a:p>
         </p:txBody>
       </p:sp>
@@ -1190,38 +1179,37 @@
           <a:p>
             <a:pPr lvl="0"/>
             <a:r>
-              <a:rPr lang="en-US" smtClean="0"/>
+              <a:rPr lang="en-US"/>
               <a:t>Click to edit Master text styles</a:t>
             </a:r>
           </a:p>
           <a:p>
             <a:pPr lvl="1"/>
             <a:r>
-              <a:rPr lang="en-US" smtClean="0"/>
+              <a:rPr lang="en-US"/>
               <a:t>Second level</a:t>
             </a:r>
           </a:p>
           <a:p>
             <a:pPr lvl="2"/>
             <a:r>
-              <a:rPr lang="en-US" smtClean="0"/>
+              <a:rPr lang="en-US"/>
               <a:t>Third level</a:t>
             </a:r>
           </a:p>
           <a:p>
             <a:pPr lvl="3"/>
             <a:r>
-              <a:rPr lang="en-US" smtClean="0"/>
+              <a:rPr lang="en-US"/>
               <a:t>Fourth level</a:t>
             </a:r>
           </a:p>
           <a:p>
             <a:pPr lvl="4"/>
             <a:r>
-              <a:rPr lang="en-US" smtClean="0"/>
+              <a:rPr lang="en-US"/>
               <a:t>Fifth level</a:t>
             </a:r>
-            <a:endParaRPr lang="en-US"/>
           </a:p>
         </p:txBody>
       </p:sp>
@@ -1242,7 +1230,7 @@
           <a:p>
             <a:fld id="{28BE630F-C39C-4DB9-8258-0B48CA067079}" type="datetimeFigureOut">
               <a:rPr lang="en-US" smtClean="0"/>
-              <a:t>11/25/2021</a:t>
+              <a:t>11/26/2021</a:t>
             </a:fld>
             <a:endParaRPr lang="en-US"/>
           </a:p>
@@ -1341,10 +1329,9 @@
           <a:lstStyle/>
           <a:p>
             <a:r>
-              <a:rPr lang="en-US" smtClean="0"/>
+              <a:rPr lang="en-US"/>
               <a:t>Click to edit Master title style</a:t>
             </a:r>
-            <a:endParaRPr lang="en-US"/>
           </a:p>
         </p:txBody>
       </p:sp>
@@ -1407,7 +1394,7 @@
           <a:p>
             <a:pPr lvl="0"/>
             <a:r>
-              <a:rPr lang="en-US" smtClean="0"/>
+              <a:rPr lang="en-US"/>
               <a:t>Click to edit Master text styles</a:t>
             </a:r>
           </a:p>
@@ -1435,38 +1422,37 @@
           <a:p>
             <a:pPr lvl="0"/>
             <a:r>
-              <a:rPr lang="en-US" smtClean="0"/>
+              <a:rPr lang="en-US"/>
               <a:t>Click to edit Master text styles</a:t>
             </a:r>
           </a:p>
           <a:p>
             <a:pPr lvl="1"/>
             <a:r>
-              <a:rPr lang="en-US" smtClean="0"/>
+              <a:rPr lang="en-US"/>
               <a:t>Second level</a:t>
             </a:r>
           </a:p>
           <a:p>
             <a:pPr lvl="2"/>
             <a:r>
-              <a:rPr lang="en-US" smtClean="0"/>
+              <a:rPr lang="en-US"/>
               <a:t>Third level</a:t>
             </a:r>
           </a:p>
           <a:p>
             <a:pPr lvl="3"/>
             <a:r>
-              <a:rPr lang="en-US" smtClean="0"/>
+              <a:rPr lang="en-US"/>
               <a:t>Fourth level</a:t>
             </a:r>
           </a:p>
           <a:p>
             <a:pPr lvl="4"/>
             <a:r>
-              <a:rPr lang="en-US" smtClean="0"/>
+              <a:rPr lang="en-US"/>
               <a:t>Fifth level</a:t>
             </a:r>
-            <a:endParaRPr lang="en-US"/>
           </a:p>
         </p:txBody>
       </p:sp>
@@ -1529,7 +1515,7 @@
           <a:p>
             <a:pPr lvl="0"/>
             <a:r>
-              <a:rPr lang="en-US" smtClean="0"/>
+              <a:rPr lang="en-US"/>
               <a:t>Click to edit Master text styles</a:t>
             </a:r>
           </a:p>
@@ -1557,38 +1543,37 @@
           <a:p>
             <a:pPr lvl="0"/>
             <a:r>
-              <a:rPr lang="en-US" smtClean="0"/>
+              <a:rPr lang="en-US"/>
               <a:t>Click to edit Master text styles</a:t>
             </a:r>
           </a:p>
           <a:p>
             <a:pPr lvl="1"/>
             <a:r>
-              <a:rPr lang="en-US" smtClean="0"/>
+              <a:rPr lang="en-US"/>
               <a:t>Second level</a:t>
             </a:r>
           </a:p>
           <a:p>
             <a:pPr lvl="2"/>
             <a:r>
-              <a:rPr lang="en-US" smtClean="0"/>
+              <a:rPr lang="en-US"/>
               <a:t>Third level</a:t>
             </a:r>
           </a:p>
           <a:p>
             <a:pPr lvl="3"/>
             <a:r>
-              <a:rPr lang="en-US" smtClean="0"/>
+              <a:rPr lang="en-US"/>
               <a:t>Fourth level</a:t>
             </a:r>
           </a:p>
           <a:p>
             <a:pPr lvl="4"/>
             <a:r>
-              <a:rPr lang="en-US" smtClean="0"/>
+              <a:rPr lang="en-US"/>
               <a:t>Fifth level</a:t>
             </a:r>
-            <a:endParaRPr lang="en-US"/>
           </a:p>
         </p:txBody>
       </p:sp>
@@ -1609,7 +1594,7 @@
           <a:p>
             <a:fld id="{28BE630F-C39C-4DB9-8258-0B48CA067079}" type="datetimeFigureOut">
               <a:rPr lang="en-US" smtClean="0"/>
-              <a:t>11/25/2021</a:t>
+              <a:t>11/26/2021</a:t>
             </a:fld>
             <a:endParaRPr lang="en-US"/>
           </a:p>
@@ -1703,10 +1688,9 @@
           <a:lstStyle/>
           <a:p>
             <a:r>
-              <a:rPr lang="en-US" smtClean="0"/>
+              <a:rPr lang="en-US"/>
               <a:t>Click to edit Master title style</a:t>
             </a:r>
-            <a:endParaRPr lang="en-US"/>
           </a:p>
         </p:txBody>
       </p:sp>
@@ -1727,7 +1711,7 @@
           <a:p>
             <a:fld id="{28BE630F-C39C-4DB9-8258-0B48CA067079}" type="datetimeFigureOut">
               <a:rPr lang="en-US" smtClean="0"/>
-              <a:t>11/25/2021</a:t>
+              <a:t>11/26/2021</a:t>
             </a:fld>
             <a:endParaRPr lang="en-US"/>
           </a:p>
@@ -1822,7 +1806,7 @@
           <a:p>
             <a:fld id="{28BE630F-C39C-4DB9-8258-0B48CA067079}" type="datetimeFigureOut">
               <a:rPr lang="en-US" smtClean="0"/>
-              <a:t>11/25/2021</a:t>
+              <a:t>11/26/2021</a:t>
             </a:fld>
             <a:endParaRPr lang="en-US"/>
           </a:p>
@@ -1925,10 +1909,9 @@
           </a:lstStyle>
           <a:p>
             <a:r>
-              <a:rPr lang="en-US" smtClean="0"/>
+              <a:rPr lang="en-US"/>
               <a:t>Click to edit Master title style</a:t>
             </a:r>
-            <a:endParaRPr lang="en-US"/>
           </a:p>
         </p:txBody>
       </p:sp>
@@ -1982,38 +1965,37 @@
           <a:p>
             <a:pPr lvl="0"/>
             <a:r>
-              <a:rPr lang="en-US" smtClean="0"/>
+              <a:rPr lang="en-US"/>
               <a:t>Click to edit Master text styles</a:t>
             </a:r>
           </a:p>
           <a:p>
             <a:pPr lvl="1"/>
             <a:r>
-              <a:rPr lang="en-US" smtClean="0"/>
+              <a:rPr lang="en-US"/>
               <a:t>Second level</a:t>
             </a:r>
           </a:p>
           <a:p>
             <a:pPr lvl="2"/>
             <a:r>
-              <a:rPr lang="en-US" smtClean="0"/>
+              <a:rPr lang="en-US"/>
               <a:t>Third level</a:t>
             </a:r>
           </a:p>
           <a:p>
             <a:pPr lvl="3"/>
             <a:r>
-              <a:rPr lang="en-US" smtClean="0"/>
+              <a:rPr lang="en-US"/>
               <a:t>Fourth level</a:t>
             </a:r>
           </a:p>
           <a:p>
             <a:pPr lvl="4"/>
             <a:r>
-              <a:rPr lang="en-US" smtClean="0"/>
+              <a:rPr lang="en-US"/>
               <a:t>Fifth level</a:t>
             </a:r>
-            <a:endParaRPr lang="en-US"/>
           </a:p>
         </p:txBody>
       </p:sp>
@@ -2076,7 +2058,7 @@
           <a:p>
             <a:pPr lvl="0"/>
             <a:r>
-              <a:rPr lang="en-US" smtClean="0"/>
+              <a:rPr lang="en-US"/>
               <a:t>Click to edit Master text styles</a:t>
             </a:r>
           </a:p>
@@ -2099,7 +2081,7 @@
           <a:p>
             <a:fld id="{28BE630F-C39C-4DB9-8258-0B48CA067079}" type="datetimeFigureOut">
               <a:rPr lang="en-US" smtClean="0"/>
-              <a:t>11/25/2021</a:t>
+              <a:t>11/26/2021</a:t>
             </a:fld>
             <a:endParaRPr lang="en-US"/>
           </a:p>
@@ -2202,10 +2184,9 @@
           </a:lstStyle>
           <a:p>
             <a:r>
-              <a:rPr lang="en-US" smtClean="0"/>
+              <a:rPr lang="en-US"/>
               <a:t>Click to edit Master title style</a:t>
             </a:r>
-            <a:endParaRPr lang="en-US"/>
           </a:p>
         </p:txBody>
       </p:sp>
@@ -2329,7 +2310,7 @@
           <a:p>
             <a:pPr lvl="0"/>
             <a:r>
-              <a:rPr lang="en-US" smtClean="0"/>
+              <a:rPr lang="en-US"/>
               <a:t>Click to edit Master text styles</a:t>
             </a:r>
           </a:p>
@@ -2352,7 +2333,7 @@
           <a:p>
             <a:fld id="{28BE630F-C39C-4DB9-8258-0B48CA067079}" type="datetimeFigureOut">
               <a:rPr lang="en-US" smtClean="0"/>
-              <a:t>11/25/2021</a:t>
+              <a:t>11/26/2021</a:t>
             </a:fld>
             <a:endParaRPr lang="en-US"/>
           </a:p>
@@ -2461,10 +2442,9 @@
           <a:lstStyle/>
           <a:p>
             <a:r>
-              <a:rPr lang="en-US" smtClean="0"/>
+              <a:rPr lang="en-US"/>
               <a:t>Click to edit Master title style</a:t>
             </a:r>
-            <a:endParaRPr lang="en-US"/>
           </a:p>
         </p:txBody>
       </p:sp>
@@ -2495,38 +2475,37 @@
           <a:p>
             <a:pPr lvl="0"/>
             <a:r>
-              <a:rPr lang="en-US" smtClean="0"/>
+              <a:rPr lang="en-US"/>
               <a:t>Click to edit Master text styles</a:t>
             </a:r>
           </a:p>
           <a:p>
             <a:pPr lvl="1"/>
             <a:r>
-              <a:rPr lang="en-US" smtClean="0"/>
+              <a:rPr lang="en-US"/>
               <a:t>Second level</a:t>
             </a:r>
           </a:p>
           <a:p>
             <a:pPr lvl="2"/>
             <a:r>
-              <a:rPr lang="en-US" smtClean="0"/>
+              <a:rPr lang="en-US"/>
               <a:t>Third level</a:t>
             </a:r>
           </a:p>
           <a:p>
             <a:pPr lvl="3"/>
             <a:r>
-              <a:rPr lang="en-US" smtClean="0"/>
+              <a:rPr lang="en-US"/>
               <a:t>Fourth level</a:t>
             </a:r>
           </a:p>
           <a:p>
             <a:pPr lvl="4"/>
             <a:r>
-              <a:rPr lang="en-US" smtClean="0"/>
+              <a:rPr lang="en-US"/>
               <a:t>Fifth level</a:t>
             </a:r>
-            <a:endParaRPr lang="en-US"/>
           </a:p>
         </p:txBody>
       </p:sp>
@@ -2565,7 +2544,7 @@
           <a:p>
             <a:fld id="{28BE630F-C39C-4DB9-8258-0B48CA067079}" type="datetimeFigureOut">
               <a:rPr lang="en-US" smtClean="0"/>
-              <a:t>11/25/2021</a:t>
+              <a:t>11/26/2021</a:t>
             </a:fld>
             <a:endParaRPr lang="en-US"/>
           </a:p>
@@ -3004,12 +2983,8 @@
           </a:lstStyle>
           <a:p>
             <a:r>
-              <a:rPr lang="en-US" dirty="0" smtClean="0"/>
-              <a:t>ER DIAGRAMM </a:t>
-            </a:r>
-            <a:r>
               <a:rPr lang="en-US" dirty="0"/>
-              <a:t>TEMPLATE</a:t>
+              <a:t>ER DIAGRAMM TEMPLATE</a:t>
             </a:r>
           </a:p>
         </p:txBody>
@@ -3229,436 +3204,827 @@
           <a:chExt cx="0" cy="0"/>
         </a:xfrm>
       </p:grpSpPr>
-      <p:sp>
-        <p:nvSpPr>
-          <p:cNvPr id="51" name="Rectangle 50"/>
-          <p:cNvSpPr/>
-          <p:nvPr/>
-        </p:nvSpPr>
-        <p:spPr>
-          <a:xfrm>
-            <a:off x="635970" y="224804"/>
-            <a:ext cx="1803043" cy="2428643"/>
-          </a:xfrm>
-          <a:prstGeom prst="rect">
-            <a:avLst/>
-          </a:prstGeom>
-        </p:spPr>
-        <p:style>
-          <a:lnRef idx="2">
-            <a:schemeClr val="dk1"/>
-          </a:lnRef>
-          <a:fillRef idx="1">
-            <a:schemeClr val="lt1"/>
-          </a:fillRef>
-          <a:effectRef idx="0">
-            <a:schemeClr val="dk1"/>
-          </a:effectRef>
-          <a:fontRef idx="minor">
-            <a:schemeClr val="dk1"/>
-          </a:fontRef>
-        </p:style>
-        <p:txBody>
-          <a:bodyPr rtlCol="0" anchor="ctr"/>
-          <a:lstStyle/>
-          <a:p>
-            <a:pPr algn="ctr"/>
-            <a:endParaRPr lang="en-US"/>
-          </a:p>
-        </p:txBody>
-      </p:sp>
-      <p:sp>
-        <p:nvSpPr>
-          <p:cNvPr id="52" name="TextBox 51"/>
-          <p:cNvSpPr txBox="1"/>
-          <p:nvPr/>
-        </p:nvSpPr>
-        <p:spPr>
-          <a:xfrm>
-            <a:off x="1117343" y="314958"/>
-            <a:ext cx="633507" cy="369332"/>
-          </a:xfrm>
-          <a:prstGeom prst="rect">
-            <a:avLst/>
-          </a:prstGeom>
-          <a:noFill/>
-        </p:spPr>
-        <p:txBody>
-          <a:bodyPr wrap="none" rtlCol="0">
-            <a:spAutoFit/>
-          </a:bodyPr>
-          <a:lstStyle/>
-          <a:p>
-            <a:r>
-              <a:rPr lang="en-US" b="1" dirty="0" smtClean="0"/>
-              <a:t>class</a:t>
-            </a:r>
-            <a:endParaRPr lang="en-US" b="1" dirty="0"/>
-          </a:p>
-        </p:txBody>
-      </p:sp>
-      <p:sp>
-        <p:nvSpPr>
-          <p:cNvPr id="53" name="Rectangle 52"/>
-          <p:cNvSpPr/>
-          <p:nvPr/>
-        </p:nvSpPr>
-        <p:spPr>
-          <a:xfrm>
-            <a:off x="3301896" y="224804"/>
-            <a:ext cx="1803043" cy="2428643"/>
-          </a:xfrm>
-          <a:prstGeom prst="rect">
-            <a:avLst/>
-          </a:prstGeom>
-        </p:spPr>
-        <p:style>
-          <a:lnRef idx="2">
-            <a:schemeClr val="dk1"/>
-          </a:lnRef>
-          <a:fillRef idx="1">
-            <a:schemeClr val="lt1"/>
-          </a:fillRef>
-          <a:effectRef idx="0">
-            <a:schemeClr val="dk1"/>
-          </a:effectRef>
-          <a:fontRef idx="minor">
-            <a:schemeClr val="dk1"/>
-          </a:fontRef>
-        </p:style>
-        <p:txBody>
-          <a:bodyPr rtlCol="0" anchor="ctr"/>
-          <a:lstStyle/>
-          <a:p>
-            <a:pPr algn="ctr"/>
-            <a:endParaRPr lang="en-US"/>
-          </a:p>
-        </p:txBody>
-      </p:sp>
-      <p:sp>
-        <p:nvSpPr>
-          <p:cNvPr id="54" name="TextBox 53"/>
-          <p:cNvSpPr txBox="1"/>
-          <p:nvPr/>
-        </p:nvSpPr>
-        <p:spPr>
-          <a:xfrm>
-            <a:off x="3783269" y="314958"/>
-            <a:ext cx="917367" cy="369332"/>
-          </a:xfrm>
-          <a:prstGeom prst="rect">
-            <a:avLst/>
-          </a:prstGeom>
-          <a:noFill/>
-        </p:spPr>
-        <p:txBody>
-          <a:bodyPr wrap="none" rtlCol="0">
-            <a:spAutoFit/>
-          </a:bodyPr>
-          <a:lstStyle/>
-          <a:p>
-            <a:r>
-              <a:rPr lang="en-US" b="1" dirty="0" smtClean="0"/>
-              <a:t>student</a:t>
-            </a:r>
-            <a:endParaRPr lang="en-US" b="1" dirty="0"/>
-          </a:p>
-        </p:txBody>
-      </p:sp>
-      <p:sp>
-        <p:nvSpPr>
-          <p:cNvPr id="55" name="Rectangle 54"/>
-          <p:cNvSpPr/>
-          <p:nvPr/>
-        </p:nvSpPr>
-        <p:spPr>
-          <a:xfrm>
-            <a:off x="5967822" y="224804"/>
-            <a:ext cx="1803043" cy="2428643"/>
-          </a:xfrm>
-          <a:prstGeom prst="rect">
-            <a:avLst/>
-          </a:prstGeom>
-        </p:spPr>
-        <p:style>
-          <a:lnRef idx="2">
-            <a:schemeClr val="dk1"/>
-          </a:lnRef>
-          <a:fillRef idx="1">
-            <a:schemeClr val="lt1"/>
-          </a:fillRef>
-          <a:effectRef idx="0">
-            <a:schemeClr val="dk1"/>
-          </a:effectRef>
-          <a:fontRef idx="minor">
-            <a:schemeClr val="dk1"/>
-          </a:fontRef>
-        </p:style>
-        <p:txBody>
-          <a:bodyPr rtlCol="0" anchor="ctr"/>
-          <a:lstStyle/>
-          <a:p>
-            <a:pPr algn="ctr"/>
-            <a:endParaRPr lang="en-US"/>
-          </a:p>
-        </p:txBody>
-      </p:sp>
-      <p:sp>
-        <p:nvSpPr>
-          <p:cNvPr id="56" name="TextBox 55"/>
-          <p:cNvSpPr txBox="1"/>
-          <p:nvPr/>
-        </p:nvSpPr>
-        <p:spPr>
-          <a:xfrm>
-            <a:off x="6209194" y="314959"/>
-            <a:ext cx="1320298" cy="369332"/>
-          </a:xfrm>
-          <a:prstGeom prst="rect">
-            <a:avLst/>
-          </a:prstGeom>
-          <a:noFill/>
-        </p:spPr>
-        <p:txBody>
-          <a:bodyPr wrap="none" rtlCol="0">
-            <a:spAutoFit/>
-          </a:bodyPr>
-          <a:lstStyle/>
-          <a:p>
-            <a:r>
-              <a:rPr lang="en-US" b="1" dirty="0" smtClean="0"/>
-              <a:t>exam_score</a:t>
-            </a:r>
-            <a:endParaRPr lang="en-US" b="1" dirty="0"/>
-          </a:p>
-        </p:txBody>
-      </p:sp>
-      <p:sp>
-        <p:nvSpPr>
-          <p:cNvPr id="57" name="Rectangle 56"/>
-          <p:cNvSpPr/>
-          <p:nvPr/>
-        </p:nvSpPr>
-        <p:spPr>
-          <a:xfrm>
-            <a:off x="9251935" y="224803"/>
-            <a:ext cx="1803043" cy="2428643"/>
-          </a:xfrm>
-          <a:prstGeom prst="rect">
-            <a:avLst/>
-          </a:prstGeom>
-        </p:spPr>
-        <p:style>
-          <a:lnRef idx="2">
-            <a:schemeClr val="dk1"/>
-          </a:lnRef>
-          <a:fillRef idx="1">
-            <a:schemeClr val="lt1"/>
-          </a:fillRef>
-          <a:effectRef idx="0">
-            <a:schemeClr val="dk1"/>
-          </a:effectRef>
-          <a:fontRef idx="minor">
-            <a:schemeClr val="dk1"/>
-          </a:fontRef>
-        </p:style>
-        <p:txBody>
-          <a:bodyPr rtlCol="0" anchor="ctr"/>
-          <a:lstStyle/>
-          <a:p>
-            <a:pPr algn="ctr"/>
-            <a:endParaRPr lang="en-US"/>
-          </a:p>
-        </p:txBody>
-      </p:sp>
-      <p:sp>
-        <p:nvSpPr>
-          <p:cNvPr id="58" name="TextBox 57"/>
-          <p:cNvSpPr txBox="1"/>
-          <p:nvPr/>
-        </p:nvSpPr>
-        <p:spPr>
-          <a:xfrm>
-            <a:off x="9493307" y="314958"/>
-            <a:ext cx="1243482" cy="369332"/>
-          </a:xfrm>
-          <a:prstGeom prst="rect">
-            <a:avLst/>
-          </a:prstGeom>
-          <a:noFill/>
-        </p:spPr>
-        <p:txBody>
-          <a:bodyPr wrap="none" rtlCol="0">
-            <a:spAutoFit/>
-          </a:bodyPr>
-          <a:lstStyle/>
-          <a:p>
-            <a:r>
-              <a:rPr lang="en-US" b="1" dirty="0" smtClean="0"/>
-              <a:t>exam_type</a:t>
-            </a:r>
-            <a:endParaRPr lang="en-US" b="1" dirty="0"/>
-          </a:p>
-        </p:txBody>
-      </p:sp>
-      <p:sp>
-        <p:nvSpPr>
-          <p:cNvPr id="59" name="Rectangle 58"/>
-          <p:cNvSpPr/>
-          <p:nvPr/>
-        </p:nvSpPr>
-        <p:spPr>
-          <a:xfrm>
-            <a:off x="5980354" y="4186801"/>
-            <a:ext cx="1803043" cy="2009105"/>
-          </a:xfrm>
-          <a:prstGeom prst="rect">
-            <a:avLst/>
-          </a:prstGeom>
-        </p:spPr>
-        <p:style>
-          <a:lnRef idx="2">
-            <a:schemeClr val="dk1"/>
-          </a:lnRef>
-          <a:fillRef idx="1">
-            <a:schemeClr val="lt1"/>
-          </a:fillRef>
-          <a:effectRef idx="0">
-            <a:schemeClr val="dk1"/>
-          </a:effectRef>
-          <a:fontRef idx="minor">
-            <a:schemeClr val="dk1"/>
-          </a:fontRef>
-        </p:style>
-        <p:txBody>
-          <a:bodyPr rtlCol="0" anchor="ctr"/>
-          <a:lstStyle/>
-          <a:p>
-            <a:pPr algn="ctr"/>
-            <a:endParaRPr lang="en-US"/>
-          </a:p>
-        </p:txBody>
-      </p:sp>
-      <p:sp>
-        <p:nvSpPr>
-          <p:cNvPr id="60" name="TextBox 59"/>
-          <p:cNvSpPr txBox="1"/>
-          <p:nvPr/>
-        </p:nvSpPr>
-        <p:spPr>
-          <a:xfrm>
-            <a:off x="6506612" y="4223154"/>
-            <a:ext cx="661720" cy="369332"/>
-          </a:xfrm>
-          <a:prstGeom prst="rect">
-            <a:avLst/>
-          </a:prstGeom>
-          <a:noFill/>
-        </p:spPr>
-        <p:txBody>
-          <a:bodyPr wrap="none" rtlCol="0">
-            <a:spAutoFit/>
-          </a:bodyPr>
-          <a:lstStyle/>
-          <a:p>
-            <a:r>
-              <a:rPr lang="en-US" b="1" dirty="0" smtClean="0"/>
-              <a:t>topic</a:t>
-            </a:r>
-            <a:endParaRPr lang="en-US" b="1" dirty="0"/>
-          </a:p>
-        </p:txBody>
-      </p:sp>
-      <p:sp>
-        <p:nvSpPr>
-          <p:cNvPr id="61" name="Rectangle 60"/>
-          <p:cNvSpPr/>
-          <p:nvPr/>
-        </p:nvSpPr>
-        <p:spPr>
-          <a:xfrm>
-            <a:off x="630766" y="4186801"/>
-            <a:ext cx="1803043" cy="2009105"/>
-          </a:xfrm>
-          <a:prstGeom prst="rect">
-            <a:avLst/>
-          </a:prstGeom>
-        </p:spPr>
-        <p:style>
-          <a:lnRef idx="2">
-            <a:schemeClr val="dk1"/>
-          </a:lnRef>
-          <a:fillRef idx="1">
-            <a:schemeClr val="lt1"/>
-          </a:fillRef>
-          <a:effectRef idx="0">
-            <a:schemeClr val="dk1"/>
-          </a:effectRef>
-          <a:fontRef idx="minor">
-            <a:schemeClr val="dk1"/>
-          </a:fontRef>
-        </p:style>
-        <p:txBody>
-          <a:bodyPr rtlCol="0" anchor="ctr"/>
-          <a:lstStyle/>
-          <a:p>
-            <a:pPr algn="ctr"/>
-            <a:endParaRPr lang="en-US"/>
-          </a:p>
-        </p:txBody>
-      </p:sp>
-      <p:sp>
-        <p:nvSpPr>
-          <p:cNvPr id="62" name="TextBox 61"/>
-          <p:cNvSpPr txBox="1"/>
-          <p:nvPr/>
-        </p:nvSpPr>
-        <p:spPr>
-          <a:xfrm>
-            <a:off x="1174014" y="4289834"/>
-            <a:ext cx="716543" cy="369332"/>
-          </a:xfrm>
-          <a:prstGeom prst="rect">
-            <a:avLst/>
-          </a:prstGeom>
-          <a:noFill/>
-        </p:spPr>
-        <p:txBody>
-          <a:bodyPr wrap="none" rtlCol="0">
-            <a:spAutoFit/>
-          </a:bodyPr>
-          <a:lstStyle/>
-          <a:p>
-            <a:r>
-              <a:rPr lang="en-US" b="1" dirty="0" smtClean="0"/>
-              <a:t>batch</a:t>
-            </a:r>
-            <a:endParaRPr lang="en-US" b="1" dirty="0"/>
-          </a:p>
-        </p:txBody>
-      </p:sp>
+      <p:graphicFrame>
+        <p:nvGraphicFramePr>
+          <p:cNvPr id="114" name="Table 8">
+            <a:extLst>
+              <a:ext uri="{FF2B5EF4-FFF2-40B4-BE49-F238E27FC236}">
+                <a16:creationId xmlns:a16="http://schemas.microsoft.com/office/drawing/2014/main" id="{FEC30D0E-E36F-4791-B959-E7F76032C2BA}"/>
+              </a:ext>
+            </a:extLst>
+          </p:cNvPr>
+          <p:cNvGraphicFramePr>
+            <a:graphicFrameLocks noGrp="1"/>
+          </p:cNvGraphicFramePr>
+          <p:nvPr>
+            <p:extLst>
+              <p:ext uri="{D42A27DB-BD31-4B8C-83A1-F6EECF244321}">
+                <p14:modId xmlns:p14="http://schemas.microsoft.com/office/powerpoint/2010/main" val="1805782902"/>
+              </p:ext>
+            </p:extLst>
+          </p:nvPr>
+        </p:nvGraphicFramePr>
+        <p:xfrm>
+          <a:off x="628897" y="1662284"/>
+          <a:ext cx="2646017" cy="2407221"/>
+        </p:xfrm>
+        <a:graphic>
+          <a:graphicData uri="http://schemas.openxmlformats.org/drawingml/2006/table">
+            <a:tbl>
+              <a:tblPr firstRow="1" bandRow="1">
+                <a:tableStyleId>{5C22544A-7EE6-4342-B048-85BDC9FD1C3A}</a:tableStyleId>
+              </a:tblPr>
+              <a:tblGrid>
+                <a:gridCol w="499166">
+                  <a:extLst>
+                    <a:ext uri="{9D8B030D-6E8A-4147-A177-3AD203B41FA5}">
+                      <a16:colId xmlns:a16="http://schemas.microsoft.com/office/drawing/2014/main" val="3052149917"/>
+                    </a:ext>
+                  </a:extLst>
+                </a:gridCol>
+                <a:gridCol w="2146851">
+                  <a:extLst>
+                    <a:ext uri="{9D8B030D-6E8A-4147-A177-3AD203B41FA5}">
+                      <a16:colId xmlns:a16="http://schemas.microsoft.com/office/drawing/2014/main" val="849940379"/>
+                    </a:ext>
+                  </a:extLst>
+                </a:gridCol>
+              </a:tblGrid>
+              <a:tr h="395541">
+                <a:tc gridSpan="2">
+                  <a:txBody>
+                    <a:bodyPr/>
+                    <a:lstStyle/>
+                    <a:p>
+                      <a:r>
+                        <a:rPr lang="en-US" dirty="0"/>
+                        <a:t>              Event</a:t>
+                      </a:r>
+                    </a:p>
+                  </a:txBody>
+                  <a:tcPr/>
+                </a:tc>
+                <a:tc hMerge="1">
+                  <a:txBody>
+                    <a:bodyPr/>
+                    <a:lstStyle/>
+                    <a:p>
+                      <a:endParaRPr lang="en-US" dirty="0"/>
+                    </a:p>
+                  </a:txBody>
+                  <a:tcPr/>
+                </a:tc>
+                <a:extLst>
+                  <a:ext uri="{0D108BD9-81ED-4DB2-BD59-A6C34878D82A}">
+                    <a16:rowId xmlns:a16="http://schemas.microsoft.com/office/drawing/2014/main" val="1300100705"/>
+                  </a:ext>
+                </a:extLst>
+              </a:tr>
+              <a:tr h="395541">
+                <a:tc>
+                  <a:txBody>
+                    <a:bodyPr/>
+                    <a:lstStyle/>
+                    <a:p>
+                      <a:r>
+                        <a:rPr lang="en-US" sz="1400" dirty="0"/>
+                        <a:t>Pk</a:t>
+                      </a:r>
+                    </a:p>
+                    <a:p>
+                      <a:endParaRPr lang="en-US" sz="1600" dirty="0"/>
+                    </a:p>
+                    <a:p>
+                      <a:endParaRPr lang="en-US" sz="1600" dirty="0"/>
+                    </a:p>
+                    <a:p>
+                      <a:endParaRPr lang="en-US" sz="1600" dirty="0"/>
+                    </a:p>
+                    <a:p>
+                      <a:endParaRPr lang="en-US" sz="1600" dirty="0"/>
+                    </a:p>
+                    <a:p>
+                      <a:endParaRPr lang="en-US" sz="1200" dirty="0"/>
+                    </a:p>
+                    <a:p>
+                      <a:r>
+                        <a:rPr lang="en-US" sz="1200" dirty="0" err="1"/>
+                        <a:t>Fk</a:t>
+                      </a:r>
+                      <a:endParaRPr lang="en-US" sz="1200" dirty="0"/>
+                    </a:p>
+                    <a:p>
+                      <a:r>
+                        <a:rPr lang="en-US" sz="1200" dirty="0" err="1"/>
+                        <a:t>Fk</a:t>
+                      </a:r>
+                      <a:endParaRPr lang="en-US" sz="1200" dirty="0"/>
+                    </a:p>
+                    <a:p>
+                      <a:r>
+                        <a:rPr lang="en-US" sz="1200" dirty="0" err="1"/>
+                        <a:t>Fk</a:t>
+                      </a:r>
+                      <a:endParaRPr lang="en-US" sz="1200" dirty="0"/>
+                    </a:p>
+                  </a:txBody>
+                  <a:tcPr/>
+                </a:tc>
+                <a:tc>
+                  <a:txBody>
+                    <a:bodyPr/>
+                    <a:lstStyle/>
+                    <a:p>
+                      <a:r>
+                        <a:rPr lang="en-US" sz="1400" dirty="0"/>
+                        <a:t>id </a:t>
+                      </a:r>
+                      <a:r>
+                        <a:rPr lang="en-US" sz="1400" dirty="0">
+                          <a:solidFill>
+                            <a:srgbClr val="FF0000"/>
+                          </a:solidFill>
+                        </a:rPr>
+                        <a:t>int </a:t>
+                      </a:r>
+                    </a:p>
+                    <a:p>
+                      <a:r>
+                        <a:rPr lang="en-US" sz="1400" dirty="0"/>
+                        <a:t>title </a:t>
+                      </a:r>
+                      <a:r>
+                        <a:rPr lang="en-US" sz="1400" dirty="0">
+                          <a:solidFill>
+                            <a:srgbClr val="FF0000"/>
+                          </a:solidFill>
+                        </a:rPr>
+                        <a:t>string</a:t>
+                      </a:r>
+                    </a:p>
+                    <a:p>
+                      <a:r>
+                        <a:rPr lang="en-US" sz="1400" dirty="0" err="1"/>
+                        <a:t>startAt</a:t>
+                      </a:r>
+                      <a:r>
+                        <a:rPr lang="en-US" sz="1400" dirty="0"/>
+                        <a:t> </a:t>
+                      </a:r>
+                      <a:r>
+                        <a:rPr lang="en-US" sz="1400" dirty="0">
+                          <a:solidFill>
+                            <a:srgbClr val="FF0000"/>
+                          </a:solidFill>
+                        </a:rPr>
+                        <a:t>string</a:t>
+                      </a:r>
+                    </a:p>
+                    <a:p>
+                      <a:r>
+                        <a:rPr lang="en-US" sz="1400" dirty="0" err="1"/>
+                        <a:t>endAt</a:t>
+                      </a:r>
+                      <a:r>
+                        <a:rPr lang="en-US" sz="1400" dirty="0"/>
+                        <a:t> </a:t>
+                      </a:r>
+                      <a:r>
+                        <a:rPr lang="en-US" sz="1400" dirty="0">
+                          <a:solidFill>
+                            <a:srgbClr val="FF0000"/>
+                          </a:solidFill>
+                        </a:rPr>
+                        <a:t>string</a:t>
+                      </a:r>
+                    </a:p>
+                    <a:p>
+                      <a:r>
+                        <a:rPr lang="en-US" sz="1400" dirty="0"/>
+                        <a:t>description </a:t>
+                      </a:r>
+                      <a:r>
+                        <a:rPr lang="en-US" sz="1400" dirty="0">
+                          <a:solidFill>
+                            <a:srgbClr val="FF0000"/>
+                          </a:solidFill>
+                        </a:rPr>
+                        <a:t>string</a:t>
+                      </a:r>
+                    </a:p>
+                    <a:p>
+                      <a:r>
+                        <a:rPr lang="en-US" sz="1400" dirty="0"/>
+                        <a:t>image </a:t>
+                      </a:r>
+                      <a:r>
+                        <a:rPr lang="en-US" sz="1400" dirty="0">
+                          <a:solidFill>
+                            <a:srgbClr val="FF0000"/>
+                          </a:solidFill>
+                        </a:rPr>
+                        <a:t>string </a:t>
+                      </a:r>
+                    </a:p>
+                    <a:p>
+                      <a:r>
+                        <a:rPr lang="en-US" sz="1400" dirty="0" err="1">
+                          <a:solidFill>
+                            <a:schemeClr val="tx1"/>
+                          </a:solidFill>
+                        </a:rPr>
+                        <a:t>location_id</a:t>
+                      </a:r>
+                      <a:endParaRPr lang="en-US" sz="1400" dirty="0">
+                        <a:solidFill>
+                          <a:schemeClr val="tx1"/>
+                        </a:solidFill>
+                      </a:endParaRPr>
+                    </a:p>
+                    <a:p>
+                      <a:r>
+                        <a:rPr lang="en-US" sz="1400" dirty="0" err="1"/>
+                        <a:t>user_id</a:t>
+                      </a:r>
+                      <a:r>
+                        <a:rPr lang="en-US" sz="1400" dirty="0"/>
+                        <a:t> </a:t>
+                      </a:r>
+                      <a:r>
+                        <a:rPr lang="en-US" sz="1400" dirty="0">
+                          <a:solidFill>
+                            <a:srgbClr val="FF0000"/>
+                          </a:solidFill>
+                        </a:rPr>
+                        <a:t>int</a:t>
+                      </a:r>
+                    </a:p>
+                    <a:p>
+                      <a:r>
+                        <a:rPr lang="en-US" sz="1400" dirty="0"/>
+                        <a:t>category_id </a:t>
+                      </a:r>
+                      <a:r>
+                        <a:rPr lang="en-US" sz="1400" dirty="0">
+                          <a:solidFill>
+                            <a:srgbClr val="FF0000"/>
+                          </a:solidFill>
+                        </a:rPr>
+                        <a:t>int</a:t>
+                      </a:r>
+                    </a:p>
+                  </a:txBody>
+                  <a:tcPr/>
+                </a:tc>
+                <a:extLst>
+                  <a:ext uri="{0D108BD9-81ED-4DB2-BD59-A6C34878D82A}">
+                    <a16:rowId xmlns:a16="http://schemas.microsoft.com/office/drawing/2014/main" val="4232249410"/>
+                  </a:ext>
+                </a:extLst>
+              </a:tr>
+            </a:tbl>
+          </a:graphicData>
+        </a:graphic>
+      </p:graphicFrame>
+      <p:graphicFrame>
+        <p:nvGraphicFramePr>
+          <p:cNvPr id="115" name="Table 114">
+            <a:extLst>
+              <a:ext uri="{FF2B5EF4-FFF2-40B4-BE49-F238E27FC236}">
+                <a16:creationId xmlns:a16="http://schemas.microsoft.com/office/drawing/2014/main" id="{8B3DAF70-C21A-4783-8B92-CF9E9AC2E088}"/>
+              </a:ext>
+            </a:extLst>
+          </p:cNvPr>
+          <p:cNvGraphicFramePr>
+            <a:graphicFrameLocks noGrp="1"/>
+          </p:cNvGraphicFramePr>
+          <p:nvPr>
+            <p:extLst>
+              <p:ext uri="{D42A27DB-BD31-4B8C-83A1-F6EECF244321}">
+                <p14:modId xmlns:p14="http://schemas.microsoft.com/office/powerpoint/2010/main" val="1469777984"/>
+              </p:ext>
+            </p:extLst>
+          </p:nvPr>
+        </p:nvGraphicFramePr>
+        <p:xfrm>
+          <a:off x="7865165" y="2117756"/>
+          <a:ext cx="2241828" cy="1767141"/>
+        </p:xfrm>
+        <a:graphic>
+          <a:graphicData uri="http://schemas.openxmlformats.org/drawingml/2006/table">
+            <a:tbl>
+              <a:tblPr firstRow="1" bandRow="1">
+                <a:tableStyleId>{5C22544A-7EE6-4342-B048-85BDC9FD1C3A}</a:tableStyleId>
+              </a:tblPr>
+              <a:tblGrid>
+                <a:gridCol w="422917">
+                  <a:extLst>
+                    <a:ext uri="{9D8B030D-6E8A-4147-A177-3AD203B41FA5}">
+                      <a16:colId xmlns:a16="http://schemas.microsoft.com/office/drawing/2014/main" val="3052149917"/>
+                    </a:ext>
+                  </a:extLst>
+                </a:gridCol>
+                <a:gridCol w="1818911">
+                  <a:extLst>
+                    <a:ext uri="{9D8B030D-6E8A-4147-A177-3AD203B41FA5}">
+                      <a16:colId xmlns:a16="http://schemas.microsoft.com/office/drawing/2014/main" val="849940379"/>
+                    </a:ext>
+                  </a:extLst>
+                </a:gridCol>
+              </a:tblGrid>
+              <a:tr h="395541">
+                <a:tc gridSpan="2">
+                  <a:txBody>
+                    <a:bodyPr/>
+                    <a:lstStyle/>
+                    <a:p>
+                      <a:r>
+                        <a:rPr lang="en-US" dirty="0"/>
+                        <a:t>              User</a:t>
+                      </a:r>
+                    </a:p>
+                  </a:txBody>
+                  <a:tcPr/>
+                </a:tc>
+                <a:tc hMerge="1">
+                  <a:txBody>
+                    <a:bodyPr/>
+                    <a:lstStyle/>
+                    <a:p>
+                      <a:endParaRPr lang="en-US" dirty="0"/>
+                    </a:p>
+                  </a:txBody>
+                  <a:tcPr/>
+                </a:tc>
+                <a:extLst>
+                  <a:ext uri="{0D108BD9-81ED-4DB2-BD59-A6C34878D82A}">
+                    <a16:rowId xmlns:a16="http://schemas.microsoft.com/office/drawing/2014/main" val="1300100705"/>
+                  </a:ext>
+                </a:extLst>
+              </a:tr>
+              <a:tr h="395541">
+                <a:tc>
+                  <a:txBody>
+                    <a:bodyPr/>
+                    <a:lstStyle/>
+                    <a:p>
+                      <a:r>
+                        <a:rPr lang="en-US" sz="1400" dirty="0"/>
+                        <a:t>Pk</a:t>
+                      </a:r>
+                    </a:p>
+                    <a:p>
+                      <a:endParaRPr lang="en-US" sz="1600" dirty="0"/>
+                    </a:p>
+                    <a:p>
+                      <a:endParaRPr lang="en-US" sz="1600" dirty="0"/>
+                    </a:p>
+                    <a:p>
+                      <a:endParaRPr lang="en-US" sz="1600" dirty="0"/>
+                    </a:p>
+                    <a:p>
+                      <a:endParaRPr lang="en-US" sz="1600" dirty="0"/>
+                    </a:p>
+                  </a:txBody>
+                  <a:tcPr/>
+                </a:tc>
+                <a:tc>
+                  <a:txBody>
+                    <a:bodyPr/>
+                    <a:lstStyle/>
+                    <a:p>
+                      <a:r>
+                        <a:rPr lang="en-US" sz="1400" dirty="0"/>
+                        <a:t>id  </a:t>
+                      </a:r>
+                      <a:r>
+                        <a:rPr lang="en-US" sz="1400" dirty="0">
+                          <a:solidFill>
+                            <a:srgbClr val="FF0000"/>
+                          </a:solidFill>
+                        </a:rPr>
+                        <a:t>int</a:t>
+                      </a:r>
+                    </a:p>
+                    <a:p>
+                      <a:r>
+                        <a:rPr lang="en-US" sz="1400" dirty="0"/>
+                        <a:t>first _name </a:t>
+                      </a:r>
+                      <a:r>
+                        <a:rPr lang="en-US" sz="1400" dirty="0">
+                          <a:solidFill>
+                            <a:srgbClr val="FF0000"/>
+                          </a:solidFill>
+                        </a:rPr>
+                        <a:t>string</a:t>
+                      </a:r>
+                    </a:p>
+                    <a:p>
+                      <a:r>
+                        <a:rPr lang="en-US" sz="1400" dirty="0">
+                          <a:solidFill>
+                            <a:schemeClr val="tx1"/>
+                          </a:solidFill>
+                        </a:rPr>
+                        <a:t>last_name </a:t>
+                      </a:r>
+                      <a:r>
+                        <a:rPr lang="en-US" sz="1400" dirty="0">
+                          <a:solidFill>
+                            <a:srgbClr val="FF0000"/>
+                          </a:solidFill>
+                        </a:rPr>
+                        <a:t>string</a:t>
+                      </a:r>
+                    </a:p>
+                    <a:p>
+                      <a:r>
+                        <a:rPr lang="en-US" sz="1400" dirty="0"/>
+                        <a:t>email </a:t>
+                      </a:r>
+                      <a:r>
+                        <a:rPr lang="en-US" sz="1400" dirty="0">
+                          <a:solidFill>
+                            <a:srgbClr val="FF0000"/>
+                          </a:solidFill>
+                        </a:rPr>
+                        <a:t>string</a:t>
+                      </a:r>
+                    </a:p>
+                    <a:p>
+                      <a:r>
+                        <a:rPr lang="en-US" sz="1400" dirty="0"/>
+                        <a:t>password </a:t>
+                      </a:r>
+                      <a:r>
+                        <a:rPr lang="en-US" sz="1400" dirty="0">
+                          <a:solidFill>
+                            <a:srgbClr val="FF0000"/>
+                          </a:solidFill>
+                        </a:rPr>
+                        <a:t>int</a:t>
+                      </a:r>
+                    </a:p>
+                    <a:p>
+                      <a:r>
+                        <a:rPr lang="en-US" sz="1400" dirty="0"/>
+                        <a:t>phone number </a:t>
+                      </a:r>
+                      <a:r>
+                        <a:rPr lang="en-US" sz="1400" dirty="0">
+                          <a:solidFill>
+                            <a:srgbClr val="FF0000"/>
+                          </a:solidFill>
+                        </a:rPr>
+                        <a:t>int</a:t>
+                      </a:r>
+                    </a:p>
+                  </a:txBody>
+                  <a:tcPr/>
+                </a:tc>
+                <a:extLst>
+                  <a:ext uri="{0D108BD9-81ED-4DB2-BD59-A6C34878D82A}">
+                    <a16:rowId xmlns:a16="http://schemas.microsoft.com/office/drawing/2014/main" val="4232249410"/>
+                  </a:ext>
+                </a:extLst>
+              </a:tr>
+            </a:tbl>
+          </a:graphicData>
+        </a:graphic>
+      </p:graphicFrame>
+      <p:graphicFrame>
+        <p:nvGraphicFramePr>
+          <p:cNvPr id="116" name="Table 115">
+            <a:extLst>
+              <a:ext uri="{FF2B5EF4-FFF2-40B4-BE49-F238E27FC236}">
+                <a16:creationId xmlns:a16="http://schemas.microsoft.com/office/drawing/2014/main" id="{6A2A2671-F1BF-4464-90A6-C37FE3868FE8}"/>
+              </a:ext>
+            </a:extLst>
+          </p:cNvPr>
+          <p:cNvGraphicFramePr>
+            <a:graphicFrameLocks noGrp="1"/>
+          </p:cNvGraphicFramePr>
+          <p:nvPr>
+            <p:extLst>
+              <p:ext uri="{D42A27DB-BD31-4B8C-83A1-F6EECF244321}">
+                <p14:modId xmlns:p14="http://schemas.microsoft.com/office/powerpoint/2010/main" val="826780045"/>
+              </p:ext>
+            </p:extLst>
+          </p:nvPr>
+        </p:nvGraphicFramePr>
+        <p:xfrm>
+          <a:off x="4837048" y="4423342"/>
+          <a:ext cx="1702903" cy="1099044"/>
+        </p:xfrm>
+        <a:graphic>
+          <a:graphicData uri="http://schemas.openxmlformats.org/drawingml/2006/table">
+            <a:tbl>
+              <a:tblPr firstRow="1" bandRow="1">
+                <a:tableStyleId>{5C22544A-7EE6-4342-B048-85BDC9FD1C3A}</a:tableStyleId>
+              </a:tblPr>
+              <a:tblGrid>
+                <a:gridCol w="441080">
+                  <a:extLst>
+                    <a:ext uri="{9D8B030D-6E8A-4147-A177-3AD203B41FA5}">
+                      <a16:colId xmlns:a16="http://schemas.microsoft.com/office/drawing/2014/main" val="3052149917"/>
+                    </a:ext>
+                  </a:extLst>
+                </a:gridCol>
+                <a:gridCol w="1261823">
+                  <a:extLst>
+                    <a:ext uri="{9D8B030D-6E8A-4147-A177-3AD203B41FA5}">
+                      <a16:colId xmlns:a16="http://schemas.microsoft.com/office/drawing/2014/main" val="849940379"/>
+                    </a:ext>
+                  </a:extLst>
+                </a:gridCol>
+              </a:tblGrid>
+              <a:tr h="288735">
+                <a:tc gridSpan="2">
+                  <a:txBody>
+                    <a:bodyPr/>
+                    <a:lstStyle/>
+                    <a:p>
+                      <a:r>
+                        <a:rPr lang="en-US" dirty="0"/>
+                        <a:t>          Join</a:t>
+                      </a:r>
+                    </a:p>
+                  </a:txBody>
+                  <a:tcPr/>
+                </a:tc>
+                <a:tc hMerge="1">
+                  <a:txBody>
+                    <a:bodyPr/>
+                    <a:lstStyle/>
+                    <a:p>
+                      <a:endParaRPr lang="en-US" dirty="0"/>
+                    </a:p>
+                  </a:txBody>
+                  <a:tcPr/>
+                </a:tc>
+                <a:extLst>
+                  <a:ext uri="{0D108BD9-81ED-4DB2-BD59-A6C34878D82A}">
+                    <a16:rowId xmlns:a16="http://schemas.microsoft.com/office/drawing/2014/main" val="1300100705"/>
+                  </a:ext>
+                </a:extLst>
+              </a:tr>
+              <a:tr h="733284">
+                <a:tc>
+                  <a:txBody>
+                    <a:bodyPr/>
+                    <a:lstStyle/>
+                    <a:p>
+                      <a:r>
+                        <a:rPr lang="en-US" sz="1400" dirty="0"/>
+                        <a:t>Pk</a:t>
+                      </a:r>
+                    </a:p>
+                    <a:p>
+                      <a:r>
+                        <a:rPr lang="en-US" sz="1400" dirty="0" err="1"/>
+                        <a:t>Fk</a:t>
+                      </a:r>
+                      <a:endParaRPr lang="en-US" sz="1400" dirty="0"/>
+                    </a:p>
+                    <a:p>
+                      <a:r>
+                        <a:rPr lang="en-US" sz="1400" dirty="0" err="1"/>
+                        <a:t>Fk</a:t>
+                      </a:r>
+                      <a:endParaRPr lang="en-US" sz="1400" dirty="0"/>
+                    </a:p>
+                  </a:txBody>
+                  <a:tcPr/>
+                </a:tc>
+                <a:tc>
+                  <a:txBody>
+                    <a:bodyPr/>
+                    <a:lstStyle/>
+                    <a:p>
+                      <a:r>
+                        <a:rPr lang="en-US" sz="1400" dirty="0">
+                          <a:solidFill>
+                            <a:schemeClr val="tx1"/>
+                          </a:solidFill>
+                        </a:rPr>
+                        <a:t>id </a:t>
+                      </a:r>
+                      <a:r>
+                        <a:rPr lang="en-US" sz="1400" dirty="0">
+                          <a:solidFill>
+                            <a:srgbClr val="FF0000"/>
+                          </a:solidFill>
+                        </a:rPr>
+                        <a:t>int</a:t>
+                      </a:r>
+                    </a:p>
+                    <a:p>
+                      <a:r>
+                        <a:rPr lang="en-US" sz="1400" dirty="0">
+                          <a:solidFill>
+                            <a:schemeClr val="tx1"/>
+                          </a:solidFill>
+                        </a:rPr>
+                        <a:t>user_id </a:t>
+                      </a:r>
+                      <a:r>
+                        <a:rPr lang="en-US" sz="1400" dirty="0">
+                          <a:solidFill>
+                            <a:srgbClr val="FF0000"/>
+                          </a:solidFill>
+                        </a:rPr>
+                        <a:t>int</a:t>
+                      </a:r>
+                    </a:p>
+                    <a:p>
+                      <a:r>
+                        <a:rPr lang="en-US" sz="1400" dirty="0">
+                          <a:solidFill>
+                            <a:schemeClr val="tx1"/>
+                          </a:solidFill>
+                        </a:rPr>
+                        <a:t>event_id </a:t>
+                      </a:r>
+                      <a:r>
+                        <a:rPr lang="en-US" sz="1400" dirty="0">
+                          <a:solidFill>
+                            <a:srgbClr val="FF0000"/>
+                          </a:solidFill>
+                        </a:rPr>
+                        <a:t>int</a:t>
+                      </a:r>
+                    </a:p>
+                  </a:txBody>
+                  <a:tcPr/>
+                </a:tc>
+                <a:extLst>
+                  <a:ext uri="{0D108BD9-81ED-4DB2-BD59-A6C34878D82A}">
+                    <a16:rowId xmlns:a16="http://schemas.microsoft.com/office/drawing/2014/main" val="4232249410"/>
+                  </a:ext>
+                </a:extLst>
+              </a:tr>
+            </a:tbl>
+          </a:graphicData>
+        </a:graphic>
+      </p:graphicFrame>
+      <p:graphicFrame>
+        <p:nvGraphicFramePr>
+          <p:cNvPr id="117" name="Table 116">
+            <a:extLst>
+              <a:ext uri="{FF2B5EF4-FFF2-40B4-BE49-F238E27FC236}">
+                <a16:creationId xmlns:a16="http://schemas.microsoft.com/office/drawing/2014/main" id="{EBBEB26D-5773-4D6C-A8FE-44900290382C}"/>
+              </a:ext>
+            </a:extLst>
+          </p:cNvPr>
+          <p:cNvGraphicFramePr>
+            <a:graphicFrameLocks noGrp="1"/>
+          </p:cNvGraphicFramePr>
+          <p:nvPr>
+            <p:extLst>
+              <p:ext uri="{D42A27DB-BD31-4B8C-83A1-F6EECF244321}">
+                <p14:modId xmlns:p14="http://schemas.microsoft.com/office/powerpoint/2010/main" val="2983445085"/>
+              </p:ext>
+            </p:extLst>
+          </p:nvPr>
+        </p:nvGraphicFramePr>
+        <p:xfrm>
+          <a:off x="4479238" y="960907"/>
+          <a:ext cx="2241828" cy="949472"/>
+        </p:xfrm>
+        <a:graphic>
+          <a:graphicData uri="http://schemas.openxmlformats.org/drawingml/2006/table">
+            <a:tbl>
+              <a:tblPr firstRow="1" bandRow="1">
+                <a:tableStyleId>{5C22544A-7EE6-4342-B048-85BDC9FD1C3A}</a:tableStyleId>
+              </a:tblPr>
+              <a:tblGrid>
+                <a:gridCol w="422917">
+                  <a:extLst>
+                    <a:ext uri="{9D8B030D-6E8A-4147-A177-3AD203B41FA5}">
+                      <a16:colId xmlns:a16="http://schemas.microsoft.com/office/drawing/2014/main" val="3052149917"/>
+                    </a:ext>
+                  </a:extLst>
+                </a:gridCol>
+                <a:gridCol w="1818911">
+                  <a:extLst>
+                    <a:ext uri="{9D8B030D-6E8A-4147-A177-3AD203B41FA5}">
+                      <a16:colId xmlns:a16="http://schemas.microsoft.com/office/drawing/2014/main" val="849940379"/>
+                    </a:ext>
+                  </a:extLst>
+                </a:gridCol>
+              </a:tblGrid>
+              <a:tr h="285383">
+                <a:tc gridSpan="2">
+                  <a:txBody>
+                    <a:bodyPr/>
+                    <a:lstStyle/>
+                    <a:p>
+                      <a:r>
+                        <a:rPr lang="en-US" dirty="0"/>
+                        <a:t>            Category </a:t>
+                      </a:r>
+                    </a:p>
+                  </a:txBody>
+                  <a:tcPr/>
+                </a:tc>
+                <a:tc hMerge="1">
+                  <a:txBody>
+                    <a:bodyPr/>
+                    <a:lstStyle/>
+                    <a:p>
+                      <a:endParaRPr lang="en-US" dirty="0"/>
+                    </a:p>
+                  </a:txBody>
+                  <a:tcPr/>
+                </a:tc>
+                <a:extLst>
+                  <a:ext uri="{0D108BD9-81ED-4DB2-BD59-A6C34878D82A}">
+                    <a16:rowId xmlns:a16="http://schemas.microsoft.com/office/drawing/2014/main" val="1300100705"/>
+                  </a:ext>
+                </a:extLst>
+              </a:tr>
+              <a:tr h="583712">
+                <a:tc>
+                  <a:txBody>
+                    <a:bodyPr/>
+                    <a:lstStyle/>
+                    <a:p>
+                      <a:r>
+                        <a:rPr lang="en-US" sz="1400" dirty="0"/>
+                        <a:t>Pk</a:t>
+                      </a:r>
+                    </a:p>
+                  </a:txBody>
+                  <a:tcPr/>
+                </a:tc>
+                <a:tc>
+                  <a:txBody>
+                    <a:bodyPr/>
+                    <a:lstStyle/>
+                    <a:p>
+                      <a:r>
+                        <a:rPr lang="en-US" sz="1400" dirty="0"/>
+                        <a:t>id </a:t>
+                      </a:r>
+                      <a:r>
+                        <a:rPr lang="en-US" sz="1400" dirty="0">
+                          <a:solidFill>
+                            <a:srgbClr val="FF0000"/>
+                          </a:solidFill>
+                        </a:rPr>
+                        <a:t>int</a:t>
+                      </a:r>
+                    </a:p>
+                    <a:p>
+                      <a:r>
+                        <a:rPr lang="en-US" sz="1400" dirty="0"/>
+                        <a:t>category-name </a:t>
+                      </a:r>
+                      <a:r>
+                        <a:rPr lang="en-US" sz="1400" dirty="0">
+                          <a:solidFill>
+                            <a:srgbClr val="FF0000"/>
+                          </a:solidFill>
+                        </a:rPr>
+                        <a:t>string</a:t>
+                      </a:r>
+                    </a:p>
+                  </a:txBody>
+                  <a:tcPr/>
+                </a:tc>
+                <a:extLst>
+                  <a:ext uri="{0D108BD9-81ED-4DB2-BD59-A6C34878D82A}">
+                    <a16:rowId xmlns:a16="http://schemas.microsoft.com/office/drawing/2014/main" val="4232249410"/>
+                  </a:ext>
+                </a:extLst>
+              </a:tr>
+            </a:tbl>
+          </a:graphicData>
+        </a:graphic>
+      </p:graphicFrame>
       <p:cxnSp>
         <p:nvCxnSpPr>
-          <p:cNvPr id="63" name="Straight Connector 62"/>
+          <p:cNvPr id="118" name="Straight Connector 117">
+            <a:extLst>
+              <a:ext uri="{FF2B5EF4-FFF2-40B4-BE49-F238E27FC236}">
+                <a16:creationId xmlns:a16="http://schemas.microsoft.com/office/drawing/2014/main" id="{F9A8BEA7-C670-4680-A087-F8F2EE0141BE}"/>
+              </a:ext>
+            </a:extLst>
+          </p:cNvPr>
           <p:cNvCxnSpPr>
-            <a:stCxn id="55" idx="3"/>
-            <a:endCxn id="57" idx="1"/>
+            <a:cxnSpLocks/>
           </p:cNvCxnSpPr>
           <p:nvPr/>
         </p:nvCxnSpPr>
         <p:spPr>
-          <a:xfrm flipV="1">
-            <a:off x="7770865" y="1439125"/>
-            <a:ext cx="1481070" cy="1"/>
+          <a:xfrm>
+            <a:off x="6493580" y="4572721"/>
+            <a:ext cx="662594" cy="0"/>
           </a:xfrm>
           <a:prstGeom prst="line">
             <a:avLst/>
           </a:prstGeom>
-          <a:ln>
-            <a:solidFill>
-              <a:schemeClr val="tx1"/>
-            </a:solidFill>
-          </a:ln>
         </p:spPr>
         <p:style>
           <a:lnRef idx="1">
@@ -3677,26 +4043,26 @@
       </p:cxnSp>
       <p:cxnSp>
         <p:nvCxnSpPr>
-          <p:cNvPr id="64" name="Straight Connector 63"/>
+          <p:cNvPr id="119" name="Straight Connector 118">
+            <a:extLst>
+              <a:ext uri="{FF2B5EF4-FFF2-40B4-BE49-F238E27FC236}">
+                <a16:creationId xmlns:a16="http://schemas.microsoft.com/office/drawing/2014/main" id="{5399F960-9BC7-49DF-8C2C-2F46803F5960}"/>
+              </a:ext>
+            </a:extLst>
+          </p:cNvPr>
           <p:cNvCxnSpPr>
-            <a:stCxn id="53" idx="3"/>
-            <a:endCxn id="55" idx="1"/>
+            <a:cxnSpLocks/>
           </p:cNvCxnSpPr>
           <p:nvPr/>
         </p:nvCxnSpPr>
         <p:spPr>
-          <a:xfrm>
-            <a:off x="5104939" y="1439126"/>
-            <a:ext cx="862883" cy="0"/>
+          <a:xfrm flipV="1">
+            <a:off x="7156174" y="3187869"/>
+            <a:ext cx="0" cy="1384852"/>
           </a:xfrm>
           <a:prstGeom prst="line">
             <a:avLst/>
           </a:prstGeom>
-          <a:ln>
-            <a:solidFill>
-              <a:schemeClr val="tx1"/>
-            </a:solidFill>
-          </a:ln>
         </p:spPr>
         <p:style>
           <a:lnRef idx="1">
@@ -3715,23 +4081,99 @@
       </p:cxnSp>
       <p:cxnSp>
         <p:nvCxnSpPr>
-          <p:cNvPr id="65" name="Straight Connector 64"/>
-          <p:cNvCxnSpPr/>
+          <p:cNvPr id="120" name="Straight Connector 119">
+            <a:extLst>
+              <a:ext uri="{FF2B5EF4-FFF2-40B4-BE49-F238E27FC236}">
+                <a16:creationId xmlns:a16="http://schemas.microsoft.com/office/drawing/2014/main" id="{1C6E3825-3F64-496E-A600-797264DC0E51}"/>
+              </a:ext>
+            </a:extLst>
+          </p:cNvPr>
+          <p:cNvCxnSpPr>
+            <a:cxnSpLocks/>
+          </p:cNvCxnSpPr>
           <p:nvPr/>
         </p:nvCxnSpPr>
         <p:spPr>
           <a:xfrm>
-            <a:off x="2421277" y="1229355"/>
-            <a:ext cx="862883" cy="0"/>
+            <a:off x="7156174" y="3195217"/>
+            <a:ext cx="708991" cy="0"/>
           </a:xfrm>
           <a:prstGeom prst="line">
             <a:avLst/>
           </a:prstGeom>
-          <a:ln>
-            <a:solidFill>
-              <a:schemeClr val="tx1"/>
-            </a:solidFill>
-          </a:ln>
+        </p:spPr>
+        <p:style>
+          <a:lnRef idx="1">
+            <a:schemeClr val="accent1"/>
+          </a:lnRef>
+          <a:fillRef idx="0">
+            <a:schemeClr val="accent1"/>
+          </a:fillRef>
+          <a:effectRef idx="0">
+            <a:schemeClr val="accent1"/>
+          </a:effectRef>
+          <a:fontRef idx="minor">
+            <a:schemeClr val="tx1"/>
+          </a:fontRef>
+        </p:style>
+      </p:cxnSp>
+      <p:sp>
+        <p:nvSpPr>
+          <p:cNvPr id="121" name="TextBox 120">
+            <a:extLst>
+              <a:ext uri="{FF2B5EF4-FFF2-40B4-BE49-F238E27FC236}">
+                <a16:creationId xmlns:a16="http://schemas.microsoft.com/office/drawing/2014/main" id="{248424F2-59CB-4EB3-93AC-5D015191C9CD}"/>
+              </a:ext>
+            </a:extLst>
+          </p:cNvPr>
+          <p:cNvSpPr txBox="1"/>
+          <p:nvPr/>
+        </p:nvSpPr>
+        <p:spPr>
+          <a:xfrm>
+            <a:off x="6490262" y="4388055"/>
+            <a:ext cx="977353" cy="369332"/>
+          </a:xfrm>
+          <a:prstGeom prst="rect">
+            <a:avLst/>
+          </a:prstGeom>
+          <a:noFill/>
+        </p:spPr>
+        <p:txBody>
+          <a:bodyPr wrap="square" rtlCol="0">
+            <a:spAutoFit/>
+          </a:bodyPr>
+          <a:lstStyle/>
+          <a:p>
+            <a:r>
+              <a:rPr lang="en-US" dirty="0"/>
+              <a:t>*</a:t>
+            </a:r>
+          </a:p>
+        </p:txBody>
+      </p:sp>
+      <p:cxnSp>
+        <p:nvCxnSpPr>
+          <p:cNvPr id="122" name="Straight Connector 121">
+            <a:extLst>
+              <a:ext uri="{FF2B5EF4-FFF2-40B4-BE49-F238E27FC236}">
+                <a16:creationId xmlns:a16="http://schemas.microsoft.com/office/drawing/2014/main" id="{31845C8A-98F5-4FB0-A622-1D82CA6AC7B2}"/>
+              </a:ext>
+            </a:extLst>
+          </p:cNvPr>
+          <p:cNvCxnSpPr>
+            <a:cxnSpLocks/>
+          </p:cNvCxnSpPr>
+          <p:nvPr/>
+        </p:nvCxnSpPr>
+        <p:spPr>
+          <a:xfrm flipV="1">
+            <a:off x="3901082" y="3187043"/>
+            <a:ext cx="0" cy="1350279"/>
+          </a:xfrm>
+          <a:prstGeom prst="line">
+            <a:avLst/>
+          </a:prstGeom>
         </p:spPr>
         <p:style>
           <a:lnRef idx="1">
@@ -3750,25 +4192,26 @@
       </p:cxnSp>
       <p:cxnSp>
         <p:nvCxnSpPr>
-          <p:cNvPr id="66" name="Straight Connector 65"/>
+          <p:cNvPr id="123" name="Straight Connector 122">
+            <a:extLst>
+              <a:ext uri="{FF2B5EF4-FFF2-40B4-BE49-F238E27FC236}">
+                <a16:creationId xmlns:a16="http://schemas.microsoft.com/office/drawing/2014/main" id="{59B04599-A1F5-47BF-B169-14B250BBB00E}"/>
+              </a:ext>
+            </a:extLst>
+          </p:cNvPr>
           <p:cNvCxnSpPr>
-            <a:endCxn id="61" idx="0"/>
+            <a:cxnSpLocks/>
           </p:cNvCxnSpPr>
           <p:nvPr/>
         </p:nvCxnSpPr>
         <p:spPr>
           <a:xfrm>
-            <a:off x="1532288" y="2656354"/>
-            <a:ext cx="0" cy="1530447"/>
+            <a:off x="3892838" y="4545496"/>
+            <a:ext cx="944210" cy="0"/>
           </a:xfrm>
           <a:prstGeom prst="line">
             <a:avLst/>
           </a:prstGeom>
-          <a:ln>
-            <a:solidFill>
-              <a:schemeClr val="tx1"/>
-            </a:solidFill>
-          </a:ln>
         </p:spPr>
         <p:style>
           <a:lnRef idx="1">
@@ -3787,23 +4230,134 @@
       </p:cxnSp>
       <p:cxnSp>
         <p:nvCxnSpPr>
-          <p:cNvPr id="67" name="Straight Connector 66"/>
-          <p:cNvCxnSpPr/>
+          <p:cNvPr id="124" name="Straight Connector 123">
+            <a:extLst>
+              <a:ext uri="{FF2B5EF4-FFF2-40B4-BE49-F238E27FC236}">
+                <a16:creationId xmlns:a16="http://schemas.microsoft.com/office/drawing/2014/main" id="{DA731C21-7011-4DC5-968D-82B32B3DD8C1}"/>
+              </a:ext>
+            </a:extLst>
+          </p:cNvPr>
+          <p:cNvCxnSpPr>
+            <a:cxnSpLocks/>
+          </p:cNvCxnSpPr>
           <p:nvPr/>
         </p:nvCxnSpPr>
         <p:spPr>
           <a:xfrm>
-            <a:off x="6884740" y="2674531"/>
-            <a:ext cx="42822" cy="1491186"/>
+            <a:off x="3286547" y="3187869"/>
+            <a:ext cx="606291" cy="0"/>
           </a:xfrm>
           <a:prstGeom prst="line">
             <a:avLst/>
           </a:prstGeom>
-          <a:ln>
-            <a:solidFill>
-              <a:schemeClr val="tx1"/>
-            </a:solidFill>
-          </a:ln>
+        </p:spPr>
+        <p:style>
+          <a:lnRef idx="1">
+            <a:schemeClr val="accent1"/>
+          </a:lnRef>
+          <a:fillRef idx="0">
+            <a:schemeClr val="accent1"/>
+          </a:fillRef>
+          <a:effectRef idx="0">
+            <a:schemeClr val="accent1"/>
+          </a:effectRef>
+          <a:fontRef idx="minor">
+            <a:schemeClr val="tx1"/>
+          </a:fontRef>
+        </p:style>
+      </p:cxnSp>
+      <p:sp>
+        <p:nvSpPr>
+          <p:cNvPr id="125" name="TextBox 124">
+            <a:extLst>
+              <a:ext uri="{FF2B5EF4-FFF2-40B4-BE49-F238E27FC236}">
+                <a16:creationId xmlns:a16="http://schemas.microsoft.com/office/drawing/2014/main" id="{257564A7-8D7D-4A22-8A58-EE1108E8B084}"/>
+              </a:ext>
+            </a:extLst>
+          </p:cNvPr>
+          <p:cNvSpPr txBox="1"/>
+          <p:nvPr/>
+        </p:nvSpPr>
+        <p:spPr>
+          <a:xfrm>
+            <a:off x="4622799" y="4360830"/>
+            <a:ext cx="977353" cy="369332"/>
+          </a:xfrm>
+          <a:prstGeom prst="rect">
+            <a:avLst/>
+          </a:prstGeom>
+          <a:noFill/>
+        </p:spPr>
+        <p:txBody>
+          <a:bodyPr wrap="square" rtlCol="0">
+            <a:spAutoFit/>
+          </a:bodyPr>
+          <a:lstStyle/>
+          <a:p>
+            <a:r>
+              <a:rPr lang="en-US" dirty="0"/>
+              <a:t>*</a:t>
+            </a:r>
+          </a:p>
+        </p:txBody>
+      </p:sp>
+      <p:sp>
+        <p:nvSpPr>
+          <p:cNvPr id="126" name="TextBox 125">
+            <a:extLst>
+              <a:ext uri="{FF2B5EF4-FFF2-40B4-BE49-F238E27FC236}">
+                <a16:creationId xmlns:a16="http://schemas.microsoft.com/office/drawing/2014/main" id="{42BBE6A4-2272-4DA9-8D1C-21AD92DB5921}"/>
+              </a:ext>
+            </a:extLst>
+          </p:cNvPr>
+          <p:cNvSpPr txBox="1"/>
+          <p:nvPr/>
+        </p:nvSpPr>
+        <p:spPr>
+          <a:xfrm>
+            <a:off x="4249526" y="894647"/>
+            <a:ext cx="977353" cy="307777"/>
+          </a:xfrm>
+          <a:prstGeom prst="rect">
+            <a:avLst/>
+          </a:prstGeom>
+          <a:noFill/>
+        </p:spPr>
+        <p:txBody>
+          <a:bodyPr wrap="square" rtlCol="0">
+            <a:spAutoFit/>
+          </a:bodyPr>
+          <a:lstStyle/>
+          <a:p>
+            <a:r>
+              <a:rPr lang="en-US" sz="1400" dirty="0"/>
+              <a:t>1</a:t>
+            </a:r>
+          </a:p>
+        </p:txBody>
+      </p:sp>
+      <p:cxnSp>
+        <p:nvCxnSpPr>
+          <p:cNvPr id="127" name="Straight Connector 126">
+            <a:extLst>
+              <a:ext uri="{FF2B5EF4-FFF2-40B4-BE49-F238E27FC236}">
+                <a16:creationId xmlns:a16="http://schemas.microsoft.com/office/drawing/2014/main" id="{28CD604C-27F7-4240-A9CF-7B10D09AC360}"/>
+              </a:ext>
+            </a:extLst>
+          </p:cNvPr>
+          <p:cNvCxnSpPr>
+            <a:cxnSpLocks/>
+          </p:cNvCxnSpPr>
+          <p:nvPr/>
+        </p:nvCxnSpPr>
+        <p:spPr>
+          <a:xfrm flipV="1">
+            <a:off x="1885134" y="1152940"/>
+            <a:ext cx="0" cy="487228"/>
+          </a:xfrm>
+          <a:prstGeom prst="line">
+            <a:avLst/>
+          </a:prstGeom>
         </p:spPr>
         <p:style>
           <a:lnRef idx="1">
@@ -3822,23 +4376,26 @@
       </p:cxnSp>
       <p:cxnSp>
         <p:nvCxnSpPr>
-          <p:cNvPr id="68" name="Straight Connector 67"/>
-          <p:cNvCxnSpPr/>
+          <p:cNvPr id="128" name="Straight Connector 127">
+            <a:extLst>
+              <a:ext uri="{FF2B5EF4-FFF2-40B4-BE49-F238E27FC236}">
+                <a16:creationId xmlns:a16="http://schemas.microsoft.com/office/drawing/2014/main" id="{562ECC14-BCD9-4B6F-9805-C9E3B4254F72}"/>
+              </a:ext>
+            </a:extLst>
+          </p:cNvPr>
+          <p:cNvCxnSpPr>
+            <a:cxnSpLocks/>
+          </p:cNvCxnSpPr>
           <p:nvPr/>
         </p:nvCxnSpPr>
         <p:spPr>
           <a:xfrm>
-            <a:off x="656870" y="705893"/>
-            <a:ext cx="1764407" cy="0"/>
+            <a:off x="1885962" y="1139687"/>
+            <a:ext cx="2580024" cy="0"/>
           </a:xfrm>
           <a:prstGeom prst="line">
             <a:avLst/>
           </a:prstGeom>
-          <a:ln>
-            <a:solidFill>
-              <a:schemeClr val="tx1"/>
-            </a:solidFill>
-          </a:ln>
         </p:spPr>
         <p:style>
           <a:lnRef idx="1">
@@ -3855,25 +4412,64 @@
           </a:fontRef>
         </p:style>
       </p:cxnSp>
+      <p:sp>
+        <p:nvSpPr>
+          <p:cNvPr id="129" name="TextBox 128">
+            <a:extLst>
+              <a:ext uri="{FF2B5EF4-FFF2-40B4-BE49-F238E27FC236}">
+                <a16:creationId xmlns:a16="http://schemas.microsoft.com/office/drawing/2014/main" id="{E95660B2-3B61-4B04-B26A-59B0D33EB14F}"/>
+              </a:ext>
+            </a:extLst>
+          </p:cNvPr>
+          <p:cNvSpPr txBox="1"/>
+          <p:nvPr/>
+        </p:nvSpPr>
+        <p:spPr>
+          <a:xfrm>
+            <a:off x="1659424" y="1435213"/>
+            <a:ext cx="977353" cy="369332"/>
+          </a:xfrm>
+          <a:prstGeom prst="rect">
+            <a:avLst/>
+          </a:prstGeom>
+          <a:noFill/>
+        </p:spPr>
+        <p:txBody>
+          <a:bodyPr wrap="square" rtlCol="0">
+            <a:spAutoFit/>
+          </a:bodyPr>
+          <a:lstStyle/>
+          <a:p>
+            <a:r>
+              <a:rPr lang="en-US" dirty="0"/>
+              <a:t>*</a:t>
+            </a:r>
+          </a:p>
+        </p:txBody>
+      </p:sp>
       <p:cxnSp>
         <p:nvCxnSpPr>
-          <p:cNvPr id="69" name="Straight Connector 68"/>
-          <p:cNvCxnSpPr/>
+          <p:cNvPr id="130" name="Straight Connector 129">
+            <a:extLst>
+              <a:ext uri="{FF2B5EF4-FFF2-40B4-BE49-F238E27FC236}">
+                <a16:creationId xmlns:a16="http://schemas.microsoft.com/office/drawing/2014/main" id="{736C250C-ED7B-424C-A4FD-BEDF7B0817F7}"/>
+              </a:ext>
+            </a:extLst>
+          </p:cNvPr>
+          <p:cNvCxnSpPr>
+            <a:cxnSpLocks/>
+            <a:endCxn id="133" idx="1"/>
+          </p:cNvCxnSpPr>
           <p:nvPr/>
         </p:nvCxnSpPr>
         <p:spPr>
-          <a:xfrm>
-            <a:off x="3340532" y="684290"/>
-            <a:ext cx="1764407" cy="0"/>
+          <a:xfrm flipH="1" flipV="1">
+            <a:off x="3286547" y="2289490"/>
+            <a:ext cx="4578620" cy="17000"/>
           </a:xfrm>
           <a:prstGeom prst="line">
             <a:avLst/>
           </a:prstGeom>
-          <a:ln>
-            <a:solidFill>
-              <a:schemeClr val="tx1"/>
-            </a:solidFill>
-          </a:ln>
         </p:spPr>
         <p:style>
           <a:lnRef idx="1">
@@ -3890,25 +4486,337 @@
           </a:fontRef>
         </p:style>
       </p:cxnSp>
+      <p:sp>
+        <p:nvSpPr>
+          <p:cNvPr id="131" name="TextBox 130">
+            <a:extLst>
+              <a:ext uri="{FF2B5EF4-FFF2-40B4-BE49-F238E27FC236}">
+                <a16:creationId xmlns:a16="http://schemas.microsoft.com/office/drawing/2014/main" id="{34DAC869-C80C-42C5-9B99-50733C77C6B7}"/>
+              </a:ext>
+            </a:extLst>
+          </p:cNvPr>
+          <p:cNvSpPr txBox="1"/>
+          <p:nvPr/>
+        </p:nvSpPr>
+        <p:spPr>
+          <a:xfrm>
+            <a:off x="7596802" y="2925367"/>
+            <a:ext cx="977353" cy="307777"/>
+          </a:xfrm>
+          <a:prstGeom prst="rect">
+            <a:avLst/>
+          </a:prstGeom>
+          <a:noFill/>
+        </p:spPr>
+        <p:txBody>
+          <a:bodyPr wrap="square" rtlCol="0">
+            <a:spAutoFit/>
+          </a:bodyPr>
+          <a:lstStyle/>
+          <a:p>
+            <a:r>
+              <a:rPr lang="en-US" sz="1400" dirty="0"/>
+              <a:t>1</a:t>
+            </a:r>
+          </a:p>
+        </p:txBody>
+      </p:sp>
+      <p:sp>
+        <p:nvSpPr>
+          <p:cNvPr id="132" name="TextBox 131">
+            <a:extLst>
+              <a:ext uri="{FF2B5EF4-FFF2-40B4-BE49-F238E27FC236}">
+                <a16:creationId xmlns:a16="http://schemas.microsoft.com/office/drawing/2014/main" id="{7A575703-595A-42EC-BBB4-046CAA3FC199}"/>
+              </a:ext>
+            </a:extLst>
+          </p:cNvPr>
+          <p:cNvSpPr txBox="1"/>
+          <p:nvPr/>
+        </p:nvSpPr>
+        <p:spPr>
+          <a:xfrm>
+            <a:off x="3253318" y="2925367"/>
+            <a:ext cx="462224" cy="307777"/>
+          </a:xfrm>
+          <a:prstGeom prst="rect">
+            <a:avLst/>
+          </a:prstGeom>
+          <a:noFill/>
+        </p:spPr>
+        <p:txBody>
+          <a:bodyPr wrap="square" rtlCol="0">
+            <a:spAutoFit/>
+          </a:bodyPr>
+          <a:lstStyle/>
+          <a:p>
+            <a:r>
+              <a:rPr lang="en-US" sz="1400" dirty="0"/>
+              <a:t>1</a:t>
+            </a:r>
+          </a:p>
+        </p:txBody>
+      </p:sp>
+      <p:sp>
+        <p:nvSpPr>
+          <p:cNvPr id="133" name="TextBox 132">
+            <a:extLst>
+              <a:ext uri="{FF2B5EF4-FFF2-40B4-BE49-F238E27FC236}">
+                <a16:creationId xmlns:a16="http://schemas.microsoft.com/office/drawing/2014/main" id="{A0B6F577-C346-4A85-B81F-7377AFEA0B19}"/>
+              </a:ext>
+            </a:extLst>
+          </p:cNvPr>
+          <p:cNvSpPr txBox="1"/>
+          <p:nvPr/>
+        </p:nvSpPr>
+        <p:spPr>
+          <a:xfrm>
+            <a:off x="3286547" y="2104824"/>
+            <a:ext cx="977353" cy="369332"/>
+          </a:xfrm>
+          <a:prstGeom prst="rect">
+            <a:avLst/>
+          </a:prstGeom>
+          <a:noFill/>
+        </p:spPr>
+        <p:txBody>
+          <a:bodyPr wrap="square" rtlCol="0">
+            <a:spAutoFit/>
+          </a:bodyPr>
+          <a:lstStyle/>
+          <a:p>
+            <a:r>
+              <a:rPr lang="en-US" dirty="0"/>
+              <a:t>*</a:t>
+            </a:r>
+          </a:p>
+        </p:txBody>
+      </p:sp>
+      <p:sp>
+        <p:nvSpPr>
+          <p:cNvPr id="134" name="TextBox 133">
+            <a:extLst>
+              <a:ext uri="{FF2B5EF4-FFF2-40B4-BE49-F238E27FC236}">
+                <a16:creationId xmlns:a16="http://schemas.microsoft.com/office/drawing/2014/main" id="{316AD204-D7A6-429A-8031-9E7C1069306F}"/>
+              </a:ext>
+            </a:extLst>
+          </p:cNvPr>
+          <p:cNvSpPr txBox="1"/>
+          <p:nvPr/>
+        </p:nvSpPr>
+        <p:spPr>
+          <a:xfrm>
+            <a:off x="7632417" y="2059353"/>
+            <a:ext cx="977353" cy="307777"/>
+          </a:xfrm>
+          <a:prstGeom prst="rect">
+            <a:avLst/>
+          </a:prstGeom>
+          <a:noFill/>
+        </p:spPr>
+        <p:txBody>
+          <a:bodyPr wrap="square" rtlCol="0">
+            <a:spAutoFit/>
+          </a:bodyPr>
+          <a:lstStyle/>
+          <a:p>
+            <a:r>
+              <a:rPr lang="en-US" sz="1400" dirty="0"/>
+              <a:t>1</a:t>
+            </a:r>
+          </a:p>
+        </p:txBody>
+      </p:sp>
+      <p:graphicFrame>
+        <p:nvGraphicFramePr>
+          <p:cNvPr id="135" name="Table 134">
+            <a:extLst>
+              <a:ext uri="{FF2B5EF4-FFF2-40B4-BE49-F238E27FC236}">
+                <a16:creationId xmlns:a16="http://schemas.microsoft.com/office/drawing/2014/main" id="{24B03EFC-6246-4A16-A49A-244B092FEF4B}"/>
+              </a:ext>
+            </a:extLst>
+          </p:cNvPr>
+          <p:cNvGraphicFramePr>
+            <a:graphicFrameLocks noGrp="1"/>
+          </p:cNvGraphicFramePr>
+          <p:nvPr>
+            <p:extLst>
+              <p:ext uri="{D42A27DB-BD31-4B8C-83A1-F6EECF244321}">
+                <p14:modId xmlns:p14="http://schemas.microsoft.com/office/powerpoint/2010/main" val="1962726534"/>
+              </p:ext>
+            </p:extLst>
+          </p:nvPr>
+        </p:nvGraphicFramePr>
+        <p:xfrm>
+          <a:off x="886686" y="4765362"/>
+          <a:ext cx="1996895" cy="1066800"/>
+        </p:xfrm>
+        <a:graphic>
+          <a:graphicData uri="http://schemas.openxmlformats.org/drawingml/2006/table">
+            <a:tbl>
+              <a:tblPr firstRow="1" bandRow="1">
+                <a:tableStyleId>{5C22544A-7EE6-4342-B048-85BDC9FD1C3A}</a:tableStyleId>
+              </a:tblPr>
+              <a:tblGrid>
+                <a:gridCol w="517229">
+                  <a:extLst>
+                    <a:ext uri="{9D8B030D-6E8A-4147-A177-3AD203B41FA5}">
+                      <a16:colId xmlns:a16="http://schemas.microsoft.com/office/drawing/2014/main" val="3052149917"/>
+                    </a:ext>
+                  </a:extLst>
+                </a:gridCol>
+                <a:gridCol w="1479666">
+                  <a:extLst>
+                    <a:ext uri="{9D8B030D-6E8A-4147-A177-3AD203B41FA5}">
+                      <a16:colId xmlns:a16="http://schemas.microsoft.com/office/drawing/2014/main" val="849940379"/>
+                    </a:ext>
+                  </a:extLst>
+                </a:gridCol>
+              </a:tblGrid>
+              <a:tr h="300115">
+                <a:tc gridSpan="2">
+                  <a:txBody>
+                    <a:bodyPr/>
+                    <a:lstStyle/>
+                    <a:p>
+                      <a:r>
+                        <a:rPr lang="en-US" sz="1600" dirty="0"/>
+                        <a:t>        Location</a:t>
+                      </a:r>
+                    </a:p>
+                  </a:txBody>
+                  <a:tcPr/>
+                </a:tc>
+                <a:tc hMerge="1">
+                  <a:txBody>
+                    <a:bodyPr/>
+                    <a:lstStyle/>
+                    <a:p>
+                      <a:endParaRPr lang="en-US" dirty="0"/>
+                    </a:p>
+                  </a:txBody>
+                  <a:tcPr/>
+                </a:tc>
+                <a:extLst>
+                  <a:ext uri="{0D108BD9-81ED-4DB2-BD59-A6C34878D82A}">
+                    <a16:rowId xmlns:a16="http://schemas.microsoft.com/office/drawing/2014/main" val="1300100705"/>
+                  </a:ext>
+                </a:extLst>
+              </a:tr>
+              <a:tr h="588765">
+                <a:tc>
+                  <a:txBody>
+                    <a:bodyPr/>
+                    <a:lstStyle/>
+                    <a:p>
+                      <a:r>
+                        <a:rPr lang="en-US" sz="1400" dirty="0"/>
+                        <a:t>Pk</a:t>
+                      </a:r>
+                    </a:p>
+                  </a:txBody>
+                  <a:tcPr/>
+                </a:tc>
+                <a:tc>
+                  <a:txBody>
+                    <a:bodyPr/>
+                    <a:lstStyle/>
+                    <a:p>
+                      <a:r>
+                        <a:rPr lang="en-US" sz="1400" dirty="0">
+                          <a:solidFill>
+                            <a:schemeClr val="tx1"/>
+                          </a:solidFill>
+                        </a:rPr>
+                        <a:t>id </a:t>
+                      </a:r>
+                      <a:r>
+                        <a:rPr lang="en-US" sz="1400" dirty="0">
+                          <a:solidFill>
+                            <a:srgbClr val="FF0000"/>
+                          </a:solidFill>
+                        </a:rPr>
+                        <a:t>int</a:t>
+                      </a:r>
+                    </a:p>
+                    <a:p>
+                      <a:r>
+                        <a:rPr lang="en-US" sz="1400" dirty="0">
+                          <a:solidFill>
+                            <a:schemeClr val="tx1"/>
+                          </a:solidFill>
+                        </a:rPr>
+                        <a:t>location</a:t>
+                      </a:r>
+                      <a:r>
+                        <a:rPr lang="en-US" sz="1400" dirty="0">
+                          <a:solidFill>
+                            <a:srgbClr val="FF0000"/>
+                          </a:solidFill>
+                        </a:rPr>
+                        <a:t> string </a:t>
+                      </a:r>
+                    </a:p>
+                    <a:p>
+                      <a:r>
+                        <a:rPr lang="en-US" sz="1400" dirty="0" err="1">
+                          <a:solidFill>
+                            <a:schemeClr val="tx1"/>
+                          </a:solidFill>
+                        </a:rPr>
+                        <a:t>event_id</a:t>
+                      </a:r>
+                      <a:r>
+                        <a:rPr lang="en-US" sz="1400" dirty="0">
+                          <a:solidFill>
+                            <a:schemeClr val="tx1"/>
+                          </a:solidFill>
+                        </a:rPr>
+                        <a:t> </a:t>
+                      </a:r>
+                      <a:r>
+                        <a:rPr lang="en-US" sz="1400" dirty="0">
+                          <a:solidFill>
+                            <a:srgbClr val="FF0000"/>
+                          </a:solidFill>
+                        </a:rPr>
+                        <a:t>int</a:t>
+                      </a:r>
+                    </a:p>
+                  </a:txBody>
+                  <a:tcPr/>
+                </a:tc>
+                <a:extLst>
+                  <a:ext uri="{0D108BD9-81ED-4DB2-BD59-A6C34878D82A}">
+                    <a16:rowId xmlns:a16="http://schemas.microsoft.com/office/drawing/2014/main" val="4232249410"/>
+                  </a:ext>
+                </a:extLst>
+              </a:tr>
+            </a:tbl>
+          </a:graphicData>
+        </a:graphic>
+      </p:graphicFrame>
       <p:cxnSp>
         <p:nvCxnSpPr>
-          <p:cNvPr id="70" name="Straight Connector 69"/>
-          <p:cNvCxnSpPr/>
+          <p:cNvPr id="136" name="Straight Connector 135">
+            <a:extLst>
+              <a:ext uri="{FF2B5EF4-FFF2-40B4-BE49-F238E27FC236}">
+                <a16:creationId xmlns:a16="http://schemas.microsoft.com/office/drawing/2014/main" id="{7D8E84B2-B1E8-4CDA-A4C3-F4F1DB28836E}"/>
+              </a:ext>
+            </a:extLst>
+          </p:cNvPr>
+          <p:cNvCxnSpPr>
+            <a:cxnSpLocks/>
+          </p:cNvCxnSpPr>
           <p:nvPr/>
         </p:nvCxnSpPr>
         <p:spPr>
-          <a:xfrm>
-            <a:off x="5967822" y="705893"/>
-            <a:ext cx="1764407" cy="0"/>
+          <a:xfrm flipV="1">
+            <a:off x="1885134" y="4097868"/>
+            <a:ext cx="0" cy="650947"/>
           </a:xfrm>
           <a:prstGeom prst="line">
             <a:avLst/>
           </a:prstGeom>
-          <a:ln>
-            <a:solidFill>
-              <a:schemeClr val="tx1"/>
-            </a:solidFill>
-          </a:ln>
         </p:spPr>
         <p:style>
           <a:lnRef idx="1">
@@ -3925,121 +4833,22 @@
           </a:fontRef>
         </p:style>
       </p:cxnSp>
-      <p:cxnSp>
-        <p:nvCxnSpPr>
-          <p:cNvPr id="71" name="Straight Connector 70"/>
-          <p:cNvCxnSpPr/>
+      <p:sp>
+        <p:nvSpPr>
+          <p:cNvPr id="137" name="TextBox 136">
+            <a:extLst>
+              <a:ext uri="{FF2B5EF4-FFF2-40B4-BE49-F238E27FC236}">
+                <a16:creationId xmlns:a16="http://schemas.microsoft.com/office/drawing/2014/main" id="{F88171DA-8416-4D82-871B-E8BF5BEE5D4E}"/>
+              </a:ext>
+            </a:extLst>
+          </p:cNvPr>
+          <p:cNvSpPr txBox="1"/>
           <p:nvPr/>
-        </p:nvCxnSpPr>
+        </p:nvSpPr>
         <p:spPr>
           <a:xfrm>
-            <a:off x="9232844" y="705893"/>
-            <a:ext cx="1764407" cy="0"/>
-          </a:xfrm>
-          <a:prstGeom prst="line">
-            <a:avLst/>
-          </a:prstGeom>
-          <a:ln>
-            <a:solidFill>
-              <a:schemeClr val="tx1"/>
-            </a:solidFill>
-          </a:ln>
-        </p:spPr>
-        <p:style>
-          <a:lnRef idx="1">
-            <a:schemeClr val="accent1"/>
-          </a:lnRef>
-          <a:fillRef idx="0">
-            <a:schemeClr val="accent1"/>
-          </a:fillRef>
-          <a:effectRef idx="0">
-            <a:schemeClr val="accent1"/>
-          </a:effectRef>
-          <a:fontRef idx="minor">
-            <a:schemeClr val="tx1"/>
-          </a:fontRef>
-        </p:style>
-      </p:cxnSp>
-      <p:cxnSp>
-        <p:nvCxnSpPr>
-          <p:cNvPr id="72" name="Straight Connector 71"/>
-          <p:cNvCxnSpPr/>
-          <p:nvPr/>
-        </p:nvCxnSpPr>
-        <p:spPr>
-          <a:xfrm>
-            <a:off x="650081" y="4659166"/>
-            <a:ext cx="1764407" cy="0"/>
-          </a:xfrm>
-          <a:prstGeom prst="line">
-            <a:avLst/>
-          </a:prstGeom>
-          <a:ln>
-            <a:solidFill>
-              <a:schemeClr val="tx1"/>
-            </a:solidFill>
-          </a:ln>
-        </p:spPr>
-        <p:style>
-          <a:lnRef idx="1">
-            <a:schemeClr val="accent1"/>
-          </a:lnRef>
-          <a:fillRef idx="0">
-            <a:schemeClr val="accent1"/>
-          </a:fillRef>
-          <a:effectRef idx="0">
-            <a:schemeClr val="accent1"/>
-          </a:effectRef>
-          <a:fontRef idx="minor">
-            <a:schemeClr val="tx1"/>
-          </a:fontRef>
-        </p:style>
-      </p:cxnSp>
-      <p:cxnSp>
-        <p:nvCxnSpPr>
-          <p:cNvPr id="73" name="Straight Connector 72"/>
-          <p:cNvCxnSpPr/>
-          <p:nvPr/>
-        </p:nvCxnSpPr>
-        <p:spPr>
-          <a:xfrm>
-            <a:off x="5955268" y="4592486"/>
-            <a:ext cx="1764407" cy="0"/>
-          </a:xfrm>
-          <a:prstGeom prst="line">
-            <a:avLst/>
-          </a:prstGeom>
-          <a:ln>
-            <a:solidFill>
-              <a:schemeClr val="tx1"/>
-            </a:solidFill>
-          </a:ln>
-        </p:spPr>
-        <p:style>
-          <a:lnRef idx="1">
-            <a:schemeClr val="accent1"/>
-          </a:lnRef>
-          <a:fillRef idx="0">
-            <a:schemeClr val="accent1"/>
-          </a:fillRef>
-          <a:effectRef idx="0">
-            <a:schemeClr val="accent1"/>
-          </a:effectRef>
-          <a:fontRef idx="minor">
-            <a:schemeClr val="tx1"/>
-          </a:fontRef>
-        </p:style>
-      </p:cxnSp>
-      <p:sp>
-        <p:nvSpPr>
-          <p:cNvPr id="74" name="TextBox 73"/>
-          <p:cNvSpPr txBox="1"/>
-          <p:nvPr/>
-        </p:nvSpPr>
-        <p:spPr>
-          <a:xfrm>
-            <a:off x="3567083" y="1093040"/>
-            <a:ext cx="1231299" cy="369332"/>
+            <a:off x="1600202" y="4537322"/>
+            <a:ext cx="977353" cy="369332"/>
           </a:xfrm>
           <a:prstGeom prst="rect">
             <a:avLst/>
@@ -4047,29 +4856,34 @@
           <a:noFill/>
         </p:spPr>
         <p:txBody>
-          <a:bodyPr wrap="none" rtlCol="0">
+          <a:bodyPr wrap="square" rtlCol="0">
             <a:spAutoFit/>
           </a:bodyPr>
           <a:lstStyle/>
           <a:p>
             <a:r>
-              <a:rPr lang="en-US" dirty="0" smtClean="0"/>
-              <a:t>first_name</a:t>
-            </a:r>
-            <a:endParaRPr lang="en-US" dirty="0"/>
-          </a:p>
-        </p:txBody>
-      </p:sp>
-      <p:sp>
-        <p:nvSpPr>
-          <p:cNvPr id="75" name="TextBox 74"/>
+              <a:rPr lang="en-US" dirty="0"/>
+              <a:t>*</a:t>
+            </a:r>
+          </a:p>
+        </p:txBody>
+      </p:sp>
+      <p:sp>
+        <p:nvSpPr>
+          <p:cNvPr id="138" name="TextBox 137">
+            <a:extLst>
+              <a:ext uri="{FF2B5EF4-FFF2-40B4-BE49-F238E27FC236}">
+                <a16:creationId xmlns:a16="http://schemas.microsoft.com/office/drawing/2014/main" id="{1141B16A-4C15-42FD-B511-711EAFCDA402}"/>
+              </a:ext>
+            </a:extLst>
+          </p:cNvPr>
           <p:cNvSpPr txBox="1"/>
           <p:nvPr/>
         </p:nvSpPr>
         <p:spPr>
           <a:xfrm>
-            <a:off x="3554818" y="1350878"/>
-            <a:ext cx="1159933" cy="369332"/>
+            <a:off x="1659424" y="3983846"/>
+            <a:ext cx="767859" cy="312730"/>
           </a:xfrm>
           <a:prstGeom prst="rect">
             <a:avLst/>
@@ -4077,1324 +4891,15 @@
           <a:noFill/>
         </p:spPr>
         <p:txBody>
-          <a:bodyPr wrap="none" rtlCol="0">
+          <a:bodyPr wrap="square" rtlCol="0">
             <a:spAutoFit/>
           </a:bodyPr>
           <a:lstStyle/>
           <a:p>
             <a:r>
-              <a:rPr lang="en-US" dirty="0" smtClean="0"/>
-              <a:t>last_name</a:t>
-            </a:r>
-            <a:endParaRPr lang="en-US" dirty="0"/>
-          </a:p>
-        </p:txBody>
-      </p:sp>
-      <p:sp>
-        <p:nvSpPr>
-          <p:cNvPr id="76" name="TextBox 75"/>
-          <p:cNvSpPr txBox="1"/>
-          <p:nvPr/>
-        </p:nvSpPr>
-        <p:spPr>
-          <a:xfrm>
-            <a:off x="6243812" y="1053320"/>
-            <a:ext cx="684675" cy="369332"/>
-          </a:xfrm>
-          <a:prstGeom prst="rect">
-            <a:avLst/>
-          </a:prstGeom>
-          <a:noFill/>
-        </p:spPr>
-        <p:txBody>
-          <a:bodyPr wrap="none" rtlCol="0">
-            <a:spAutoFit/>
-          </a:bodyPr>
-          <a:lstStyle/>
-          <a:p>
-            <a:r>
-              <a:rPr lang="en-US" dirty="0" smtClean="0"/>
-              <a:t>score</a:t>
-            </a:r>
-            <a:endParaRPr lang="en-US" dirty="0"/>
-          </a:p>
-        </p:txBody>
-      </p:sp>
-      <p:sp>
-        <p:nvSpPr>
-          <p:cNvPr id="77" name="TextBox 76"/>
-          <p:cNvSpPr txBox="1"/>
-          <p:nvPr/>
-        </p:nvSpPr>
-        <p:spPr>
-          <a:xfrm>
-            <a:off x="9512669" y="1051656"/>
-            <a:ext cx="559769" cy="369332"/>
-          </a:xfrm>
-          <a:prstGeom prst="rect">
-            <a:avLst/>
-          </a:prstGeom>
-          <a:noFill/>
-        </p:spPr>
-        <p:txBody>
-          <a:bodyPr wrap="none" rtlCol="0">
-            <a:spAutoFit/>
-          </a:bodyPr>
-          <a:lstStyle/>
-          <a:p>
-            <a:r>
-              <a:rPr lang="en-US" dirty="0" smtClean="0"/>
-              <a:t>title</a:t>
-            </a:r>
-            <a:endParaRPr lang="en-US" dirty="0"/>
-          </a:p>
-        </p:txBody>
-      </p:sp>
-      <p:sp>
-        <p:nvSpPr>
-          <p:cNvPr id="78" name="TextBox 77"/>
-          <p:cNvSpPr txBox="1"/>
-          <p:nvPr/>
-        </p:nvSpPr>
-        <p:spPr>
-          <a:xfrm>
-            <a:off x="9543336" y="755280"/>
-            <a:ext cx="364202" cy="369332"/>
-          </a:xfrm>
-          <a:prstGeom prst="rect">
-            <a:avLst/>
-          </a:prstGeom>
-          <a:noFill/>
-        </p:spPr>
-        <p:txBody>
-          <a:bodyPr wrap="none" rtlCol="0">
-            <a:spAutoFit/>
-          </a:bodyPr>
-          <a:lstStyle/>
-          <a:p>
-            <a:r>
-              <a:rPr lang="en-US" b="1" dirty="0" smtClean="0"/>
-              <a:t>id</a:t>
-            </a:r>
-            <a:endParaRPr lang="en-US" b="1" dirty="0"/>
-          </a:p>
-        </p:txBody>
-      </p:sp>
-      <p:sp>
-        <p:nvSpPr>
-          <p:cNvPr id="79" name="TextBox 78"/>
-          <p:cNvSpPr txBox="1"/>
-          <p:nvPr/>
-        </p:nvSpPr>
-        <p:spPr>
-          <a:xfrm>
-            <a:off x="6287064" y="787274"/>
-            <a:ext cx="364202" cy="369332"/>
-          </a:xfrm>
-          <a:prstGeom prst="rect">
-            <a:avLst/>
-          </a:prstGeom>
-          <a:noFill/>
-        </p:spPr>
-        <p:txBody>
-          <a:bodyPr wrap="none" rtlCol="0">
-            <a:spAutoFit/>
-          </a:bodyPr>
-          <a:lstStyle/>
-          <a:p>
-            <a:r>
-              <a:rPr lang="en-US" b="1" dirty="0" smtClean="0"/>
-              <a:t>id</a:t>
-            </a:r>
-            <a:endParaRPr lang="en-US" b="1" dirty="0"/>
-          </a:p>
-        </p:txBody>
-      </p:sp>
-      <p:sp>
-        <p:nvSpPr>
-          <p:cNvPr id="80" name="TextBox 79"/>
-          <p:cNvSpPr txBox="1"/>
-          <p:nvPr/>
-        </p:nvSpPr>
-        <p:spPr>
-          <a:xfrm>
-            <a:off x="3598367" y="787274"/>
-            <a:ext cx="364202" cy="369332"/>
-          </a:xfrm>
-          <a:prstGeom prst="rect">
-            <a:avLst/>
-          </a:prstGeom>
-          <a:noFill/>
-        </p:spPr>
-        <p:txBody>
-          <a:bodyPr wrap="none" rtlCol="0">
-            <a:spAutoFit/>
-          </a:bodyPr>
-          <a:lstStyle/>
-          <a:p>
-            <a:r>
-              <a:rPr lang="en-US" b="1" dirty="0" smtClean="0"/>
-              <a:t>id</a:t>
-            </a:r>
-            <a:endParaRPr lang="en-US" b="1" dirty="0"/>
-          </a:p>
-        </p:txBody>
-      </p:sp>
-      <p:sp>
-        <p:nvSpPr>
-          <p:cNvPr id="81" name="TextBox 80"/>
-          <p:cNvSpPr txBox="1"/>
-          <p:nvPr/>
-        </p:nvSpPr>
-        <p:spPr>
-          <a:xfrm>
-            <a:off x="978566" y="800151"/>
-            <a:ext cx="364202" cy="369332"/>
-          </a:xfrm>
-          <a:prstGeom prst="rect">
-            <a:avLst/>
-          </a:prstGeom>
-          <a:noFill/>
-        </p:spPr>
-        <p:txBody>
-          <a:bodyPr wrap="none" rtlCol="0">
-            <a:spAutoFit/>
-          </a:bodyPr>
-          <a:lstStyle/>
-          <a:p>
-            <a:r>
-              <a:rPr lang="en-US" b="1" dirty="0" smtClean="0"/>
-              <a:t>id</a:t>
-            </a:r>
-            <a:endParaRPr lang="en-US" b="1" dirty="0"/>
-          </a:p>
-        </p:txBody>
-      </p:sp>
-      <p:sp>
-        <p:nvSpPr>
-          <p:cNvPr id="82" name="TextBox 81"/>
-          <p:cNvSpPr txBox="1"/>
-          <p:nvPr/>
-        </p:nvSpPr>
-        <p:spPr>
-          <a:xfrm>
-            <a:off x="923618" y="1111784"/>
-            <a:ext cx="716863" cy="369332"/>
-          </a:xfrm>
-          <a:prstGeom prst="rect">
-            <a:avLst/>
-          </a:prstGeom>
-          <a:noFill/>
-        </p:spPr>
-        <p:txBody>
-          <a:bodyPr wrap="none" rtlCol="0">
-            <a:spAutoFit/>
-          </a:bodyPr>
-          <a:lstStyle/>
-          <a:p>
-            <a:r>
-              <a:rPr lang="en-US" dirty="0" smtClean="0"/>
-              <a:t>name</a:t>
-            </a:r>
-            <a:endParaRPr lang="en-US" dirty="0"/>
-          </a:p>
-        </p:txBody>
-      </p:sp>
-      <p:sp>
-        <p:nvSpPr>
-          <p:cNvPr id="83" name="TextBox 82"/>
-          <p:cNvSpPr txBox="1"/>
-          <p:nvPr/>
-        </p:nvSpPr>
-        <p:spPr>
-          <a:xfrm>
-            <a:off x="6333794" y="5032084"/>
-            <a:ext cx="559769" cy="369332"/>
-          </a:xfrm>
-          <a:prstGeom prst="rect">
-            <a:avLst/>
-          </a:prstGeom>
-          <a:noFill/>
-        </p:spPr>
-        <p:txBody>
-          <a:bodyPr wrap="none" rtlCol="0">
-            <a:spAutoFit/>
-          </a:bodyPr>
-          <a:lstStyle/>
-          <a:p>
-            <a:r>
-              <a:rPr lang="en-US" dirty="0" smtClean="0"/>
-              <a:t>title</a:t>
-            </a:r>
-            <a:endParaRPr lang="en-US" dirty="0"/>
-          </a:p>
-        </p:txBody>
-      </p:sp>
-      <p:sp>
-        <p:nvSpPr>
-          <p:cNvPr id="84" name="TextBox 83"/>
-          <p:cNvSpPr txBox="1"/>
-          <p:nvPr/>
-        </p:nvSpPr>
-        <p:spPr>
-          <a:xfrm>
-            <a:off x="6386433" y="4673967"/>
-            <a:ext cx="364202" cy="369332"/>
-          </a:xfrm>
-          <a:prstGeom prst="rect">
-            <a:avLst/>
-          </a:prstGeom>
-          <a:noFill/>
-        </p:spPr>
-        <p:txBody>
-          <a:bodyPr wrap="none" rtlCol="0">
-            <a:spAutoFit/>
-          </a:bodyPr>
-          <a:lstStyle/>
-          <a:p>
-            <a:r>
-              <a:rPr lang="en-US" b="1" dirty="0" smtClean="0"/>
-              <a:t>id</a:t>
-            </a:r>
-            <a:endParaRPr lang="en-US" b="1" dirty="0"/>
-          </a:p>
-        </p:txBody>
-      </p:sp>
-      <p:sp>
-        <p:nvSpPr>
-          <p:cNvPr id="85" name="TextBox 84"/>
-          <p:cNvSpPr txBox="1"/>
-          <p:nvPr/>
-        </p:nvSpPr>
-        <p:spPr>
-          <a:xfrm>
-            <a:off x="3567083" y="1608716"/>
-            <a:ext cx="485774" cy="369332"/>
-          </a:xfrm>
-          <a:prstGeom prst="rect">
-            <a:avLst/>
-          </a:prstGeom>
-          <a:noFill/>
-        </p:spPr>
-        <p:txBody>
-          <a:bodyPr wrap="none" rtlCol="0">
-            <a:spAutoFit/>
-          </a:bodyPr>
-          <a:lstStyle/>
-          <a:p>
-            <a:r>
-              <a:rPr lang="en-US" dirty="0" smtClean="0"/>
-              <a:t>sex</a:t>
-            </a:r>
-            <a:endParaRPr lang="en-US" dirty="0"/>
-          </a:p>
-        </p:txBody>
-      </p:sp>
-      <p:sp>
-        <p:nvSpPr>
-          <p:cNvPr id="86" name="TextBox 85"/>
-          <p:cNvSpPr txBox="1"/>
-          <p:nvPr/>
-        </p:nvSpPr>
-        <p:spPr>
-          <a:xfrm>
-            <a:off x="998712" y="4769421"/>
-            <a:ext cx="364202" cy="369332"/>
-          </a:xfrm>
-          <a:prstGeom prst="rect">
-            <a:avLst/>
-          </a:prstGeom>
-          <a:noFill/>
-        </p:spPr>
-        <p:txBody>
-          <a:bodyPr wrap="none" rtlCol="0">
-            <a:spAutoFit/>
-          </a:bodyPr>
-          <a:lstStyle/>
-          <a:p>
-            <a:r>
-              <a:rPr lang="en-US" b="1" dirty="0" smtClean="0"/>
-              <a:t>id</a:t>
-            </a:r>
-            <a:endParaRPr lang="en-US" b="1" dirty="0"/>
-          </a:p>
-        </p:txBody>
-      </p:sp>
-      <p:sp>
-        <p:nvSpPr>
-          <p:cNvPr id="87" name="TextBox 86"/>
-          <p:cNvSpPr txBox="1"/>
-          <p:nvPr/>
-        </p:nvSpPr>
-        <p:spPr>
-          <a:xfrm>
-            <a:off x="1006003" y="5090145"/>
-            <a:ext cx="716863" cy="369332"/>
-          </a:xfrm>
-          <a:prstGeom prst="rect">
-            <a:avLst/>
-          </a:prstGeom>
-          <a:noFill/>
-        </p:spPr>
-        <p:txBody>
-          <a:bodyPr wrap="none" rtlCol="0">
-            <a:spAutoFit/>
-          </a:bodyPr>
-          <a:lstStyle/>
-          <a:p>
-            <a:r>
-              <a:rPr lang="en-US" smtClean="0"/>
-              <a:t>name</a:t>
-            </a:r>
-            <a:endParaRPr lang="en-US" dirty="0"/>
-          </a:p>
-        </p:txBody>
-      </p:sp>
-      <p:sp>
-        <p:nvSpPr>
-          <p:cNvPr id="88" name="TextBox 87"/>
-          <p:cNvSpPr txBox="1"/>
-          <p:nvPr/>
-        </p:nvSpPr>
-        <p:spPr>
-          <a:xfrm>
-            <a:off x="2456749" y="895546"/>
-            <a:ext cx="301686" cy="369332"/>
-          </a:xfrm>
-          <a:prstGeom prst="rect">
-            <a:avLst/>
-          </a:prstGeom>
-          <a:noFill/>
-        </p:spPr>
-        <p:txBody>
-          <a:bodyPr wrap="none" rtlCol="0">
-            <a:spAutoFit/>
-          </a:bodyPr>
-          <a:lstStyle/>
-          <a:p>
-            <a:r>
-              <a:rPr lang="en-US" dirty="0" smtClean="0">
-                <a:solidFill>
-                  <a:schemeClr val="accent1"/>
-                </a:solidFill>
-              </a:rPr>
+              <a:rPr lang="en-US" sz="1400" dirty="0"/>
               <a:t>1</a:t>
             </a:r>
-            <a:endParaRPr lang="en-US" dirty="0">
-              <a:solidFill>
-                <a:schemeClr val="accent1"/>
-              </a:solidFill>
-            </a:endParaRPr>
-          </a:p>
-        </p:txBody>
-      </p:sp>
-      <p:sp>
-        <p:nvSpPr>
-          <p:cNvPr id="89" name="TextBox 88"/>
-          <p:cNvSpPr txBox="1"/>
-          <p:nvPr/>
-        </p:nvSpPr>
-        <p:spPr>
-          <a:xfrm>
-            <a:off x="2948059" y="933147"/>
-            <a:ext cx="301686" cy="369332"/>
-          </a:xfrm>
-          <a:prstGeom prst="rect">
-            <a:avLst/>
-          </a:prstGeom>
-          <a:noFill/>
-        </p:spPr>
-        <p:txBody>
-          <a:bodyPr wrap="none" rtlCol="0">
-            <a:spAutoFit/>
-          </a:bodyPr>
-          <a:lstStyle/>
-          <a:p>
-            <a:r>
-              <a:rPr lang="en-US" dirty="0" smtClean="0">
-                <a:solidFill>
-                  <a:schemeClr val="accent1"/>
-                </a:solidFill>
-              </a:rPr>
-              <a:t>*</a:t>
-            </a:r>
-            <a:endParaRPr lang="en-US" dirty="0">
-              <a:solidFill>
-                <a:schemeClr val="accent1"/>
-              </a:solidFill>
-            </a:endParaRPr>
-          </a:p>
-        </p:txBody>
-      </p:sp>
-      <p:sp>
-        <p:nvSpPr>
-          <p:cNvPr id="90" name="TextBox 89"/>
-          <p:cNvSpPr txBox="1"/>
-          <p:nvPr/>
-        </p:nvSpPr>
-        <p:spPr>
-          <a:xfrm>
-            <a:off x="5149269" y="878302"/>
-            <a:ext cx="301686" cy="369332"/>
-          </a:xfrm>
-          <a:prstGeom prst="rect">
-            <a:avLst/>
-          </a:prstGeom>
-          <a:noFill/>
-        </p:spPr>
-        <p:txBody>
-          <a:bodyPr wrap="none" rtlCol="0">
-            <a:spAutoFit/>
-          </a:bodyPr>
-          <a:lstStyle/>
-          <a:p>
-            <a:r>
-              <a:rPr lang="en-US" dirty="0" smtClean="0">
-                <a:solidFill>
-                  <a:schemeClr val="accent1"/>
-                </a:solidFill>
-              </a:rPr>
-              <a:t>1</a:t>
-            </a:r>
-            <a:endParaRPr lang="en-US" dirty="0">
-              <a:solidFill>
-                <a:schemeClr val="accent1"/>
-              </a:solidFill>
-            </a:endParaRPr>
-          </a:p>
-        </p:txBody>
-      </p:sp>
-      <p:sp>
-        <p:nvSpPr>
-          <p:cNvPr id="91" name="TextBox 90"/>
-          <p:cNvSpPr txBox="1"/>
-          <p:nvPr/>
-        </p:nvSpPr>
-        <p:spPr>
-          <a:xfrm>
-            <a:off x="5640579" y="915903"/>
-            <a:ext cx="301686" cy="369332"/>
-          </a:xfrm>
-          <a:prstGeom prst="rect">
-            <a:avLst/>
-          </a:prstGeom>
-          <a:noFill/>
-        </p:spPr>
-        <p:txBody>
-          <a:bodyPr wrap="none" rtlCol="0">
-            <a:spAutoFit/>
-          </a:bodyPr>
-          <a:lstStyle/>
-          <a:p>
-            <a:r>
-              <a:rPr lang="en-US" dirty="0" smtClean="0">
-                <a:solidFill>
-                  <a:schemeClr val="accent1"/>
-                </a:solidFill>
-              </a:rPr>
-              <a:t>*</a:t>
-            </a:r>
-            <a:endParaRPr lang="en-US" dirty="0">
-              <a:solidFill>
-                <a:schemeClr val="accent1"/>
-              </a:solidFill>
-            </a:endParaRPr>
-          </a:p>
-        </p:txBody>
-      </p:sp>
-      <p:sp>
-        <p:nvSpPr>
-          <p:cNvPr id="92" name="TextBox 91"/>
-          <p:cNvSpPr txBox="1"/>
-          <p:nvPr/>
-        </p:nvSpPr>
-        <p:spPr>
-          <a:xfrm>
-            <a:off x="8899781" y="888691"/>
-            <a:ext cx="301686" cy="369332"/>
-          </a:xfrm>
-          <a:prstGeom prst="rect">
-            <a:avLst/>
-          </a:prstGeom>
-          <a:noFill/>
-        </p:spPr>
-        <p:txBody>
-          <a:bodyPr wrap="none" rtlCol="0">
-            <a:spAutoFit/>
-          </a:bodyPr>
-          <a:lstStyle/>
-          <a:p>
-            <a:r>
-              <a:rPr lang="en-US" dirty="0" smtClean="0">
-                <a:solidFill>
-                  <a:schemeClr val="accent1"/>
-                </a:solidFill>
-              </a:rPr>
-              <a:t>1</a:t>
-            </a:r>
-            <a:endParaRPr lang="en-US" dirty="0">
-              <a:solidFill>
-                <a:schemeClr val="accent1"/>
-              </a:solidFill>
-            </a:endParaRPr>
-          </a:p>
-        </p:txBody>
-      </p:sp>
-      <p:sp>
-        <p:nvSpPr>
-          <p:cNvPr id="93" name="TextBox 92"/>
-          <p:cNvSpPr txBox="1"/>
-          <p:nvPr/>
-        </p:nvSpPr>
-        <p:spPr>
-          <a:xfrm>
-            <a:off x="7897559" y="927118"/>
-            <a:ext cx="301686" cy="369332"/>
-          </a:xfrm>
-          <a:prstGeom prst="rect">
-            <a:avLst/>
-          </a:prstGeom>
-          <a:noFill/>
-        </p:spPr>
-        <p:txBody>
-          <a:bodyPr wrap="none" rtlCol="0">
-            <a:spAutoFit/>
-          </a:bodyPr>
-          <a:lstStyle/>
-          <a:p>
-            <a:r>
-              <a:rPr lang="en-US" dirty="0" smtClean="0">
-                <a:solidFill>
-                  <a:schemeClr val="accent1"/>
-                </a:solidFill>
-              </a:rPr>
-              <a:t>*</a:t>
-            </a:r>
-            <a:endParaRPr lang="en-US" dirty="0">
-              <a:solidFill>
-                <a:schemeClr val="accent1"/>
-              </a:solidFill>
-            </a:endParaRPr>
-          </a:p>
-        </p:txBody>
-      </p:sp>
-      <p:sp>
-        <p:nvSpPr>
-          <p:cNvPr id="94" name="TextBox 93"/>
-          <p:cNvSpPr txBox="1"/>
-          <p:nvPr/>
-        </p:nvSpPr>
-        <p:spPr>
-          <a:xfrm>
-            <a:off x="6927562" y="3844734"/>
-            <a:ext cx="301686" cy="369332"/>
-          </a:xfrm>
-          <a:prstGeom prst="rect">
-            <a:avLst/>
-          </a:prstGeom>
-          <a:noFill/>
-        </p:spPr>
-        <p:txBody>
-          <a:bodyPr wrap="none" rtlCol="0">
-            <a:spAutoFit/>
-          </a:bodyPr>
-          <a:lstStyle/>
-          <a:p>
-            <a:r>
-              <a:rPr lang="en-US" dirty="0" smtClean="0">
-                <a:solidFill>
-                  <a:schemeClr val="accent1"/>
-                </a:solidFill>
-              </a:rPr>
-              <a:t>1</a:t>
-            </a:r>
-            <a:endParaRPr lang="en-US" dirty="0">
-              <a:solidFill>
-                <a:schemeClr val="accent1"/>
-              </a:solidFill>
-            </a:endParaRPr>
-          </a:p>
-        </p:txBody>
-      </p:sp>
-      <p:sp>
-        <p:nvSpPr>
-          <p:cNvPr id="95" name="TextBox 94"/>
-          <p:cNvSpPr txBox="1"/>
-          <p:nvPr/>
-        </p:nvSpPr>
-        <p:spPr>
-          <a:xfrm>
-            <a:off x="6909826" y="2690473"/>
-            <a:ext cx="301686" cy="369332"/>
-          </a:xfrm>
-          <a:prstGeom prst="rect">
-            <a:avLst/>
-          </a:prstGeom>
-          <a:noFill/>
-        </p:spPr>
-        <p:txBody>
-          <a:bodyPr wrap="none" rtlCol="0">
-            <a:spAutoFit/>
-          </a:bodyPr>
-          <a:lstStyle/>
-          <a:p>
-            <a:r>
-              <a:rPr lang="en-US" dirty="0" smtClean="0">
-                <a:solidFill>
-                  <a:schemeClr val="accent1"/>
-                </a:solidFill>
-              </a:rPr>
-              <a:t>*</a:t>
-            </a:r>
-            <a:endParaRPr lang="en-US" dirty="0">
-              <a:solidFill>
-                <a:schemeClr val="accent1"/>
-              </a:solidFill>
-            </a:endParaRPr>
-          </a:p>
-        </p:txBody>
-      </p:sp>
-      <p:sp>
-        <p:nvSpPr>
-          <p:cNvPr id="96" name="TextBox 95"/>
-          <p:cNvSpPr txBox="1"/>
-          <p:nvPr/>
-        </p:nvSpPr>
-        <p:spPr>
-          <a:xfrm>
-            <a:off x="1650748" y="2668822"/>
-            <a:ext cx="301686" cy="369332"/>
-          </a:xfrm>
-          <a:prstGeom prst="rect">
-            <a:avLst/>
-          </a:prstGeom>
-          <a:noFill/>
-        </p:spPr>
-        <p:txBody>
-          <a:bodyPr wrap="none" rtlCol="0">
-            <a:spAutoFit/>
-          </a:bodyPr>
-          <a:lstStyle/>
-          <a:p>
-            <a:r>
-              <a:rPr lang="en-US" dirty="0" smtClean="0">
-                <a:solidFill>
-                  <a:schemeClr val="accent1"/>
-                </a:solidFill>
-              </a:rPr>
-              <a:t>*</a:t>
-            </a:r>
-            <a:endParaRPr lang="en-US" dirty="0">
-              <a:solidFill>
-                <a:schemeClr val="accent1"/>
-              </a:solidFill>
-            </a:endParaRPr>
-          </a:p>
-        </p:txBody>
-      </p:sp>
-      <p:sp>
-        <p:nvSpPr>
-          <p:cNvPr id="97" name="TextBox 96"/>
-          <p:cNvSpPr txBox="1"/>
-          <p:nvPr/>
-        </p:nvSpPr>
-        <p:spPr>
-          <a:xfrm>
-            <a:off x="1667685" y="3821834"/>
-            <a:ext cx="301686" cy="369332"/>
-          </a:xfrm>
-          <a:prstGeom prst="rect">
-            <a:avLst/>
-          </a:prstGeom>
-          <a:noFill/>
-        </p:spPr>
-        <p:txBody>
-          <a:bodyPr wrap="none" rtlCol="0">
-            <a:spAutoFit/>
-          </a:bodyPr>
-          <a:lstStyle/>
-          <a:p>
-            <a:r>
-              <a:rPr lang="en-US" dirty="0" smtClean="0">
-                <a:solidFill>
-                  <a:schemeClr val="accent1"/>
-                </a:solidFill>
-              </a:rPr>
-              <a:t>1</a:t>
-            </a:r>
-            <a:endParaRPr lang="en-US" dirty="0">
-              <a:solidFill>
-                <a:schemeClr val="accent1"/>
-              </a:solidFill>
-            </a:endParaRPr>
-          </a:p>
-        </p:txBody>
-      </p:sp>
-      <p:sp>
-        <p:nvSpPr>
-          <p:cNvPr id="98" name="TextBox 97"/>
-          <p:cNvSpPr txBox="1"/>
-          <p:nvPr/>
-        </p:nvSpPr>
-        <p:spPr>
-          <a:xfrm>
-            <a:off x="577750" y="830929"/>
-            <a:ext cx="405880" cy="338554"/>
-          </a:xfrm>
-          <a:prstGeom prst="rect">
-            <a:avLst/>
-          </a:prstGeom>
-          <a:noFill/>
-        </p:spPr>
-        <p:txBody>
-          <a:bodyPr wrap="none" rtlCol="0">
-            <a:spAutoFit/>
-          </a:bodyPr>
-          <a:lstStyle/>
-          <a:p>
-            <a:r>
-              <a:rPr lang="en-US" sz="1600" b="1" dirty="0" smtClean="0">
-                <a:solidFill>
-                  <a:schemeClr val="accent2"/>
-                </a:solidFill>
-              </a:rPr>
-              <a:t>PK</a:t>
-            </a:r>
-            <a:endParaRPr lang="en-US" sz="1600" b="1" dirty="0">
-              <a:solidFill>
-                <a:schemeClr val="accent2"/>
-              </a:solidFill>
-            </a:endParaRPr>
-          </a:p>
-        </p:txBody>
-      </p:sp>
-      <p:sp>
-        <p:nvSpPr>
-          <p:cNvPr id="99" name="TextBox 98"/>
-          <p:cNvSpPr txBox="1"/>
-          <p:nvPr/>
-        </p:nvSpPr>
-        <p:spPr>
-          <a:xfrm>
-            <a:off x="587580" y="4800199"/>
-            <a:ext cx="405880" cy="338554"/>
-          </a:xfrm>
-          <a:prstGeom prst="rect">
-            <a:avLst/>
-          </a:prstGeom>
-          <a:noFill/>
-        </p:spPr>
-        <p:txBody>
-          <a:bodyPr wrap="none" rtlCol="0">
-            <a:spAutoFit/>
-          </a:bodyPr>
-          <a:lstStyle/>
-          <a:p>
-            <a:r>
-              <a:rPr lang="en-US" sz="1600" b="1" dirty="0" smtClean="0">
-                <a:solidFill>
-                  <a:schemeClr val="accent2"/>
-                </a:solidFill>
-              </a:rPr>
-              <a:t>PK</a:t>
-            </a:r>
-            <a:endParaRPr lang="en-US" sz="1600" b="1" dirty="0">
-              <a:solidFill>
-                <a:schemeClr val="accent2"/>
-              </a:solidFill>
-            </a:endParaRPr>
-          </a:p>
-        </p:txBody>
-      </p:sp>
-      <p:sp>
-        <p:nvSpPr>
-          <p:cNvPr id="100" name="TextBox 99"/>
-          <p:cNvSpPr txBox="1"/>
-          <p:nvPr/>
-        </p:nvSpPr>
-        <p:spPr>
-          <a:xfrm>
-            <a:off x="3273405" y="811222"/>
-            <a:ext cx="405880" cy="338554"/>
-          </a:xfrm>
-          <a:prstGeom prst="rect">
-            <a:avLst/>
-          </a:prstGeom>
-          <a:noFill/>
-        </p:spPr>
-        <p:txBody>
-          <a:bodyPr wrap="none" rtlCol="0">
-            <a:spAutoFit/>
-          </a:bodyPr>
-          <a:lstStyle/>
-          <a:p>
-            <a:r>
-              <a:rPr lang="en-US" sz="1600" b="1" dirty="0" smtClean="0">
-                <a:solidFill>
-                  <a:schemeClr val="accent2"/>
-                </a:solidFill>
-              </a:rPr>
-              <a:t>PK</a:t>
-            </a:r>
-            <a:endParaRPr lang="en-US" sz="1600" b="1" dirty="0">
-              <a:solidFill>
-                <a:schemeClr val="accent2"/>
-              </a:solidFill>
-            </a:endParaRPr>
-          </a:p>
-        </p:txBody>
-      </p:sp>
-      <p:sp>
-        <p:nvSpPr>
-          <p:cNvPr id="101" name="TextBox 100"/>
-          <p:cNvSpPr txBox="1"/>
-          <p:nvPr/>
-        </p:nvSpPr>
-        <p:spPr>
-          <a:xfrm>
-            <a:off x="5924503" y="821611"/>
-            <a:ext cx="405880" cy="338554"/>
-          </a:xfrm>
-          <a:prstGeom prst="rect">
-            <a:avLst/>
-          </a:prstGeom>
-          <a:noFill/>
-        </p:spPr>
-        <p:txBody>
-          <a:bodyPr wrap="none" rtlCol="0">
-            <a:spAutoFit/>
-          </a:bodyPr>
-          <a:lstStyle/>
-          <a:p>
-            <a:r>
-              <a:rPr lang="en-US" sz="1600" b="1" dirty="0" smtClean="0">
-                <a:solidFill>
-                  <a:schemeClr val="accent2"/>
-                </a:solidFill>
-              </a:rPr>
-              <a:t>PK</a:t>
-            </a:r>
-            <a:endParaRPr lang="en-US" sz="1600" b="1" dirty="0">
-              <a:solidFill>
-                <a:schemeClr val="accent2"/>
-              </a:solidFill>
-            </a:endParaRPr>
-          </a:p>
-        </p:txBody>
-      </p:sp>
-      <p:sp>
-        <p:nvSpPr>
-          <p:cNvPr id="102" name="TextBox 101"/>
-          <p:cNvSpPr txBox="1"/>
-          <p:nvPr/>
-        </p:nvSpPr>
-        <p:spPr>
-          <a:xfrm>
-            <a:off x="9188123" y="783421"/>
-            <a:ext cx="405880" cy="338554"/>
-          </a:xfrm>
-          <a:prstGeom prst="rect">
-            <a:avLst/>
-          </a:prstGeom>
-          <a:noFill/>
-        </p:spPr>
-        <p:txBody>
-          <a:bodyPr wrap="none" rtlCol="0">
-            <a:spAutoFit/>
-          </a:bodyPr>
-          <a:lstStyle/>
-          <a:p>
-            <a:r>
-              <a:rPr lang="en-US" sz="1600" b="1" dirty="0" smtClean="0">
-                <a:solidFill>
-                  <a:schemeClr val="accent2"/>
-                </a:solidFill>
-              </a:rPr>
-              <a:t>PK</a:t>
-            </a:r>
-            <a:endParaRPr lang="en-US" sz="1600" b="1" dirty="0">
-              <a:solidFill>
-                <a:schemeClr val="accent2"/>
-              </a:solidFill>
-            </a:endParaRPr>
-          </a:p>
-        </p:txBody>
-      </p:sp>
-      <p:sp>
-        <p:nvSpPr>
-          <p:cNvPr id="103" name="TextBox 102"/>
-          <p:cNvSpPr txBox="1"/>
-          <p:nvPr/>
-        </p:nvSpPr>
-        <p:spPr>
-          <a:xfrm>
-            <a:off x="6001050" y="4693530"/>
-            <a:ext cx="405880" cy="338554"/>
-          </a:xfrm>
-          <a:prstGeom prst="rect">
-            <a:avLst/>
-          </a:prstGeom>
-          <a:noFill/>
-        </p:spPr>
-        <p:txBody>
-          <a:bodyPr wrap="none" rtlCol="0">
-            <a:spAutoFit/>
-          </a:bodyPr>
-          <a:lstStyle/>
-          <a:p>
-            <a:r>
-              <a:rPr lang="en-US" sz="1600" b="1" dirty="0" smtClean="0">
-                <a:solidFill>
-                  <a:schemeClr val="accent2"/>
-                </a:solidFill>
-              </a:rPr>
-              <a:t>PK</a:t>
-            </a:r>
-            <a:endParaRPr lang="en-US" sz="1600" b="1" dirty="0">
-              <a:solidFill>
-                <a:schemeClr val="accent2"/>
-              </a:solidFill>
-            </a:endParaRPr>
-          </a:p>
-        </p:txBody>
-      </p:sp>
-      <p:sp>
-        <p:nvSpPr>
-          <p:cNvPr id="104" name="TextBox 103"/>
-          <p:cNvSpPr txBox="1"/>
-          <p:nvPr/>
-        </p:nvSpPr>
-        <p:spPr>
-          <a:xfrm>
-            <a:off x="936060" y="1617174"/>
-            <a:ext cx="1002069" cy="369332"/>
-          </a:xfrm>
-          <a:prstGeom prst="rect">
-            <a:avLst/>
-          </a:prstGeom>
-          <a:noFill/>
-        </p:spPr>
-        <p:txBody>
-          <a:bodyPr wrap="none" rtlCol="0">
-            <a:spAutoFit/>
-          </a:bodyPr>
-          <a:lstStyle/>
-          <a:p>
-            <a:r>
-              <a:rPr lang="en-US" dirty="0" smtClean="0"/>
-              <a:t>batch_id</a:t>
-            </a:r>
-            <a:endParaRPr lang="en-US" dirty="0"/>
-          </a:p>
-        </p:txBody>
-      </p:sp>
-      <p:sp>
-        <p:nvSpPr>
-          <p:cNvPr id="105" name="TextBox 104"/>
-          <p:cNvSpPr txBox="1"/>
-          <p:nvPr/>
-        </p:nvSpPr>
-        <p:spPr>
-          <a:xfrm>
-            <a:off x="619753" y="1623472"/>
-            <a:ext cx="391454" cy="338554"/>
-          </a:xfrm>
-          <a:prstGeom prst="rect">
-            <a:avLst/>
-          </a:prstGeom>
-          <a:noFill/>
-        </p:spPr>
-        <p:txBody>
-          <a:bodyPr wrap="none" rtlCol="0">
-            <a:spAutoFit/>
-          </a:bodyPr>
-          <a:lstStyle/>
-          <a:p>
-            <a:r>
-              <a:rPr lang="en-US" sz="1600" b="1" dirty="0" smtClean="0">
-                <a:solidFill>
-                  <a:srgbClr val="7030A0"/>
-                </a:solidFill>
-              </a:rPr>
-              <a:t>FK</a:t>
-            </a:r>
-            <a:endParaRPr lang="en-US" sz="1600" b="1" dirty="0">
-              <a:solidFill>
-                <a:srgbClr val="7030A0"/>
-              </a:solidFill>
-            </a:endParaRPr>
-          </a:p>
-        </p:txBody>
-      </p:sp>
-      <p:sp>
-        <p:nvSpPr>
-          <p:cNvPr id="106" name="TextBox 105"/>
-          <p:cNvSpPr txBox="1"/>
-          <p:nvPr/>
-        </p:nvSpPr>
-        <p:spPr>
-          <a:xfrm>
-            <a:off x="3674846" y="2113379"/>
-            <a:ext cx="915635" cy="369332"/>
-          </a:xfrm>
-          <a:prstGeom prst="rect">
-            <a:avLst/>
-          </a:prstGeom>
-          <a:noFill/>
-        </p:spPr>
-        <p:txBody>
-          <a:bodyPr wrap="none" rtlCol="0">
-            <a:spAutoFit/>
-          </a:bodyPr>
-          <a:lstStyle/>
-          <a:p>
-            <a:r>
-              <a:rPr lang="en-US" dirty="0" smtClean="0"/>
-              <a:t>class_id</a:t>
-            </a:r>
-            <a:endParaRPr lang="en-US" dirty="0"/>
-          </a:p>
-        </p:txBody>
-      </p:sp>
-      <p:sp>
-        <p:nvSpPr>
-          <p:cNvPr id="107" name="TextBox 106"/>
-          <p:cNvSpPr txBox="1"/>
-          <p:nvPr/>
-        </p:nvSpPr>
-        <p:spPr>
-          <a:xfrm>
-            <a:off x="3358539" y="2119677"/>
-            <a:ext cx="391454" cy="338554"/>
-          </a:xfrm>
-          <a:prstGeom prst="rect">
-            <a:avLst/>
-          </a:prstGeom>
-          <a:noFill/>
-        </p:spPr>
-        <p:txBody>
-          <a:bodyPr wrap="none" rtlCol="0">
-            <a:spAutoFit/>
-          </a:bodyPr>
-          <a:lstStyle/>
-          <a:p>
-            <a:r>
-              <a:rPr lang="en-US" sz="1600" b="1" dirty="0" smtClean="0">
-                <a:solidFill>
-                  <a:srgbClr val="7030A0"/>
-                </a:solidFill>
-              </a:rPr>
-              <a:t>FK</a:t>
-            </a:r>
-            <a:endParaRPr lang="en-US" sz="1600" b="1" dirty="0">
-              <a:solidFill>
-                <a:srgbClr val="7030A0"/>
-              </a:solidFill>
-            </a:endParaRPr>
-          </a:p>
-        </p:txBody>
-      </p:sp>
-      <p:sp>
-        <p:nvSpPr>
-          <p:cNvPr id="108" name="TextBox 107"/>
-          <p:cNvSpPr txBox="1"/>
-          <p:nvPr/>
-        </p:nvSpPr>
-        <p:spPr>
-          <a:xfrm>
-            <a:off x="6257853" y="1483685"/>
-            <a:ext cx="1194686" cy="369332"/>
-          </a:xfrm>
-          <a:prstGeom prst="rect">
-            <a:avLst/>
-          </a:prstGeom>
-          <a:noFill/>
-        </p:spPr>
-        <p:txBody>
-          <a:bodyPr wrap="none" rtlCol="0">
-            <a:spAutoFit/>
-          </a:bodyPr>
-          <a:lstStyle/>
-          <a:p>
-            <a:r>
-              <a:rPr lang="en-US" dirty="0" err="1" smtClean="0"/>
-              <a:t>student_id</a:t>
-            </a:r>
-            <a:endParaRPr lang="en-US" dirty="0"/>
-          </a:p>
-        </p:txBody>
-      </p:sp>
-      <p:sp>
-        <p:nvSpPr>
-          <p:cNvPr id="109" name="TextBox 108"/>
-          <p:cNvSpPr txBox="1"/>
-          <p:nvPr/>
-        </p:nvSpPr>
-        <p:spPr>
-          <a:xfrm>
-            <a:off x="5977770" y="1489361"/>
-            <a:ext cx="391454" cy="338554"/>
-          </a:xfrm>
-          <a:prstGeom prst="rect">
-            <a:avLst/>
-          </a:prstGeom>
-          <a:noFill/>
-        </p:spPr>
-        <p:txBody>
-          <a:bodyPr wrap="none" rtlCol="0">
-            <a:spAutoFit/>
-          </a:bodyPr>
-          <a:lstStyle/>
-          <a:p>
-            <a:r>
-              <a:rPr lang="en-US" sz="1600" b="1" dirty="0" smtClean="0">
-                <a:solidFill>
-                  <a:srgbClr val="7030A0"/>
-                </a:solidFill>
-              </a:rPr>
-              <a:t>FK</a:t>
-            </a:r>
-            <a:endParaRPr lang="en-US" sz="1600" b="1" dirty="0">
-              <a:solidFill>
-                <a:srgbClr val="7030A0"/>
-              </a:solidFill>
-            </a:endParaRPr>
-          </a:p>
-        </p:txBody>
-      </p:sp>
-      <p:sp>
-        <p:nvSpPr>
-          <p:cNvPr id="110" name="TextBox 109"/>
-          <p:cNvSpPr txBox="1"/>
-          <p:nvPr/>
-        </p:nvSpPr>
-        <p:spPr>
-          <a:xfrm>
-            <a:off x="6253182" y="1790609"/>
-            <a:ext cx="943848" cy="369332"/>
-          </a:xfrm>
-          <a:prstGeom prst="rect">
-            <a:avLst/>
-          </a:prstGeom>
-          <a:noFill/>
-        </p:spPr>
-        <p:txBody>
-          <a:bodyPr wrap="none" rtlCol="0">
-            <a:spAutoFit/>
-          </a:bodyPr>
-          <a:lstStyle/>
-          <a:p>
-            <a:r>
-              <a:rPr lang="en-US" dirty="0" err="1" smtClean="0"/>
-              <a:t>topic_id</a:t>
-            </a:r>
-            <a:endParaRPr lang="en-US" dirty="0"/>
-          </a:p>
-        </p:txBody>
-      </p:sp>
-      <p:sp>
-        <p:nvSpPr>
-          <p:cNvPr id="111" name="TextBox 110"/>
-          <p:cNvSpPr txBox="1"/>
-          <p:nvPr/>
-        </p:nvSpPr>
-        <p:spPr>
-          <a:xfrm>
-            <a:off x="5961902" y="1814011"/>
-            <a:ext cx="391454" cy="338554"/>
-          </a:xfrm>
-          <a:prstGeom prst="rect">
-            <a:avLst/>
-          </a:prstGeom>
-          <a:noFill/>
-        </p:spPr>
-        <p:txBody>
-          <a:bodyPr wrap="none" rtlCol="0">
-            <a:spAutoFit/>
-          </a:bodyPr>
-          <a:lstStyle/>
-          <a:p>
-            <a:r>
-              <a:rPr lang="en-US" sz="1600" b="1" dirty="0" smtClean="0">
-                <a:solidFill>
-                  <a:srgbClr val="7030A0"/>
-                </a:solidFill>
-              </a:rPr>
-              <a:t>FK</a:t>
-            </a:r>
-            <a:endParaRPr lang="en-US" sz="1600" b="1" dirty="0">
-              <a:solidFill>
-                <a:srgbClr val="7030A0"/>
-              </a:solidFill>
-            </a:endParaRPr>
-          </a:p>
-        </p:txBody>
-      </p:sp>
-      <p:sp>
-        <p:nvSpPr>
-          <p:cNvPr id="112" name="TextBox 111"/>
-          <p:cNvSpPr txBox="1"/>
-          <p:nvPr/>
-        </p:nvSpPr>
-        <p:spPr>
-          <a:xfrm>
-            <a:off x="6257853" y="2137900"/>
-            <a:ext cx="1510991" cy="369332"/>
-          </a:xfrm>
-          <a:prstGeom prst="rect">
-            <a:avLst/>
-          </a:prstGeom>
-          <a:noFill/>
-        </p:spPr>
-        <p:txBody>
-          <a:bodyPr wrap="none" rtlCol="0">
-            <a:spAutoFit/>
-          </a:bodyPr>
-          <a:lstStyle/>
-          <a:p>
-            <a:r>
-              <a:rPr lang="en-US" dirty="0" err="1" smtClean="0"/>
-              <a:t>exam_type_id</a:t>
-            </a:r>
-            <a:endParaRPr lang="en-US" dirty="0"/>
-          </a:p>
-        </p:txBody>
-      </p:sp>
-      <p:sp>
-        <p:nvSpPr>
-          <p:cNvPr id="113" name="TextBox 112"/>
-          <p:cNvSpPr txBox="1"/>
-          <p:nvPr/>
-        </p:nvSpPr>
-        <p:spPr>
-          <a:xfrm>
-            <a:off x="5953321" y="2167847"/>
-            <a:ext cx="391454" cy="338554"/>
-          </a:xfrm>
-          <a:prstGeom prst="rect">
-            <a:avLst/>
-          </a:prstGeom>
-          <a:noFill/>
-        </p:spPr>
-        <p:txBody>
-          <a:bodyPr wrap="none" rtlCol="0">
-            <a:spAutoFit/>
-          </a:bodyPr>
-          <a:lstStyle/>
-          <a:p>
-            <a:r>
-              <a:rPr lang="en-US" sz="1600" b="1" dirty="0" smtClean="0">
-                <a:solidFill>
-                  <a:srgbClr val="7030A0"/>
-                </a:solidFill>
-              </a:rPr>
-              <a:t>FK</a:t>
-            </a:r>
-            <a:endParaRPr lang="en-US" sz="1600" b="1" dirty="0">
-              <a:solidFill>
-                <a:srgbClr val="7030A0"/>
-              </a:solidFill>
-            </a:endParaRPr>
           </a:p>
         </p:txBody>
       </p:sp>

</xml_diff>

<commit_message>
#2 ERD user signin/signup
</commit_message>
<xml_diff>
--- a/docs/ER-DIAGRAM.pptx
+++ b/docs/ER-DIAGRAM.pptx
@@ -3206,10 +3206,10 @@
       </p:grpSpPr>
       <p:graphicFrame>
         <p:nvGraphicFramePr>
-          <p:cNvPr id="114" name="Table 8">
+          <p:cNvPr id="27" name="Table 26">
             <a:extLst>
               <a:ext uri="{FF2B5EF4-FFF2-40B4-BE49-F238E27FC236}">
-                <a16:creationId xmlns:a16="http://schemas.microsoft.com/office/drawing/2014/main" id="{FEC30D0E-E36F-4791-B959-E7F76032C2BA}"/>
+                <a16:creationId xmlns:a16="http://schemas.microsoft.com/office/drawing/2014/main" id="{52F9F186-6061-470D-830B-A21DA9AC9869}"/>
               </a:ext>
             </a:extLst>
           </p:cNvPr>
@@ -3219,295 +3219,13 @@
           <p:nvPr>
             <p:extLst>
               <p:ext uri="{D42A27DB-BD31-4B8C-83A1-F6EECF244321}">
-                <p14:modId xmlns:p14="http://schemas.microsoft.com/office/powerpoint/2010/main" val="1805782902"/>
+                <p14:modId xmlns:p14="http://schemas.microsoft.com/office/powerpoint/2010/main" val="2299806626"/>
               </p:ext>
             </p:extLst>
           </p:nvPr>
         </p:nvGraphicFramePr>
         <p:xfrm>
-          <a:off x="628897" y="1662284"/>
-          <a:ext cx="2646017" cy="2407221"/>
-        </p:xfrm>
-        <a:graphic>
-          <a:graphicData uri="http://schemas.openxmlformats.org/drawingml/2006/table">
-            <a:tbl>
-              <a:tblPr firstRow="1" bandRow="1">
-                <a:tableStyleId>{5C22544A-7EE6-4342-B048-85BDC9FD1C3A}</a:tableStyleId>
-              </a:tblPr>
-              <a:tblGrid>
-                <a:gridCol w="499166">
-                  <a:extLst>
-                    <a:ext uri="{9D8B030D-6E8A-4147-A177-3AD203B41FA5}">
-                      <a16:colId xmlns:a16="http://schemas.microsoft.com/office/drawing/2014/main" val="3052149917"/>
-                    </a:ext>
-                  </a:extLst>
-                </a:gridCol>
-                <a:gridCol w="2146851">
-                  <a:extLst>
-                    <a:ext uri="{9D8B030D-6E8A-4147-A177-3AD203B41FA5}">
-                      <a16:colId xmlns:a16="http://schemas.microsoft.com/office/drawing/2014/main" val="849940379"/>
-                    </a:ext>
-                  </a:extLst>
-                </a:gridCol>
-              </a:tblGrid>
-              <a:tr h="395541">
-                <a:tc gridSpan="2">
-                  <a:txBody>
-                    <a:bodyPr/>
-                    <a:lstStyle/>
-                    <a:p>
-                      <a:r>
-                        <a:rPr lang="en-US" dirty="0"/>
-                        <a:t>              Event</a:t>
-                      </a:r>
-                    </a:p>
-                  </a:txBody>
-                  <a:tcPr/>
-                </a:tc>
-                <a:tc hMerge="1">
-                  <a:txBody>
-                    <a:bodyPr/>
-                    <a:lstStyle/>
-                    <a:p>
-                      <a:endParaRPr lang="en-US" dirty="0"/>
-                    </a:p>
-                  </a:txBody>
-                  <a:tcPr/>
-                </a:tc>
-                <a:extLst>
-                  <a:ext uri="{0D108BD9-81ED-4DB2-BD59-A6C34878D82A}">
-                    <a16:rowId xmlns:a16="http://schemas.microsoft.com/office/drawing/2014/main" val="1300100705"/>
-                  </a:ext>
-                </a:extLst>
-              </a:tr>
-              <a:tr h="395541">
-                <a:tc>
-                  <a:txBody>
-                    <a:bodyPr/>
-                    <a:lstStyle/>
-                    <a:p>
-                      <a:r>
-                        <a:rPr lang="en-US" sz="1400" dirty="0"/>
-                        <a:t>Pk</a:t>
-                      </a:r>
-                    </a:p>
-                    <a:p>
-                      <a:endParaRPr lang="en-US" sz="1600" dirty="0"/>
-                    </a:p>
-                    <a:p>
-                      <a:endParaRPr lang="en-US" sz="1600" dirty="0"/>
-                    </a:p>
-                    <a:p>
-                      <a:endParaRPr lang="en-US" sz="1600" dirty="0"/>
-                    </a:p>
-                    <a:p>
-                      <a:endParaRPr lang="en-US" sz="1600" dirty="0"/>
-                    </a:p>
-                    <a:p>
-                      <a:endParaRPr lang="en-US" sz="1200" dirty="0"/>
-                    </a:p>
-                    <a:p>
-                      <a:r>
-                        <a:rPr lang="en-US" sz="1200" dirty="0" err="1"/>
-                        <a:t>Fk</a:t>
-                      </a:r>
-                      <a:endParaRPr lang="en-US" sz="1200" dirty="0"/>
-                    </a:p>
-                    <a:p>
-                      <a:r>
-                        <a:rPr lang="en-US" sz="1200" dirty="0" err="1"/>
-                        <a:t>Fk</a:t>
-                      </a:r>
-                      <a:endParaRPr lang="en-US" sz="1200" dirty="0"/>
-                    </a:p>
-                    <a:p>
-                      <a:r>
-                        <a:rPr lang="en-US" sz="1200" dirty="0" err="1"/>
-                        <a:t>Fk</a:t>
-                      </a:r>
-                      <a:endParaRPr lang="en-US" sz="1200" dirty="0"/>
-                    </a:p>
-                  </a:txBody>
-                  <a:tcPr/>
-                </a:tc>
-                <a:tc>
-                  <a:txBody>
-                    <a:bodyPr/>
-                    <a:lstStyle/>
-                    <a:p>
-                      <a:r>
-                        <a:rPr lang="en-US" sz="1400" dirty="0"/>
-                        <a:t>id </a:t>
-                      </a:r>
-                      <a:r>
-                        <a:rPr lang="en-US" sz="1400" dirty="0">
-                          <a:solidFill>
-                            <a:srgbClr val="FF0000"/>
-                          </a:solidFill>
-                        </a:rPr>
-                        <a:t>int </a:t>
-                      </a:r>
-                    </a:p>
-                    <a:p>
-                      <a:r>
-                        <a:rPr lang="en-US" sz="1400" dirty="0"/>
-                        <a:t>title </a:t>
-                      </a:r>
-                      <a:r>
-                        <a:rPr lang="en-US" sz="1400" dirty="0">
-                          <a:solidFill>
-                            <a:srgbClr val="FF0000"/>
-                          </a:solidFill>
-                        </a:rPr>
-                        <a:t>string</a:t>
-                      </a:r>
-                    </a:p>
-                    <a:p>
-                      <a:r>
-                        <a:rPr lang="en-US" sz="1400" dirty="0" err="1"/>
-                        <a:t>startAt</a:t>
-                      </a:r>
-                      <a:r>
-                        <a:rPr lang="en-US" sz="1400" dirty="0"/>
-                        <a:t> </a:t>
-                      </a:r>
-                      <a:r>
-                        <a:rPr lang="en-US" sz="1400" dirty="0">
-                          <a:solidFill>
-                            <a:srgbClr val="FF0000"/>
-                          </a:solidFill>
-                        </a:rPr>
-                        <a:t>string</a:t>
-                      </a:r>
-                    </a:p>
-                    <a:p>
-                      <a:r>
-                        <a:rPr lang="en-US" sz="1400" dirty="0" err="1"/>
-                        <a:t>endAt</a:t>
-                      </a:r>
-                      <a:r>
-                        <a:rPr lang="en-US" sz="1400" dirty="0"/>
-                        <a:t> </a:t>
-                      </a:r>
-                      <a:r>
-                        <a:rPr lang="en-US" sz="1400" dirty="0">
-                          <a:solidFill>
-                            <a:srgbClr val="FF0000"/>
-                          </a:solidFill>
-                        </a:rPr>
-                        <a:t>string</a:t>
-                      </a:r>
-                    </a:p>
-                    <a:p>
-                      <a:r>
-                        <a:rPr lang="en-US" sz="1400" dirty="0"/>
-                        <a:t>description </a:t>
-                      </a:r>
-                      <a:r>
-                        <a:rPr lang="en-US" sz="1400" dirty="0">
-                          <a:solidFill>
-                            <a:srgbClr val="FF0000"/>
-                          </a:solidFill>
-                        </a:rPr>
-                        <a:t>string</a:t>
-                      </a:r>
-                    </a:p>
-                    <a:p>
-                      <a:r>
-                        <a:rPr lang="en-US" sz="1400" dirty="0"/>
-                        <a:t>image </a:t>
-                      </a:r>
-                      <a:r>
-                        <a:rPr lang="en-US" sz="1400" dirty="0">
-                          <a:solidFill>
-                            <a:srgbClr val="FF0000"/>
-                          </a:solidFill>
-                        </a:rPr>
-                        <a:t>string </a:t>
-                      </a:r>
-                    </a:p>
-                    <a:p>
-                      <a:r>
-                        <a:rPr lang="en-US" sz="1400" dirty="0" err="1">
-                          <a:solidFill>
-                            <a:schemeClr val="tx1"/>
-                          </a:solidFill>
-                        </a:rPr>
-                        <a:t>location_id</a:t>
-                      </a:r>
-                      <a:endParaRPr lang="en-US" sz="1400" dirty="0">
-                        <a:solidFill>
-                          <a:schemeClr val="tx1"/>
-                        </a:solidFill>
-                      </a:endParaRPr>
-                    </a:p>
-                    <a:p>
-                      <a:r>
-                        <a:rPr lang="en-US" sz="1400" dirty="0" err="1"/>
-                        <a:t>user_id</a:t>
-                      </a:r>
-                      <a:r>
-                        <a:rPr lang="en-US" sz="1400" dirty="0"/>
-                        <a:t> </a:t>
-                      </a:r>
-                      <a:r>
-                        <a:rPr lang="en-US" sz="1400" dirty="0">
-                          <a:solidFill>
-                            <a:srgbClr val="FF0000"/>
-                          </a:solidFill>
-                        </a:rPr>
-                        <a:t>int</a:t>
-                      </a:r>
-                    </a:p>
-                    <a:p>
-                      <a:r>
-                        <a:rPr lang="en-US" sz="1400" dirty="0"/>
-                        <a:t>category_id </a:t>
-                      </a:r>
-                      <a:r>
-                        <a:rPr lang="en-US" sz="1400" dirty="0">
-                          <a:solidFill>
-                            <a:srgbClr val="FF0000"/>
-                          </a:solidFill>
-                        </a:rPr>
-                        <a:t>int</a:t>
-                      </a:r>
-                    </a:p>
-                  </a:txBody>
-                  <a:tcPr/>
-                </a:tc>
-                <a:extLst>
-                  <a:ext uri="{0D108BD9-81ED-4DB2-BD59-A6C34878D82A}">
-                    <a16:rowId xmlns:a16="http://schemas.microsoft.com/office/drawing/2014/main" val="4232249410"/>
-                  </a:ext>
-                </a:extLst>
-              </a:tr>
-            </a:tbl>
-          </a:graphicData>
-        </a:graphic>
-      </p:graphicFrame>
-      <p:graphicFrame>
-        <p:nvGraphicFramePr>
-          <p:cNvPr id="115" name="Table 114">
-            <a:extLst>
-              <a:ext uri="{FF2B5EF4-FFF2-40B4-BE49-F238E27FC236}">
-                <a16:creationId xmlns:a16="http://schemas.microsoft.com/office/drawing/2014/main" id="{8B3DAF70-C21A-4783-8B92-CF9E9AC2E088}"/>
-              </a:ext>
-            </a:extLst>
-          </p:cNvPr>
-          <p:cNvGraphicFramePr>
-            <a:graphicFrameLocks noGrp="1"/>
-          </p:cNvGraphicFramePr>
-          <p:nvPr>
-            <p:extLst>
-              <p:ext uri="{D42A27DB-BD31-4B8C-83A1-F6EECF244321}">
-                <p14:modId xmlns:p14="http://schemas.microsoft.com/office/powerpoint/2010/main" val="1469777984"/>
-              </p:ext>
-            </p:extLst>
-          </p:nvPr>
-        </p:nvGraphicFramePr>
-        <p:xfrm>
-          <a:off x="7865165" y="2117756"/>
+          <a:off x="4171706" y="2386697"/>
           <a:ext cx="2241828" cy="1767141"/>
         </p:xfrm>
         <a:graphic>
@@ -3693,1216 +3411,6 @@
           </a:graphicData>
         </a:graphic>
       </p:graphicFrame>
-      <p:graphicFrame>
-        <p:nvGraphicFramePr>
-          <p:cNvPr id="116" name="Table 115">
-            <a:extLst>
-              <a:ext uri="{FF2B5EF4-FFF2-40B4-BE49-F238E27FC236}">
-                <a16:creationId xmlns:a16="http://schemas.microsoft.com/office/drawing/2014/main" id="{6A2A2671-F1BF-4464-90A6-C37FE3868FE8}"/>
-              </a:ext>
-            </a:extLst>
-          </p:cNvPr>
-          <p:cNvGraphicFramePr>
-            <a:graphicFrameLocks noGrp="1"/>
-          </p:cNvGraphicFramePr>
-          <p:nvPr>
-            <p:extLst>
-              <p:ext uri="{D42A27DB-BD31-4B8C-83A1-F6EECF244321}">
-                <p14:modId xmlns:p14="http://schemas.microsoft.com/office/powerpoint/2010/main" val="826780045"/>
-              </p:ext>
-            </p:extLst>
-          </p:nvPr>
-        </p:nvGraphicFramePr>
-        <p:xfrm>
-          <a:off x="4837048" y="4423342"/>
-          <a:ext cx="1702903" cy="1099044"/>
-        </p:xfrm>
-        <a:graphic>
-          <a:graphicData uri="http://schemas.openxmlformats.org/drawingml/2006/table">
-            <a:tbl>
-              <a:tblPr firstRow="1" bandRow="1">
-                <a:tableStyleId>{5C22544A-7EE6-4342-B048-85BDC9FD1C3A}</a:tableStyleId>
-              </a:tblPr>
-              <a:tblGrid>
-                <a:gridCol w="441080">
-                  <a:extLst>
-                    <a:ext uri="{9D8B030D-6E8A-4147-A177-3AD203B41FA5}">
-                      <a16:colId xmlns:a16="http://schemas.microsoft.com/office/drawing/2014/main" val="3052149917"/>
-                    </a:ext>
-                  </a:extLst>
-                </a:gridCol>
-                <a:gridCol w="1261823">
-                  <a:extLst>
-                    <a:ext uri="{9D8B030D-6E8A-4147-A177-3AD203B41FA5}">
-                      <a16:colId xmlns:a16="http://schemas.microsoft.com/office/drawing/2014/main" val="849940379"/>
-                    </a:ext>
-                  </a:extLst>
-                </a:gridCol>
-              </a:tblGrid>
-              <a:tr h="288735">
-                <a:tc gridSpan="2">
-                  <a:txBody>
-                    <a:bodyPr/>
-                    <a:lstStyle/>
-                    <a:p>
-                      <a:r>
-                        <a:rPr lang="en-US" dirty="0"/>
-                        <a:t>          Join</a:t>
-                      </a:r>
-                    </a:p>
-                  </a:txBody>
-                  <a:tcPr/>
-                </a:tc>
-                <a:tc hMerge="1">
-                  <a:txBody>
-                    <a:bodyPr/>
-                    <a:lstStyle/>
-                    <a:p>
-                      <a:endParaRPr lang="en-US" dirty="0"/>
-                    </a:p>
-                  </a:txBody>
-                  <a:tcPr/>
-                </a:tc>
-                <a:extLst>
-                  <a:ext uri="{0D108BD9-81ED-4DB2-BD59-A6C34878D82A}">
-                    <a16:rowId xmlns:a16="http://schemas.microsoft.com/office/drawing/2014/main" val="1300100705"/>
-                  </a:ext>
-                </a:extLst>
-              </a:tr>
-              <a:tr h="733284">
-                <a:tc>
-                  <a:txBody>
-                    <a:bodyPr/>
-                    <a:lstStyle/>
-                    <a:p>
-                      <a:r>
-                        <a:rPr lang="en-US" sz="1400" dirty="0"/>
-                        <a:t>Pk</a:t>
-                      </a:r>
-                    </a:p>
-                    <a:p>
-                      <a:r>
-                        <a:rPr lang="en-US" sz="1400" dirty="0" err="1"/>
-                        <a:t>Fk</a:t>
-                      </a:r>
-                      <a:endParaRPr lang="en-US" sz="1400" dirty="0"/>
-                    </a:p>
-                    <a:p>
-                      <a:r>
-                        <a:rPr lang="en-US" sz="1400" dirty="0" err="1"/>
-                        <a:t>Fk</a:t>
-                      </a:r>
-                      <a:endParaRPr lang="en-US" sz="1400" dirty="0"/>
-                    </a:p>
-                  </a:txBody>
-                  <a:tcPr/>
-                </a:tc>
-                <a:tc>
-                  <a:txBody>
-                    <a:bodyPr/>
-                    <a:lstStyle/>
-                    <a:p>
-                      <a:r>
-                        <a:rPr lang="en-US" sz="1400" dirty="0">
-                          <a:solidFill>
-                            <a:schemeClr val="tx1"/>
-                          </a:solidFill>
-                        </a:rPr>
-                        <a:t>id </a:t>
-                      </a:r>
-                      <a:r>
-                        <a:rPr lang="en-US" sz="1400" dirty="0">
-                          <a:solidFill>
-                            <a:srgbClr val="FF0000"/>
-                          </a:solidFill>
-                        </a:rPr>
-                        <a:t>int</a:t>
-                      </a:r>
-                    </a:p>
-                    <a:p>
-                      <a:r>
-                        <a:rPr lang="en-US" sz="1400" dirty="0">
-                          <a:solidFill>
-                            <a:schemeClr val="tx1"/>
-                          </a:solidFill>
-                        </a:rPr>
-                        <a:t>user_id </a:t>
-                      </a:r>
-                      <a:r>
-                        <a:rPr lang="en-US" sz="1400" dirty="0">
-                          <a:solidFill>
-                            <a:srgbClr val="FF0000"/>
-                          </a:solidFill>
-                        </a:rPr>
-                        <a:t>int</a:t>
-                      </a:r>
-                    </a:p>
-                    <a:p>
-                      <a:r>
-                        <a:rPr lang="en-US" sz="1400" dirty="0">
-                          <a:solidFill>
-                            <a:schemeClr val="tx1"/>
-                          </a:solidFill>
-                        </a:rPr>
-                        <a:t>event_id </a:t>
-                      </a:r>
-                      <a:r>
-                        <a:rPr lang="en-US" sz="1400" dirty="0">
-                          <a:solidFill>
-                            <a:srgbClr val="FF0000"/>
-                          </a:solidFill>
-                        </a:rPr>
-                        <a:t>int</a:t>
-                      </a:r>
-                    </a:p>
-                  </a:txBody>
-                  <a:tcPr/>
-                </a:tc>
-                <a:extLst>
-                  <a:ext uri="{0D108BD9-81ED-4DB2-BD59-A6C34878D82A}">
-                    <a16:rowId xmlns:a16="http://schemas.microsoft.com/office/drawing/2014/main" val="4232249410"/>
-                  </a:ext>
-                </a:extLst>
-              </a:tr>
-            </a:tbl>
-          </a:graphicData>
-        </a:graphic>
-      </p:graphicFrame>
-      <p:graphicFrame>
-        <p:nvGraphicFramePr>
-          <p:cNvPr id="117" name="Table 116">
-            <a:extLst>
-              <a:ext uri="{FF2B5EF4-FFF2-40B4-BE49-F238E27FC236}">
-                <a16:creationId xmlns:a16="http://schemas.microsoft.com/office/drawing/2014/main" id="{EBBEB26D-5773-4D6C-A8FE-44900290382C}"/>
-              </a:ext>
-            </a:extLst>
-          </p:cNvPr>
-          <p:cNvGraphicFramePr>
-            <a:graphicFrameLocks noGrp="1"/>
-          </p:cNvGraphicFramePr>
-          <p:nvPr>
-            <p:extLst>
-              <p:ext uri="{D42A27DB-BD31-4B8C-83A1-F6EECF244321}">
-                <p14:modId xmlns:p14="http://schemas.microsoft.com/office/powerpoint/2010/main" val="2983445085"/>
-              </p:ext>
-            </p:extLst>
-          </p:nvPr>
-        </p:nvGraphicFramePr>
-        <p:xfrm>
-          <a:off x="4479238" y="960907"/>
-          <a:ext cx="2241828" cy="949472"/>
-        </p:xfrm>
-        <a:graphic>
-          <a:graphicData uri="http://schemas.openxmlformats.org/drawingml/2006/table">
-            <a:tbl>
-              <a:tblPr firstRow="1" bandRow="1">
-                <a:tableStyleId>{5C22544A-7EE6-4342-B048-85BDC9FD1C3A}</a:tableStyleId>
-              </a:tblPr>
-              <a:tblGrid>
-                <a:gridCol w="422917">
-                  <a:extLst>
-                    <a:ext uri="{9D8B030D-6E8A-4147-A177-3AD203B41FA5}">
-                      <a16:colId xmlns:a16="http://schemas.microsoft.com/office/drawing/2014/main" val="3052149917"/>
-                    </a:ext>
-                  </a:extLst>
-                </a:gridCol>
-                <a:gridCol w="1818911">
-                  <a:extLst>
-                    <a:ext uri="{9D8B030D-6E8A-4147-A177-3AD203B41FA5}">
-                      <a16:colId xmlns:a16="http://schemas.microsoft.com/office/drawing/2014/main" val="849940379"/>
-                    </a:ext>
-                  </a:extLst>
-                </a:gridCol>
-              </a:tblGrid>
-              <a:tr h="285383">
-                <a:tc gridSpan="2">
-                  <a:txBody>
-                    <a:bodyPr/>
-                    <a:lstStyle/>
-                    <a:p>
-                      <a:r>
-                        <a:rPr lang="en-US" dirty="0"/>
-                        <a:t>            Category </a:t>
-                      </a:r>
-                    </a:p>
-                  </a:txBody>
-                  <a:tcPr/>
-                </a:tc>
-                <a:tc hMerge="1">
-                  <a:txBody>
-                    <a:bodyPr/>
-                    <a:lstStyle/>
-                    <a:p>
-                      <a:endParaRPr lang="en-US" dirty="0"/>
-                    </a:p>
-                  </a:txBody>
-                  <a:tcPr/>
-                </a:tc>
-                <a:extLst>
-                  <a:ext uri="{0D108BD9-81ED-4DB2-BD59-A6C34878D82A}">
-                    <a16:rowId xmlns:a16="http://schemas.microsoft.com/office/drawing/2014/main" val="1300100705"/>
-                  </a:ext>
-                </a:extLst>
-              </a:tr>
-              <a:tr h="583712">
-                <a:tc>
-                  <a:txBody>
-                    <a:bodyPr/>
-                    <a:lstStyle/>
-                    <a:p>
-                      <a:r>
-                        <a:rPr lang="en-US" sz="1400" dirty="0"/>
-                        <a:t>Pk</a:t>
-                      </a:r>
-                    </a:p>
-                  </a:txBody>
-                  <a:tcPr/>
-                </a:tc>
-                <a:tc>
-                  <a:txBody>
-                    <a:bodyPr/>
-                    <a:lstStyle/>
-                    <a:p>
-                      <a:r>
-                        <a:rPr lang="en-US" sz="1400" dirty="0"/>
-                        <a:t>id </a:t>
-                      </a:r>
-                      <a:r>
-                        <a:rPr lang="en-US" sz="1400" dirty="0">
-                          <a:solidFill>
-                            <a:srgbClr val="FF0000"/>
-                          </a:solidFill>
-                        </a:rPr>
-                        <a:t>int</a:t>
-                      </a:r>
-                    </a:p>
-                    <a:p>
-                      <a:r>
-                        <a:rPr lang="en-US" sz="1400" dirty="0"/>
-                        <a:t>category-name </a:t>
-                      </a:r>
-                      <a:r>
-                        <a:rPr lang="en-US" sz="1400" dirty="0">
-                          <a:solidFill>
-                            <a:srgbClr val="FF0000"/>
-                          </a:solidFill>
-                        </a:rPr>
-                        <a:t>string</a:t>
-                      </a:r>
-                    </a:p>
-                  </a:txBody>
-                  <a:tcPr/>
-                </a:tc>
-                <a:extLst>
-                  <a:ext uri="{0D108BD9-81ED-4DB2-BD59-A6C34878D82A}">
-                    <a16:rowId xmlns:a16="http://schemas.microsoft.com/office/drawing/2014/main" val="4232249410"/>
-                  </a:ext>
-                </a:extLst>
-              </a:tr>
-            </a:tbl>
-          </a:graphicData>
-        </a:graphic>
-      </p:graphicFrame>
-      <p:cxnSp>
-        <p:nvCxnSpPr>
-          <p:cNvPr id="118" name="Straight Connector 117">
-            <a:extLst>
-              <a:ext uri="{FF2B5EF4-FFF2-40B4-BE49-F238E27FC236}">
-                <a16:creationId xmlns:a16="http://schemas.microsoft.com/office/drawing/2014/main" id="{F9A8BEA7-C670-4680-A087-F8F2EE0141BE}"/>
-              </a:ext>
-            </a:extLst>
-          </p:cNvPr>
-          <p:cNvCxnSpPr>
-            <a:cxnSpLocks/>
-          </p:cNvCxnSpPr>
-          <p:nvPr/>
-        </p:nvCxnSpPr>
-        <p:spPr>
-          <a:xfrm>
-            <a:off x="6493580" y="4572721"/>
-            <a:ext cx="662594" cy="0"/>
-          </a:xfrm>
-          <a:prstGeom prst="line">
-            <a:avLst/>
-          </a:prstGeom>
-        </p:spPr>
-        <p:style>
-          <a:lnRef idx="1">
-            <a:schemeClr val="accent1"/>
-          </a:lnRef>
-          <a:fillRef idx="0">
-            <a:schemeClr val="accent1"/>
-          </a:fillRef>
-          <a:effectRef idx="0">
-            <a:schemeClr val="accent1"/>
-          </a:effectRef>
-          <a:fontRef idx="minor">
-            <a:schemeClr val="tx1"/>
-          </a:fontRef>
-        </p:style>
-      </p:cxnSp>
-      <p:cxnSp>
-        <p:nvCxnSpPr>
-          <p:cNvPr id="119" name="Straight Connector 118">
-            <a:extLst>
-              <a:ext uri="{FF2B5EF4-FFF2-40B4-BE49-F238E27FC236}">
-                <a16:creationId xmlns:a16="http://schemas.microsoft.com/office/drawing/2014/main" id="{5399F960-9BC7-49DF-8C2C-2F46803F5960}"/>
-              </a:ext>
-            </a:extLst>
-          </p:cNvPr>
-          <p:cNvCxnSpPr>
-            <a:cxnSpLocks/>
-          </p:cNvCxnSpPr>
-          <p:nvPr/>
-        </p:nvCxnSpPr>
-        <p:spPr>
-          <a:xfrm flipV="1">
-            <a:off x="7156174" y="3187869"/>
-            <a:ext cx="0" cy="1384852"/>
-          </a:xfrm>
-          <a:prstGeom prst="line">
-            <a:avLst/>
-          </a:prstGeom>
-        </p:spPr>
-        <p:style>
-          <a:lnRef idx="1">
-            <a:schemeClr val="accent1"/>
-          </a:lnRef>
-          <a:fillRef idx="0">
-            <a:schemeClr val="accent1"/>
-          </a:fillRef>
-          <a:effectRef idx="0">
-            <a:schemeClr val="accent1"/>
-          </a:effectRef>
-          <a:fontRef idx="minor">
-            <a:schemeClr val="tx1"/>
-          </a:fontRef>
-        </p:style>
-      </p:cxnSp>
-      <p:cxnSp>
-        <p:nvCxnSpPr>
-          <p:cNvPr id="120" name="Straight Connector 119">
-            <a:extLst>
-              <a:ext uri="{FF2B5EF4-FFF2-40B4-BE49-F238E27FC236}">
-                <a16:creationId xmlns:a16="http://schemas.microsoft.com/office/drawing/2014/main" id="{1C6E3825-3F64-496E-A600-797264DC0E51}"/>
-              </a:ext>
-            </a:extLst>
-          </p:cNvPr>
-          <p:cNvCxnSpPr>
-            <a:cxnSpLocks/>
-          </p:cNvCxnSpPr>
-          <p:nvPr/>
-        </p:nvCxnSpPr>
-        <p:spPr>
-          <a:xfrm>
-            <a:off x="7156174" y="3195217"/>
-            <a:ext cx="708991" cy="0"/>
-          </a:xfrm>
-          <a:prstGeom prst="line">
-            <a:avLst/>
-          </a:prstGeom>
-        </p:spPr>
-        <p:style>
-          <a:lnRef idx="1">
-            <a:schemeClr val="accent1"/>
-          </a:lnRef>
-          <a:fillRef idx="0">
-            <a:schemeClr val="accent1"/>
-          </a:fillRef>
-          <a:effectRef idx="0">
-            <a:schemeClr val="accent1"/>
-          </a:effectRef>
-          <a:fontRef idx="minor">
-            <a:schemeClr val="tx1"/>
-          </a:fontRef>
-        </p:style>
-      </p:cxnSp>
-      <p:sp>
-        <p:nvSpPr>
-          <p:cNvPr id="121" name="TextBox 120">
-            <a:extLst>
-              <a:ext uri="{FF2B5EF4-FFF2-40B4-BE49-F238E27FC236}">
-                <a16:creationId xmlns:a16="http://schemas.microsoft.com/office/drawing/2014/main" id="{248424F2-59CB-4EB3-93AC-5D015191C9CD}"/>
-              </a:ext>
-            </a:extLst>
-          </p:cNvPr>
-          <p:cNvSpPr txBox="1"/>
-          <p:nvPr/>
-        </p:nvSpPr>
-        <p:spPr>
-          <a:xfrm>
-            <a:off x="6490262" y="4388055"/>
-            <a:ext cx="977353" cy="369332"/>
-          </a:xfrm>
-          <a:prstGeom prst="rect">
-            <a:avLst/>
-          </a:prstGeom>
-          <a:noFill/>
-        </p:spPr>
-        <p:txBody>
-          <a:bodyPr wrap="square" rtlCol="0">
-            <a:spAutoFit/>
-          </a:bodyPr>
-          <a:lstStyle/>
-          <a:p>
-            <a:r>
-              <a:rPr lang="en-US" dirty="0"/>
-              <a:t>*</a:t>
-            </a:r>
-          </a:p>
-        </p:txBody>
-      </p:sp>
-      <p:cxnSp>
-        <p:nvCxnSpPr>
-          <p:cNvPr id="122" name="Straight Connector 121">
-            <a:extLst>
-              <a:ext uri="{FF2B5EF4-FFF2-40B4-BE49-F238E27FC236}">
-                <a16:creationId xmlns:a16="http://schemas.microsoft.com/office/drawing/2014/main" id="{31845C8A-98F5-4FB0-A622-1D82CA6AC7B2}"/>
-              </a:ext>
-            </a:extLst>
-          </p:cNvPr>
-          <p:cNvCxnSpPr>
-            <a:cxnSpLocks/>
-          </p:cNvCxnSpPr>
-          <p:nvPr/>
-        </p:nvCxnSpPr>
-        <p:spPr>
-          <a:xfrm flipV="1">
-            <a:off x="3901082" y="3187043"/>
-            <a:ext cx="0" cy="1350279"/>
-          </a:xfrm>
-          <a:prstGeom prst="line">
-            <a:avLst/>
-          </a:prstGeom>
-        </p:spPr>
-        <p:style>
-          <a:lnRef idx="1">
-            <a:schemeClr val="accent1"/>
-          </a:lnRef>
-          <a:fillRef idx="0">
-            <a:schemeClr val="accent1"/>
-          </a:fillRef>
-          <a:effectRef idx="0">
-            <a:schemeClr val="accent1"/>
-          </a:effectRef>
-          <a:fontRef idx="minor">
-            <a:schemeClr val="tx1"/>
-          </a:fontRef>
-        </p:style>
-      </p:cxnSp>
-      <p:cxnSp>
-        <p:nvCxnSpPr>
-          <p:cNvPr id="123" name="Straight Connector 122">
-            <a:extLst>
-              <a:ext uri="{FF2B5EF4-FFF2-40B4-BE49-F238E27FC236}">
-                <a16:creationId xmlns:a16="http://schemas.microsoft.com/office/drawing/2014/main" id="{59B04599-A1F5-47BF-B169-14B250BBB00E}"/>
-              </a:ext>
-            </a:extLst>
-          </p:cNvPr>
-          <p:cNvCxnSpPr>
-            <a:cxnSpLocks/>
-          </p:cNvCxnSpPr>
-          <p:nvPr/>
-        </p:nvCxnSpPr>
-        <p:spPr>
-          <a:xfrm>
-            <a:off x="3892838" y="4545496"/>
-            <a:ext cx="944210" cy="0"/>
-          </a:xfrm>
-          <a:prstGeom prst="line">
-            <a:avLst/>
-          </a:prstGeom>
-        </p:spPr>
-        <p:style>
-          <a:lnRef idx="1">
-            <a:schemeClr val="accent1"/>
-          </a:lnRef>
-          <a:fillRef idx="0">
-            <a:schemeClr val="accent1"/>
-          </a:fillRef>
-          <a:effectRef idx="0">
-            <a:schemeClr val="accent1"/>
-          </a:effectRef>
-          <a:fontRef idx="minor">
-            <a:schemeClr val="tx1"/>
-          </a:fontRef>
-        </p:style>
-      </p:cxnSp>
-      <p:cxnSp>
-        <p:nvCxnSpPr>
-          <p:cNvPr id="124" name="Straight Connector 123">
-            <a:extLst>
-              <a:ext uri="{FF2B5EF4-FFF2-40B4-BE49-F238E27FC236}">
-                <a16:creationId xmlns:a16="http://schemas.microsoft.com/office/drawing/2014/main" id="{DA731C21-7011-4DC5-968D-82B32B3DD8C1}"/>
-              </a:ext>
-            </a:extLst>
-          </p:cNvPr>
-          <p:cNvCxnSpPr>
-            <a:cxnSpLocks/>
-          </p:cNvCxnSpPr>
-          <p:nvPr/>
-        </p:nvCxnSpPr>
-        <p:spPr>
-          <a:xfrm>
-            <a:off x="3286547" y="3187869"/>
-            <a:ext cx="606291" cy="0"/>
-          </a:xfrm>
-          <a:prstGeom prst="line">
-            <a:avLst/>
-          </a:prstGeom>
-        </p:spPr>
-        <p:style>
-          <a:lnRef idx="1">
-            <a:schemeClr val="accent1"/>
-          </a:lnRef>
-          <a:fillRef idx="0">
-            <a:schemeClr val="accent1"/>
-          </a:fillRef>
-          <a:effectRef idx="0">
-            <a:schemeClr val="accent1"/>
-          </a:effectRef>
-          <a:fontRef idx="minor">
-            <a:schemeClr val="tx1"/>
-          </a:fontRef>
-        </p:style>
-      </p:cxnSp>
-      <p:sp>
-        <p:nvSpPr>
-          <p:cNvPr id="125" name="TextBox 124">
-            <a:extLst>
-              <a:ext uri="{FF2B5EF4-FFF2-40B4-BE49-F238E27FC236}">
-                <a16:creationId xmlns:a16="http://schemas.microsoft.com/office/drawing/2014/main" id="{257564A7-8D7D-4A22-8A58-EE1108E8B084}"/>
-              </a:ext>
-            </a:extLst>
-          </p:cNvPr>
-          <p:cNvSpPr txBox="1"/>
-          <p:nvPr/>
-        </p:nvSpPr>
-        <p:spPr>
-          <a:xfrm>
-            <a:off x="4622799" y="4360830"/>
-            <a:ext cx="977353" cy="369332"/>
-          </a:xfrm>
-          <a:prstGeom prst="rect">
-            <a:avLst/>
-          </a:prstGeom>
-          <a:noFill/>
-        </p:spPr>
-        <p:txBody>
-          <a:bodyPr wrap="square" rtlCol="0">
-            <a:spAutoFit/>
-          </a:bodyPr>
-          <a:lstStyle/>
-          <a:p>
-            <a:r>
-              <a:rPr lang="en-US" dirty="0"/>
-              <a:t>*</a:t>
-            </a:r>
-          </a:p>
-        </p:txBody>
-      </p:sp>
-      <p:sp>
-        <p:nvSpPr>
-          <p:cNvPr id="126" name="TextBox 125">
-            <a:extLst>
-              <a:ext uri="{FF2B5EF4-FFF2-40B4-BE49-F238E27FC236}">
-                <a16:creationId xmlns:a16="http://schemas.microsoft.com/office/drawing/2014/main" id="{42BBE6A4-2272-4DA9-8D1C-21AD92DB5921}"/>
-              </a:ext>
-            </a:extLst>
-          </p:cNvPr>
-          <p:cNvSpPr txBox="1"/>
-          <p:nvPr/>
-        </p:nvSpPr>
-        <p:spPr>
-          <a:xfrm>
-            <a:off x="4249526" y="894647"/>
-            <a:ext cx="977353" cy="307777"/>
-          </a:xfrm>
-          <a:prstGeom prst="rect">
-            <a:avLst/>
-          </a:prstGeom>
-          <a:noFill/>
-        </p:spPr>
-        <p:txBody>
-          <a:bodyPr wrap="square" rtlCol="0">
-            <a:spAutoFit/>
-          </a:bodyPr>
-          <a:lstStyle/>
-          <a:p>
-            <a:r>
-              <a:rPr lang="en-US" sz="1400" dirty="0"/>
-              <a:t>1</a:t>
-            </a:r>
-          </a:p>
-        </p:txBody>
-      </p:sp>
-      <p:cxnSp>
-        <p:nvCxnSpPr>
-          <p:cNvPr id="127" name="Straight Connector 126">
-            <a:extLst>
-              <a:ext uri="{FF2B5EF4-FFF2-40B4-BE49-F238E27FC236}">
-                <a16:creationId xmlns:a16="http://schemas.microsoft.com/office/drawing/2014/main" id="{28CD604C-27F7-4240-A9CF-7B10D09AC360}"/>
-              </a:ext>
-            </a:extLst>
-          </p:cNvPr>
-          <p:cNvCxnSpPr>
-            <a:cxnSpLocks/>
-          </p:cNvCxnSpPr>
-          <p:nvPr/>
-        </p:nvCxnSpPr>
-        <p:spPr>
-          <a:xfrm flipV="1">
-            <a:off x="1885134" y="1152940"/>
-            <a:ext cx="0" cy="487228"/>
-          </a:xfrm>
-          <a:prstGeom prst="line">
-            <a:avLst/>
-          </a:prstGeom>
-        </p:spPr>
-        <p:style>
-          <a:lnRef idx="1">
-            <a:schemeClr val="accent1"/>
-          </a:lnRef>
-          <a:fillRef idx="0">
-            <a:schemeClr val="accent1"/>
-          </a:fillRef>
-          <a:effectRef idx="0">
-            <a:schemeClr val="accent1"/>
-          </a:effectRef>
-          <a:fontRef idx="minor">
-            <a:schemeClr val="tx1"/>
-          </a:fontRef>
-        </p:style>
-      </p:cxnSp>
-      <p:cxnSp>
-        <p:nvCxnSpPr>
-          <p:cNvPr id="128" name="Straight Connector 127">
-            <a:extLst>
-              <a:ext uri="{FF2B5EF4-FFF2-40B4-BE49-F238E27FC236}">
-                <a16:creationId xmlns:a16="http://schemas.microsoft.com/office/drawing/2014/main" id="{562ECC14-BCD9-4B6F-9805-C9E3B4254F72}"/>
-              </a:ext>
-            </a:extLst>
-          </p:cNvPr>
-          <p:cNvCxnSpPr>
-            <a:cxnSpLocks/>
-          </p:cNvCxnSpPr>
-          <p:nvPr/>
-        </p:nvCxnSpPr>
-        <p:spPr>
-          <a:xfrm>
-            <a:off x="1885962" y="1139687"/>
-            <a:ext cx="2580024" cy="0"/>
-          </a:xfrm>
-          <a:prstGeom prst="line">
-            <a:avLst/>
-          </a:prstGeom>
-        </p:spPr>
-        <p:style>
-          <a:lnRef idx="1">
-            <a:schemeClr val="accent1"/>
-          </a:lnRef>
-          <a:fillRef idx="0">
-            <a:schemeClr val="accent1"/>
-          </a:fillRef>
-          <a:effectRef idx="0">
-            <a:schemeClr val="accent1"/>
-          </a:effectRef>
-          <a:fontRef idx="minor">
-            <a:schemeClr val="tx1"/>
-          </a:fontRef>
-        </p:style>
-      </p:cxnSp>
-      <p:sp>
-        <p:nvSpPr>
-          <p:cNvPr id="129" name="TextBox 128">
-            <a:extLst>
-              <a:ext uri="{FF2B5EF4-FFF2-40B4-BE49-F238E27FC236}">
-                <a16:creationId xmlns:a16="http://schemas.microsoft.com/office/drawing/2014/main" id="{E95660B2-3B61-4B04-B26A-59B0D33EB14F}"/>
-              </a:ext>
-            </a:extLst>
-          </p:cNvPr>
-          <p:cNvSpPr txBox="1"/>
-          <p:nvPr/>
-        </p:nvSpPr>
-        <p:spPr>
-          <a:xfrm>
-            <a:off x="1659424" y="1435213"/>
-            <a:ext cx="977353" cy="369332"/>
-          </a:xfrm>
-          <a:prstGeom prst="rect">
-            <a:avLst/>
-          </a:prstGeom>
-          <a:noFill/>
-        </p:spPr>
-        <p:txBody>
-          <a:bodyPr wrap="square" rtlCol="0">
-            <a:spAutoFit/>
-          </a:bodyPr>
-          <a:lstStyle/>
-          <a:p>
-            <a:r>
-              <a:rPr lang="en-US" dirty="0"/>
-              <a:t>*</a:t>
-            </a:r>
-          </a:p>
-        </p:txBody>
-      </p:sp>
-      <p:cxnSp>
-        <p:nvCxnSpPr>
-          <p:cNvPr id="130" name="Straight Connector 129">
-            <a:extLst>
-              <a:ext uri="{FF2B5EF4-FFF2-40B4-BE49-F238E27FC236}">
-                <a16:creationId xmlns:a16="http://schemas.microsoft.com/office/drawing/2014/main" id="{736C250C-ED7B-424C-A4FD-BEDF7B0817F7}"/>
-              </a:ext>
-            </a:extLst>
-          </p:cNvPr>
-          <p:cNvCxnSpPr>
-            <a:cxnSpLocks/>
-            <a:endCxn id="133" idx="1"/>
-          </p:cNvCxnSpPr>
-          <p:nvPr/>
-        </p:nvCxnSpPr>
-        <p:spPr>
-          <a:xfrm flipH="1" flipV="1">
-            <a:off x="3286547" y="2289490"/>
-            <a:ext cx="4578620" cy="17000"/>
-          </a:xfrm>
-          <a:prstGeom prst="line">
-            <a:avLst/>
-          </a:prstGeom>
-        </p:spPr>
-        <p:style>
-          <a:lnRef idx="1">
-            <a:schemeClr val="accent1"/>
-          </a:lnRef>
-          <a:fillRef idx="0">
-            <a:schemeClr val="accent1"/>
-          </a:fillRef>
-          <a:effectRef idx="0">
-            <a:schemeClr val="accent1"/>
-          </a:effectRef>
-          <a:fontRef idx="minor">
-            <a:schemeClr val="tx1"/>
-          </a:fontRef>
-        </p:style>
-      </p:cxnSp>
-      <p:sp>
-        <p:nvSpPr>
-          <p:cNvPr id="131" name="TextBox 130">
-            <a:extLst>
-              <a:ext uri="{FF2B5EF4-FFF2-40B4-BE49-F238E27FC236}">
-                <a16:creationId xmlns:a16="http://schemas.microsoft.com/office/drawing/2014/main" id="{34DAC869-C80C-42C5-9B99-50733C77C6B7}"/>
-              </a:ext>
-            </a:extLst>
-          </p:cNvPr>
-          <p:cNvSpPr txBox="1"/>
-          <p:nvPr/>
-        </p:nvSpPr>
-        <p:spPr>
-          <a:xfrm>
-            <a:off x="7596802" y="2925367"/>
-            <a:ext cx="977353" cy="307777"/>
-          </a:xfrm>
-          <a:prstGeom prst="rect">
-            <a:avLst/>
-          </a:prstGeom>
-          <a:noFill/>
-        </p:spPr>
-        <p:txBody>
-          <a:bodyPr wrap="square" rtlCol="0">
-            <a:spAutoFit/>
-          </a:bodyPr>
-          <a:lstStyle/>
-          <a:p>
-            <a:r>
-              <a:rPr lang="en-US" sz="1400" dirty="0"/>
-              <a:t>1</a:t>
-            </a:r>
-          </a:p>
-        </p:txBody>
-      </p:sp>
-      <p:sp>
-        <p:nvSpPr>
-          <p:cNvPr id="132" name="TextBox 131">
-            <a:extLst>
-              <a:ext uri="{FF2B5EF4-FFF2-40B4-BE49-F238E27FC236}">
-                <a16:creationId xmlns:a16="http://schemas.microsoft.com/office/drawing/2014/main" id="{7A575703-595A-42EC-BBB4-046CAA3FC199}"/>
-              </a:ext>
-            </a:extLst>
-          </p:cNvPr>
-          <p:cNvSpPr txBox="1"/>
-          <p:nvPr/>
-        </p:nvSpPr>
-        <p:spPr>
-          <a:xfrm>
-            <a:off x="3253318" y="2925367"/>
-            <a:ext cx="462224" cy="307777"/>
-          </a:xfrm>
-          <a:prstGeom prst="rect">
-            <a:avLst/>
-          </a:prstGeom>
-          <a:noFill/>
-        </p:spPr>
-        <p:txBody>
-          <a:bodyPr wrap="square" rtlCol="0">
-            <a:spAutoFit/>
-          </a:bodyPr>
-          <a:lstStyle/>
-          <a:p>
-            <a:r>
-              <a:rPr lang="en-US" sz="1400" dirty="0"/>
-              <a:t>1</a:t>
-            </a:r>
-          </a:p>
-        </p:txBody>
-      </p:sp>
-      <p:sp>
-        <p:nvSpPr>
-          <p:cNvPr id="133" name="TextBox 132">
-            <a:extLst>
-              <a:ext uri="{FF2B5EF4-FFF2-40B4-BE49-F238E27FC236}">
-                <a16:creationId xmlns:a16="http://schemas.microsoft.com/office/drawing/2014/main" id="{A0B6F577-C346-4A85-B81F-7377AFEA0B19}"/>
-              </a:ext>
-            </a:extLst>
-          </p:cNvPr>
-          <p:cNvSpPr txBox="1"/>
-          <p:nvPr/>
-        </p:nvSpPr>
-        <p:spPr>
-          <a:xfrm>
-            <a:off x="3286547" y="2104824"/>
-            <a:ext cx="977353" cy="369332"/>
-          </a:xfrm>
-          <a:prstGeom prst="rect">
-            <a:avLst/>
-          </a:prstGeom>
-          <a:noFill/>
-        </p:spPr>
-        <p:txBody>
-          <a:bodyPr wrap="square" rtlCol="0">
-            <a:spAutoFit/>
-          </a:bodyPr>
-          <a:lstStyle/>
-          <a:p>
-            <a:r>
-              <a:rPr lang="en-US" dirty="0"/>
-              <a:t>*</a:t>
-            </a:r>
-          </a:p>
-        </p:txBody>
-      </p:sp>
-      <p:sp>
-        <p:nvSpPr>
-          <p:cNvPr id="134" name="TextBox 133">
-            <a:extLst>
-              <a:ext uri="{FF2B5EF4-FFF2-40B4-BE49-F238E27FC236}">
-                <a16:creationId xmlns:a16="http://schemas.microsoft.com/office/drawing/2014/main" id="{316AD204-D7A6-429A-8031-9E7C1069306F}"/>
-              </a:ext>
-            </a:extLst>
-          </p:cNvPr>
-          <p:cNvSpPr txBox="1"/>
-          <p:nvPr/>
-        </p:nvSpPr>
-        <p:spPr>
-          <a:xfrm>
-            <a:off x="7632417" y="2059353"/>
-            <a:ext cx="977353" cy="307777"/>
-          </a:xfrm>
-          <a:prstGeom prst="rect">
-            <a:avLst/>
-          </a:prstGeom>
-          <a:noFill/>
-        </p:spPr>
-        <p:txBody>
-          <a:bodyPr wrap="square" rtlCol="0">
-            <a:spAutoFit/>
-          </a:bodyPr>
-          <a:lstStyle/>
-          <a:p>
-            <a:r>
-              <a:rPr lang="en-US" sz="1400" dirty="0"/>
-              <a:t>1</a:t>
-            </a:r>
-          </a:p>
-        </p:txBody>
-      </p:sp>
-      <p:graphicFrame>
-        <p:nvGraphicFramePr>
-          <p:cNvPr id="135" name="Table 134">
-            <a:extLst>
-              <a:ext uri="{FF2B5EF4-FFF2-40B4-BE49-F238E27FC236}">
-                <a16:creationId xmlns:a16="http://schemas.microsoft.com/office/drawing/2014/main" id="{24B03EFC-6246-4A16-A49A-244B092FEF4B}"/>
-              </a:ext>
-            </a:extLst>
-          </p:cNvPr>
-          <p:cNvGraphicFramePr>
-            <a:graphicFrameLocks noGrp="1"/>
-          </p:cNvGraphicFramePr>
-          <p:nvPr>
-            <p:extLst>
-              <p:ext uri="{D42A27DB-BD31-4B8C-83A1-F6EECF244321}">
-                <p14:modId xmlns:p14="http://schemas.microsoft.com/office/powerpoint/2010/main" val="1962726534"/>
-              </p:ext>
-            </p:extLst>
-          </p:nvPr>
-        </p:nvGraphicFramePr>
-        <p:xfrm>
-          <a:off x="886686" y="4765362"/>
-          <a:ext cx="1996895" cy="1066800"/>
-        </p:xfrm>
-        <a:graphic>
-          <a:graphicData uri="http://schemas.openxmlformats.org/drawingml/2006/table">
-            <a:tbl>
-              <a:tblPr firstRow="1" bandRow="1">
-                <a:tableStyleId>{5C22544A-7EE6-4342-B048-85BDC9FD1C3A}</a:tableStyleId>
-              </a:tblPr>
-              <a:tblGrid>
-                <a:gridCol w="517229">
-                  <a:extLst>
-                    <a:ext uri="{9D8B030D-6E8A-4147-A177-3AD203B41FA5}">
-                      <a16:colId xmlns:a16="http://schemas.microsoft.com/office/drawing/2014/main" val="3052149917"/>
-                    </a:ext>
-                  </a:extLst>
-                </a:gridCol>
-                <a:gridCol w="1479666">
-                  <a:extLst>
-                    <a:ext uri="{9D8B030D-6E8A-4147-A177-3AD203B41FA5}">
-                      <a16:colId xmlns:a16="http://schemas.microsoft.com/office/drawing/2014/main" val="849940379"/>
-                    </a:ext>
-                  </a:extLst>
-                </a:gridCol>
-              </a:tblGrid>
-              <a:tr h="300115">
-                <a:tc gridSpan="2">
-                  <a:txBody>
-                    <a:bodyPr/>
-                    <a:lstStyle/>
-                    <a:p>
-                      <a:r>
-                        <a:rPr lang="en-US" sz="1600" dirty="0"/>
-                        <a:t>        Location</a:t>
-                      </a:r>
-                    </a:p>
-                  </a:txBody>
-                  <a:tcPr/>
-                </a:tc>
-                <a:tc hMerge="1">
-                  <a:txBody>
-                    <a:bodyPr/>
-                    <a:lstStyle/>
-                    <a:p>
-                      <a:endParaRPr lang="en-US" dirty="0"/>
-                    </a:p>
-                  </a:txBody>
-                  <a:tcPr/>
-                </a:tc>
-                <a:extLst>
-                  <a:ext uri="{0D108BD9-81ED-4DB2-BD59-A6C34878D82A}">
-                    <a16:rowId xmlns:a16="http://schemas.microsoft.com/office/drawing/2014/main" val="1300100705"/>
-                  </a:ext>
-                </a:extLst>
-              </a:tr>
-              <a:tr h="588765">
-                <a:tc>
-                  <a:txBody>
-                    <a:bodyPr/>
-                    <a:lstStyle/>
-                    <a:p>
-                      <a:r>
-                        <a:rPr lang="en-US" sz="1400" dirty="0"/>
-                        <a:t>Pk</a:t>
-                      </a:r>
-                    </a:p>
-                  </a:txBody>
-                  <a:tcPr/>
-                </a:tc>
-                <a:tc>
-                  <a:txBody>
-                    <a:bodyPr/>
-                    <a:lstStyle/>
-                    <a:p>
-                      <a:r>
-                        <a:rPr lang="en-US" sz="1400" dirty="0">
-                          <a:solidFill>
-                            <a:schemeClr val="tx1"/>
-                          </a:solidFill>
-                        </a:rPr>
-                        <a:t>id </a:t>
-                      </a:r>
-                      <a:r>
-                        <a:rPr lang="en-US" sz="1400" dirty="0">
-                          <a:solidFill>
-                            <a:srgbClr val="FF0000"/>
-                          </a:solidFill>
-                        </a:rPr>
-                        <a:t>int</a:t>
-                      </a:r>
-                    </a:p>
-                    <a:p>
-                      <a:r>
-                        <a:rPr lang="en-US" sz="1400" dirty="0">
-                          <a:solidFill>
-                            <a:schemeClr val="tx1"/>
-                          </a:solidFill>
-                        </a:rPr>
-                        <a:t>location</a:t>
-                      </a:r>
-                      <a:r>
-                        <a:rPr lang="en-US" sz="1400" dirty="0">
-                          <a:solidFill>
-                            <a:srgbClr val="FF0000"/>
-                          </a:solidFill>
-                        </a:rPr>
-                        <a:t> string </a:t>
-                      </a:r>
-                    </a:p>
-                    <a:p>
-                      <a:r>
-                        <a:rPr lang="en-US" sz="1400" dirty="0" err="1">
-                          <a:solidFill>
-                            <a:schemeClr val="tx1"/>
-                          </a:solidFill>
-                        </a:rPr>
-                        <a:t>event_id</a:t>
-                      </a:r>
-                      <a:r>
-                        <a:rPr lang="en-US" sz="1400" dirty="0">
-                          <a:solidFill>
-                            <a:schemeClr val="tx1"/>
-                          </a:solidFill>
-                        </a:rPr>
-                        <a:t> </a:t>
-                      </a:r>
-                      <a:r>
-                        <a:rPr lang="en-US" sz="1400" dirty="0">
-                          <a:solidFill>
-                            <a:srgbClr val="FF0000"/>
-                          </a:solidFill>
-                        </a:rPr>
-                        <a:t>int</a:t>
-                      </a:r>
-                    </a:p>
-                  </a:txBody>
-                  <a:tcPr/>
-                </a:tc>
-                <a:extLst>
-                  <a:ext uri="{0D108BD9-81ED-4DB2-BD59-A6C34878D82A}">
-                    <a16:rowId xmlns:a16="http://schemas.microsoft.com/office/drawing/2014/main" val="4232249410"/>
-                  </a:ext>
-                </a:extLst>
-              </a:tr>
-            </a:tbl>
-          </a:graphicData>
-        </a:graphic>
-      </p:graphicFrame>
-      <p:cxnSp>
-        <p:nvCxnSpPr>
-          <p:cNvPr id="136" name="Straight Connector 135">
-            <a:extLst>
-              <a:ext uri="{FF2B5EF4-FFF2-40B4-BE49-F238E27FC236}">
-                <a16:creationId xmlns:a16="http://schemas.microsoft.com/office/drawing/2014/main" id="{7D8E84B2-B1E8-4CDA-A4C3-F4F1DB28836E}"/>
-              </a:ext>
-            </a:extLst>
-          </p:cNvPr>
-          <p:cNvCxnSpPr>
-            <a:cxnSpLocks/>
-          </p:cNvCxnSpPr>
-          <p:nvPr/>
-        </p:nvCxnSpPr>
-        <p:spPr>
-          <a:xfrm flipV="1">
-            <a:off x="1885134" y="4097868"/>
-            <a:ext cx="0" cy="650947"/>
-          </a:xfrm>
-          <a:prstGeom prst="line">
-            <a:avLst/>
-          </a:prstGeom>
-        </p:spPr>
-        <p:style>
-          <a:lnRef idx="1">
-            <a:schemeClr val="accent1"/>
-          </a:lnRef>
-          <a:fillRef idx="0">
-            <a:schemeClr val="accent1"/>
-          </a:fillRef>
-          <a:effectRef idx="0">
-            <a:schemeClr val="accent1"/>
-          </a:effectRef>
-          <a:fontRef idx="minor">
-            <a:schemeClr val="tx1"/>
-          </a:fontRef>
-        </p:style>
-      </p:cxnSp>
-      <p:sp>
-        <p:nvSpPr>
-          <p:cNvPr id="137" name="TextBox 136">
-            <a:extLst>
-              <a:ext uri="{FF2B5EF4-FFF2-40B4-BE49-F238E27FC236}">
-                <a16:creationId xmlns:a16="http://schemas.microsoft.com/office/drawing/2014/main" id="{F88171DA-8416-4D82-871B-E8BF5BEE5D4E}"/>
-              </a:ext>
-            </a:extLst>
-          </p:cNvPr>
-          <p:cNvSpPr txBox="1"/>
-          <p:nvPr/>
-        </p:nvSpPr>
-        <p:spPr>
-          <a:xfrm>
-            <a:off x="1600202" y="4537322"/>
-            <a:ext cx="977353" cy="369332"/>
-          </a:xfrm>
-          <a:prstGeom prst="rect">
-            <a:avLst/>
-          </a:prstGeom>
-          <a:noFill/>
-        </p:spPr>
-        <p:txBody>
-          <a:bodyPr wrap="square" rtlCol="0">
-            <a:spAutoFit/>
-          </a:bodyPr>
-          <a:lstStyle/>
-          <a:p>
-            <a:r>
-              <a:rPr lang="en-US" dirty="0"/>
-              <a:t>*</a:t>
-            </a:r>
-          </a:p>
-        </p:txBody>
-      </p:sp>
-      <p:sp>
-        <p:nvSpPr>
-          <p:cNvPr id="138" name="TextBox 137">
-            <a:extLst>
-              <a:ext uri="{FF2B5EF4-FFF2-40B4-BE49-F238E27FC236}">
-                <a16:creationId xmlns:a16="http://schemas.microsoft.com/office/drawing/2014/main" id="{1141B16A-4C15-42FD-B511-711EAFCDA402}"/>
-              </a:ext>
-            </a:extLst>
-          </p:cNvPr>
-          <p:cNvSpPr txBox="1"/>
-          <p:nvPr/>
-        </p:nvSpPr>
-        <p:spPr>
-          <a:xfrm>
-            <a:off x="1659424" y="3983846"/>
-            <a:ext cx="767859" cy="312730"/>
-          </a:xfrm>
-          <a:prstGeom prst="rect">
-            <a:avLst/>
-          </a:prstGeom>
-          <a:noFill/>
-        </p:spPr>
-        <p:txBody>
-          <a:bodyPr wrap="square" rtlCol="0">
-            <a:spAutoFit/>
-          </a:bodyPr>
-          <a:lstStyle/>
-          <a:p>
-            <a:r>
-              <a:rPr lang="en-US" sz="1400" dirty="0"/>
-              <a:t>1</a:t>
-            </a:r>
-          </a:p>
-        </p:txBody>
-      </p:sp>
     </p:spTree>
     <p:extLst>
       <p:ext uri="{BB962C8B-B14F-4D97-AF65-F5344CB8AC3E}">

</xml_diff>

<commit_message>
#2 design ERD for user updated
</commit_message>
<xml_diff>
--- a/docs/ER-DIAGRAM.pptx
+++ b/docs/ER-DIAGRAM.pptx
@@ -242,7 +242,7 @@
           <a:p>
             <a:fld id="{28BE630F-C39C-4DB9-8258-0B48CA067079}" type="datetimeFigureOut">
               <a:rPr lang="en-US" smtClean="0"/>
-              <a:t>11/26/2021</a:t>
+              <a:t>11/27/2021</a:t>
             </a:fld>
             <a:endParaRPr lang="en-US"/>
           </a:p>
@@ -410,7 +410,7 @@
           <a:p>
             <a:fld id="{28BE630F-C39C-4DB9-8258-0B48CA067079}" type="datetimeFigureOut">
               <a:rPr lang="en-US" smtClean="0"/>
-              <a:t>11/26/2021</a:t>
+              <a:t>11/27/2021</a:t>
             </a:fld>
             <a:endParaRPr lang="en-US"/>
           </a:p>
@@ -588,7 +588,7 @@
           <a:p>
             <a:fld id="{28BE630F-C39C-4DB9-8258-0B48CA067079}" type="datetimeFigureOut">
               <a:rPr lang="en-US" smtClean="0"/>
-              <a:t>11/26/2021</a:t>
+              <a:t>11/27/2021</a:t>
             </a:fld>
             <a:endParaRPr lang="en-US"/>
           </a:p>
@@ -756,7 +756,7 @@
           <a:p>
             <a:fld id="{28BE630F-C39C-4DB9-8258-0B48CA067079}" type="datetimeFigureOut">
               <a:rPr lang="en-US" smtClean="0"/>
-              <a:t>11/26/2021</a:t>
+              <a:t>11/27/2021</a:t>
             </a:fld>
             <a:endParaRPr lang="en-US"/>
           </a:p>
@@ -1001,7 +1001,7 @@
           <a:p>
             <a:fld id="{28BE630F-C39C-4DB9-8258-0B48CA067079}" type="datetimeFigureOut">
               <a:rPr lang="en-US" smtClean="0"/>
-              <a:t>11/26/2021</a:t>
+              <a:t>11/27/2021</a:t>
             </a:fld>
             <a:endParaRPr lang="en-US"/>
           </a:p>
@@ -1230,7 +1230,7 @@
           <a:p>
             <a:fld id="{28BE630F-C39C-4DB9-8258-0B48CA067079}" type="datetimeFigureOut">
               <a:rPr lang="en-US" smtClean="0"/>
-              <a:t>11/26/2021</a:t>
+              <a:t>11/27/2021</a:t>
             </a:fld>
             <a:endParaRPr lang="en-US"/>
           </a:p>
@@ -1594,7 +1594,7 @@
           <a:p>
             <a:fld id="{28BE630F-C39C-4DB9-8258-0B48CA067079}" type="datetimeFigureOut">
               <a:rPr lang="en-US" smtClean="0"/>
-              <a:t>11/26/2021</a:t>
+              <a:t>11/27/2021</a:t>
             </a:fld>
             <a:endParaRPr lang="en-US"/>
           </a:p>
@@ -1711,7 +1711,7 @@
           <a:p>
             <a:fld id="{28BE630F-C39C-4DB9-8258-0B48CA067079}" type="datetimeFigureOut">
               <a:rPr lang="en-US" smtClean="0"/>
-              <a:t>11/26/2021</a:t>
+              <a:t>11/27/2021</a:t>
             </a:fld>
             <a:endParaRPr lang="en-US"/>
           </a:p>
@@ -1806,7 +1806,7 @@
           <a:p>
             <a:fld id="{28BE630F-C39C-4DB9-8258-0B48CA067079}" type="datetimeFigureOut">
               <a:rPr lang="en-US" smtClean="0"/>
-              <a:t>11/26/2021</a:t>
+              <a:t>11/27/2021</a:t>
             </a:fld>
             <a:endParaRPr lang="en-US"/>
           </a:p>
@@ -2081,7 +2081,7 @@
           <a:p>
             <a:fld id="{28BE630F-C39C-4DB9-8258-0B48CA067079}" type="datetimeFigureOut">
               <a:rPr lang="en-US" smtClean="0"/>
-              <a:t>11/26/2021</a:t>
+              <a:t>11/27/2021</a:t>
             </a:fld>
             <a:endParaRPr lang="en-US"/>
           </a:p>
@@ -2333,7 +2333,7 @@
           <a:p>
             <a:fld id="{28BE630F-C39C-4DB9-8258-0B48CA067079}" type="datetimeFigureOut">
               <a:rPr lang="en-US" smtClean="0"/>
-              <a:t>11/26/2021</a:t>
+              <a:t>11/27/2021</a:t>
             </a:fld>
             <a:endParaRPr lang="en-US"/>
           </a:p>
@@ -2544,7 +2544,7 @@
           <a:p>
             <a:fld id="{28BE630F-C39C-4DB9-8258-0B48CA067079}" type="datetimeFigureOut">
               <a:rPr lang="en-US" smtClean="0"/>
-              <a:t>11/26/2021</a:t>
+              <a:t>11/27/2021</a:t>
             </a:fld>
             <a:endParaRPr lang="en-US"/>
           </a:p>
@@ -3219,14 +3219,14 @@
           <p:nvPr>
             <p:extLst>
               <p:ext uri="{D42A27DB-BD31-4B8C-83A1-F6EECF244321}">
-                <p14:modId xmlns:p14="http://schemas.microsoft.com/office/powerpoint/2010/main" val="2299806626"/>
+                <p14:modId xmlns:p14="http://schemas.microsoft.com/office/powerpoint/2010/main" val="2816466989"/>
               </p:ext>
             </p:extLst>
           </p:nvPr>
         </p:nvGraphicFramePr>
         <p:xfrm>
-          <a:off x="4171706" y="2386697"/>
-          <a:ext cx="2241828" cy="1767141"/>
+          <a:off x="4874071" y="2413201"/>
+          <a:ext cx="2957964" cy="1980501"/>
         </p:xfrm>
         <a:graphic>
           <a:graphicData uri="http://schemas.openxmlformats.org/drawingml/2006/table">
@@ -3235,14 +3235,14 @@
                 <a:tableStyleId>{5C22544A-7EE6-4342-B048-85BDC9FD1C3A}</a:tableStyleId>
               </a:tblPr>
               <a:tblGrid>
-                <a:gridCol w="422917">
+                <a:gridCol w="558015">
                   <a:extLst>
                     <a:ext uri="{9D8B030D-6E8A-4147-A177-3AD203B41FA5}">
                       <a16:colId xmlns:a16="http://schemas.microsoft.com/office/drawing/2014/main" val="3052149917"/>
                     </a:ext>
                   </a:extLst>
                 </a:gridCol>
-                <a:gridCol w="1818911">
+                <a:gridCol w="2399949">
                   <a:extLst>
                     <a:ext uri="{9D8B030D-6E8A-4147-A177-3AD203B41FA5}">
                       <a16:colId xmlns:a16="http://schemas.microsoft.com/office/drawing/2014/main" val="849940379"/>
@@ -3256,9 +3256,10 @@
                     <a:bodyPr/>
                     <a:lstStyle/>
                     <a:p>
+                      <a:pPr algn="ctr"/>
                       <a:r>
                         <a:rPr lang="en-US" dirty="0"/>
-                        <a:t>              User</a:t>
+                        <a:t>  User</a:t>
                       </a:r>
                     </a:p>
                   </a:txBody>
@@ -3381,7 +3382,25 @@
                             <a:srgbClr val="FF0000"/>
                           </a:solidFill>
                         </a:rPr>
-                        <a:t>int</a:t>
+                        <a:t>string</a:t>
+                      </a:r>
+                    </a:p>
+                    <a:p>
+                      <a:r>
+                        <a:rPr lang="en-US" sz="1400" dirty="0" err="1">
+                          <a:solidFill>
+                            <a:schemeClr val="tx1"/>
+                          </a:solidFill>
+                        </a:rPr>
+                        <a:t>confirm_password</a:t>
+                      </a:r>
+                      <a:r>
+                        <a:rPr lang="en-US" sz="1400" dirty="0">
+                          <a:solidFill>
+                            <a:srgbClr val="FF0000"/>
+                          </a:solidFill>
+                        </a:rPr>
+                        <a:t> string</a:t>
                       </a:r>
                     </a:p>
                     <a:p>

</xml_diff>